<commit_message>
more results generation code
</commit_message>
<xml_diff>
--- a/preliminary_results/figures/figures.pptx
+++ b/preliminary_results/figures/figures.pptx
@@ -6,9 +6,11 @@
   </p:sldMasterIdLst>
   <p:sldIdLst>
     <p:sldId id="256" r:id="rId2"/>
-    <p:sldId id="257" r:id="rId3"/>
-    <p:sldId id="258" r:id="rId4"/>
-    <p:sldId id="260" r:id="rId5"/>
+    <p:sldId id="261" r:id="rId3"/>
+    <p:sldId id="257" r:id="rId4"/>
+    <p:sldId id="258" r:id="rId5"/>
+    <p:sldId id="262" r:id="rId6"/>
+    <p:sldId id="260" r:id="rId7"/>
   </p:sldIdLst>
   <p:sldSz cx="12192000" cy="6858000"/>
   <p:notesSz cx="6858000" cy="9144000"/>
@@ -262,7 +264,7 @@
           <a:p>
             <a:fld id="{6B051EBF-25F5-4C07-9112-15904C76E2D3}" type="datetimeFigureOut">
               <a:rPr lang="en-US" smtClean="0"/>
-              <a:t>4/27/2022</a:t>
+              <a:t>5/12/2022</a:t>
             </a:fld>
             <a:endParaRPr lang="en-US"/>
           </a:p>
@@ -460,7 +462,7 @@
           <a:p>
             <a:fld id="{6B051EBF-25F5-4C07-9112-15904C76E2D3}" type="datetimeFigureOut">
               <a:rPr lang="en-US" smtClean="0"/>
-              <a:t>4/27/2022</a:t>
+              <a:t>5/12/2022</a:t>
             </a:fld>
             <a:endParaRPr lang="en-US"/>
           </a:p>
@@ -668,7 +670,7 @@
           <a:p>
             <a:fld id="{6B051EBF-25F5-4C07-9112-15904C76E2D3}" type="datetimeFigureOut">
               <a:rPr lang="en-US" smtClean="0"/>
-              <a:t>4/27/2022</a:t>
+              <a:t>5/12/2022</a:t>
             </a:fld>
             <a:endParaRPr lang="en-US"/>
           </a:p>
@@ -866,7 +868,7 @@
           <a:p>
             <a:fld id="{6B051EBF-25F5-4C07-9112-15904C76E2D3}" type="datetimeFigureOut">
               <a:rPr lang="en-US" smtClean="0"/>
-              <a:t>4/27/2022</a:t>
+              <a:t>5/12/2022</a:t>
             </a:fld>
             <a:endParaRPr lang="en-US"/>
           </a:p>
@@ -1141,7 +1143,7 @@
           <a:p>
             <a:fld id="{6B051EBF-25F5-4C07-9112-15904C76E2D3}" type="datetimeFigureOut">
               <a:rPr lang="en-US" smtClean="0"/>
-              <a:t>4/27/2022</a:t>
+              <a:t>5/12/2022</a:t>
             </a:fld>
             <a:endParaRPr lang="en-US"/>
           </a:p>
@@ -1406,7 +1408,7 @@
           <a:p>
             <a:fld id="{6B051EBF-25F5-4C07-9112-15904C76E2D3}" type="datetimeFigureOut">
               <a:rPr lang="en-US" smtClean="0"/>
-              <a:t>4/27/2022</a:t>
+              <a:t>5/12/2022</a:t>
             </a:fld>
             <a:endParaRPr lang="en-US"/>
           </a:p>
@@ -1818,7 +1820,7 @@
           <a:p>
             <a:fld id="{6B051EBF-25F5-4C07-9112-15904C76E2D3}" type="datetimeFigureOut">
               <a:rPr lang="en-US" smtClean="0"/>
-              <a:t>4/27/2022</a:t>
+              <a:t>5/12/2022</a:t>
             </a:fld>
             <a:endParaRPr lang="en-US"/>
           </a:p>
@@ -1959,7 +1961,7 @@
           <a:p>
             <a:fld id="{6B051EBF-25F5-4C07-9112-15904C76E2D3}" type="datetimeFigureOut">
               <a:rPr lang="en-US" smtClean="0"/>
-              <a:t>4/27/2022</a:t>
+              <a:t>5/12/2022</a:t>
             </a:fld>
             <a:endParaRPr lang="en-US"/>
           </a:p>
@@ -2072,7 +2074,7 @@
           <a:p>
             <a:fld id="{6B051EBF-25F5-4C07-9112-15904C76E2D3}" type="datetimeFigureOut">
               <a:rPr lang="en-US" smtClean="0"/>
-              <a:t>4/27/2022</a:t>
+              <a:t>5/12/2022</a:t>
             </a:fld>
             <a:endParaRPr lang="en-US"/>
           </a:p>
@@ -2383,7 +2385,7 @@
           <a:p>
             <a:fld id="{6B051EBF-25F5-4C07-9112-15904C76E2D3}" type="datetimeFigureOut">
               <a:rPr lang="en-US" smtClean="0"/>
-              <a:t>4/27/2022</a:t>
+              <a:t>5/12/2022</a:t>
             </a:fld>
             <a:endParaRPr lang="en-US"/>
           </a:p>
@@ -2671,7 +2673,7 @@
           <a:p>
             <a:fld id="{6B051EBF-25F5-4C07-9112-15904C76E2D3}" type="datetimeFigureOut">
               <a:rPr lang="en-US" smtClean="0"/>
-              <a:t>4/27/2022</a:t>
+              <a:t>5/12/2022</a:t>
             </a:fld>
             <a:endParaRPr lang="en-US"/>
           </a:p>
@@ -2912,7 +2914,7 @@
           <a:p>
             <a:fld id="{6B051EBF-25F5-4C07-9112-15904C76E2D3}" type="datetimeFigureOut">
               <a:rPr lang="en-US" smtClean="0"/>
-              <a:t>4/27/2022</a:t>
+              <a:t>5/12/2022</a:t>
             </a:fld>
             <a:endParaRPr lang="en-US"/>
           </a:p>
@@ -3409,6 +3411,258 @@
           <a:chExt cx="0" cy="0"/>
         </a:xfrm>
       </p:grpSpPr>
+      <p:pic>
+        <p:nvPicPr>
+          <p:cNvPr id="5" name="Picture 4" descr="Chart&#10;&#10;Description automatically generated">
+            <a:extLst>
+              <a:ext uri="{FF2B5EF4-FFF2-40B4-BE49-F238E27FC236}">
+                <a16:creationId xmlns:a16="http://schemas.microsoft.com/office/drawing/2014/main" id="{C9CA0C26-19D8-BCEC-85D2-A532988C59B3}"/>
+              </a:ext>
+            </a:extLst>
+          </p:cNvPr>
+          <p:cNvPicPr>
+            <a:picLocks noChangeAspect="1"/>
+          </p:cNvPicPr>
+          <p:nvPr/>
+        </p:nvPicPr>
+        <p:blipFill>
+          <a:blip r:embed="rId2">
+            <a:extLst>
+              <a:ext uri="{28A0092B-C50C-407E-A947-70E740481C1C}">
+                <a14:useLocalDpi xmlns:a14="http://schemas.microsoft.com/office/drawing/2010/main" val="0"/>
+              </a:ext>
+            </a:extLst>
+          </a:blip>
+          <a:stretch>
+            <a:fillRect/>
+          </a:stretch>
+        </p:blipFill>
+        <p:spPr>
+          <a:xfrm>
+            <a:off x="3210255" y="1294946"/>
+            <a:ext cx="2845404" cy="2134053"/>
+          </a:xfrm>
+          <a:prstGeom prst="rect">
+            <a:avLst/>
+          </a:prstGeom>
+        </p:spPr>
+      </p:pic>
+      <p:pic>
+        <p:nvPicPr>
+          <p:cNvPr id="7" name="Picture 6" descr="Chart&#10;&#10;Description automatically generated">
+            <a:extLst>
+              <a:ext uri="{FF2B5EF4-FFF2-40B4-BE49-F238E27FC236}">
+                <a16:creationId xmlns:a16="http://schemas.microsoft.com/office/drawing/2014/main" id="{F08AD1BA-F0A3-12C9-7ECB-6E1B8C71F201}"/>
+              </a:ext>
+            </a:extLst>
+          </p:cNvPr>
+          <p:cNvPicPr>
+            <a:picLocks noChangeAspect="1"/>
+          </p:cNvPicPr>
+          <p:nvPr/>
+        </p:nvPicPr>
+        <p:blipFill>
+          <a:blip r:embed="rId3">
+            <a:extLst>
+              <a:ext uri="{28A0092B-C50C-407E-A947-70E740481C1C}">
+                <a14:useLocalDpi xmlns:a14="http://schemas.microsoft.com/office/drawing/2010/main" val="0"/>
+              </a:ext>
+            </a:extLst>
+          </a:blip>
+          <a:stretch>
+            <a:fillRect/>
+          </a:stretch>
+        </p:blipFill>
+        <p:spPr>
+          <a:xfrm>
+            <a:off x="6096000" y="1294948"/>
+            <a:ext cx="2845404" cy="2134053"/>
+          </a:xfrm>
+          <a:prstGeom prst="rect">
+            <a:avLst/>
+          </a:prstGeom>
+        </p:spPr>
+      </p:pic>
+      <p:pic>
+        <p:nvPicPr>
+          <p:cNvPr id="9" name="Picture 8" descr="Chart&#10;&#10;Description automatically generated">
+            <a:extLst>
+              <a:ext uri="{FF2B5EF4-FFF2-40B4-BE49-F238E27FC236}">
+                <a16:creationId xmlns:a16="http://schemas.microsoft.com/office/drawing/2014/main" id="{D6FF0B48-3D0E-D691-70AF-34286733A0D1}"/>
+              </a:ext>
+            </a:extLst>
+          </p:cNvPr>
+          <p:cNvPicPr>
+            <a:picLocks noChangeAspect="1"/>
+          </p:cNvPicPr>
+          <p:nvPr/>
+        </p:nvPicPr>
+        <p:blipFill>
+          <a:blip r:embed="rId4">
+            <a:extLst>
+              <a:ext uri="{28A0092B-C50C-407E-A947-70E740481C1C}">
+                <a14:useLocalDpi xmlns:a14="http://schemas.microsoft.com/office/drawing/2010/main" val="0"/>
+              </a:ext>
+            </a:extLst>
+          </a:blip>
+          <a:stretch>
+            <a:fillRect/>
+          </a:stretch>
+        </p:blipFill>
+        <p:spPr>
+          <a:xfrm>
+            <a:off x="6096000" y="3428999"/>
+            <a:ext cx="2845404" cy="2134053"/>
+          </a:xfrm>
+          <a:prstGeom prst="rect">
+            <a:avLst/>
+          </a:prstGeom>
+        </p:spPr>
+      </p:pic>
+      <p:pic>
+        <p:nvPicPr>
+          <p:cNvPr id="11" name="Picture 10" descr="Chart&#10;&#10;Description automatically generated">
+            <a:extLst>
+              <a:ext uri="{FF2B5EF4-FFF2-40B4-BE49-F238E27FC236}">
+                <a16:creationId xmlns:a16="http://schemas.microsoft.com/office/drawing/2014/main" id="{313EE48B-CC59-A0EE-157B-239B69F47A59}"/>
+              </a:ext>
+            </a:extLst>
+          </p:cNvPr>
+          <p:cNvPicPr>
+            <a:picLocks noChangeAspect="1"/>
+          </p:cNvPicPr>
+          <p:nvPr/>
+        </p:nvPicPr>
+        <p:blipFill>
+          <a:blip r:embed="rId5">
+            <a:extLst>
+              <a:ext uri="{28A0092B-C50C-407E-A947-70E740481C1C}">
+                <a14:useLocalDpi xmlns:a14="http://schemas.microsoft.com/office/drawing/2010/main" val="0"/>
+              </a:ext>
+            </a:extLst>
+          </a:blip>
+          <a:stretch>
+            <a:fillRect/>
+          </a:stretch>
+        </p:blipFill>
+        <p:spPr>
+          <a:xfrm>
+            <a:off x="3210255" y="3428999"/>
+            <a:ext cx="2845404" cy="2134053"/>
+          </a:xfrm>
+          <a:prstGeom prst="rect">
+            <a:avLst/>
+          </a:prstGeom>
+        </p:spPr>
+      </p:pic>
+      <p:sp>
+        <p:nvSpPr>
+          <p:cNvPr id="12" name="TextBox 11">
+            <a:extLst>
+              <a:ext uri="{FF2B5EF4-FFF2-40B4-BE49-F238E27FC236}">
+                <a16:creationId xmlns:a16="http://schemas.microsoft.com/office/drawing/2014/main" id="{D6143DDD-121E-3555-08A1-53AF07CD6541}"/>
+              </a:ext>
+            </a:extLst>
+          </p:cNvPr>
+          <p:cNvSpPr txBox="1"/>
+          <p:nvPr/>
+        </p:nvSpPr>
+        <p:spPr>
+          <a:xfrm>
+            <a:off x="3497895" y="1182624"/>
+            <a:ext cx="1922930" cy="307777"/>
+          </a:xfrm>
+          <a:prstGeom prst="rect">
+            <a:avLst/>
+          </a:prstGeom>
+          <a:noFill/>
+        </p:spPr>
+        <p:txBody>
+          <a:bodyPr wrap="square" rtlCol="0">
+            <a:spAutoFit/>
+          </a:bodyPr>
+          <a:lstStyle/>
+          <a:p>
+            <a:pPr algn="ctr"/>
+            <a:r>
+              <a:rPr lang="en-US" sz="1400" dirty="0">
+                <a:latin typeface="Times New Roman" panose="02020603050405020304" pitchFamily="18" charset="0"/>
+                <a:cs typeface="Times New Roman" panose="02020603050405020304" pitchFamily="18" charset="0"/>
+              </a:rPr>
+              <a:t>Before Observation</a:t>
+            </a:r>
+          </a:p>
+        </p:txBody>
+      </p:sp>
+      <p:sp>
+        <p:nvSpPr>
+          <p:cNvPr id="13" name="TextBox 12">
+            <a:extLst>
+              <a:ext uri="{FF2B5EF4-FFF2-40B4-BE49-F238E27FC236}">
+                <a16:creationId xmlns:a16="http://schemas.microsoft.com/office/drawing/2014/main" id="{5B2E2C93-03DC-E405-CD91-B3A14A7B5666}"/>
+              </a:ext>
+            </a:extLst>
+          </p:cNvPr>
+          <p:cNvSpPr txBox="1"/>
+          <p:nvPr/>
+        </p:nvSpPr>
+        <p:spPr>
+          <a:xfrm>
+            <a:off x="6381617" y="1183160"/>
+            <a:ext cx="1922930" cy="307777"/>
+          </a:xfrm>
+          <a:prstGeom prst="rect">
+            <a:avLst/>
+          </a:prstGeom>
+          <a:noFill/>
+        </p:spPr>
+        <p:txBody>
+          <a:bodyPr wrap="square" rtlCol="0">
+            <a:spAutoFit/>
+          </a:bodyPr>
+          <a:lstStyle/>
+          <a:p>
+            <a:pPr algn="ctr"/>
+            <a:r>
+              <a:rPr lang="en-US" sz="1400" dirty="0">
+                <a:latin typeface="Times New Roman" panose="02020603050405020304" pitchFamily="18" charset="0"/>
+                <a:cs typeface="Times New Roman" panose="02020603050405020304" pitchFamily="18" charset="0"/>
+              </a:rPr>
+              <a:t>After Observation</a:t>
+            </a:r>
+          </a:p>
+        </p:txBody>
+      </p:sp>
+    </p:spTree>
+    <p:extLst>
+      <p:ext uri="{BB962C8B-B14F-4D97-AF65-F5344CB8AC3E}">
+        <p14:creationId xmlns:p14="http://schemas.microsoft.com/office/powerpoint/2010/main" val="925573546"/>
+      </p:ext>
+    </p:extLst>
+  </p:cSld>
+  <p:clrMapOvr>
+    <a:masterClrMapping/>
+  </p:clrMapOvr>
+</p:sld>
+</file>
+
+<file path=ppt/slides/slide3.xml><?xml version="1.0" encoding="utf-8"?>
+<p:sld xmlns:a="http://schemas.openxmlformats.org/drawingml/2006/main" xmlns:r="http://schemas.openxmlformats.org/officeDocument/2006/relationships" xmlns:p="http://schemas.openxmlformats.org/presentationml/2006/main">
+  <p:cSld>
+    <p:spTree>
+      <p:nvGrpSpPr>
+        <p:cNvPr id="1" name=""/>
+        <p:cNvGrpSpPr/>
+        <p:nvPr/>
+      </p:nvGrpSpPr>
+      <p:grpSpPr>
+        <a:xfrm>
+          <a:off x="0" y="0"/>
+          <a:ext cx="0" cy="0"/>
+          <a:chOff x="0" y="0"/>
+          <a:chExt cx="0" cy="0"/>
+        </a:xfrm>
+      </p:grpSpPr>
       <p:sp>
         <p:nvSpPr>
           <p:cNvPr id="2" name="Rectangle: Rounded Corners 1">
@@ -4369,8 +4623,8 @@
         </p:nvSpPr>
         <p:spPr>
           <a:xfrm>
-            <a:off x="4004943" y="360533"/>
-            <a:ext cx="1929737" cy="246221"/>
+            <a:off x="3765048" y="354080"/>
+            <a:ext cx="2418612" cy="246221"/>
           </a:xfrm>
           <a:prstGeom prst="rect">
             <a:avLst/>
@@ -4389,7 +4643,7 @@
                 <a:latin typeface="Times New Roman" panose="02020603050405020304" pitchFamily="18" charset="0"/>
                 <a:cs typeface="Times New Roman" panose="02020603050405020304" pitchFamily="18" charset="0"/>
               </a:rPr>
-              <a:t>Belief Image</a:t>
+              <a:t>Flowfield + Belief Image (3 channel)</a:t>
             </a:r>
           </a:p>
         </p:txBody>
@@ -5618,7 +5872,7 @@
 </p:sld>
 </file>
 
-<file path=ppt/slides/slide3.xml><?xml version="1.0" encoding="utf-8"?>
+<file path=ppt/slides/slide4.xml><?xml version="1.0" encoding="utf-8"?>
 <p:sld xmlns:a="http://schemas.openxmlformats.org/drawingml/2006/main" xmlns:r="http://schemas.openxmlformats.org/officeDocument/2006/relationships" xmlns:p="http://schemas.openxmlformats.org/presentationml/2006/main">
   <p:cSld>
     <p:spTree>
@@ -5649,12 +5903,18 @@
         </p:nvSpPr>
         <p:spPr>
           <a:xfrm>
-            <a:off x="3129972" y="1260188"/>
+            <a:off x="3118097" y="137970"/>
             <a:ext cx="1335974" cy="635329"/>
           </a:xfrm>
           <a:prstGeom prst="roundRect">
             <a:avLst/>
           </a:prstGeom>
+          <a:solidFill>
+            <a:schemeClr val="accent6">
+              <a:lumMod val="60000"/>
+              <a:lumOff val="40000"/>
+            </a:schemeClr>
+          </a:solidFill>
           <a:ln>
             <a:solidFill>
               <a:schemeClr val="tx1"/>
@@ -5708,8 +5968,8 @@
           </a:p>
         </p:txBody>
       </p:sp>
-      <mc:AlternateContent xmlns:mc="http://schemas.openxmlformats.org/markup-compatibility/2006" xmlns:a14="http://schemas.microsoft.com/office/drawing/2010/main">
-        <mc:Choice Requires="a14">
+      <mc:AlternateContent xmlns:mc="http://schemas.openxmlformats.org/markup-compatibility/2006">
+        <mc:Choice xmlns:a14="http://schemas.microsoft.com/office/drawing/2010/main" Requires="a14">
           <p:sp>
             <p:nvSpPr>
               <p:cNvPr id="4" name="Rectangle: Rounded Corners 3">
@@ -5724,12 +5984,18 @@
             </p:nvSpPr>
             <p:spPr>
               <a:xfrm>
-                <a:off x="2286000" y="2344595"/>
+                <a:off x="2274125" y="1222377"/>
                 <a:ext cx="1169720" cy="635329"/>
               </a:xfrm>
               <a:prstGeom prst="roundRect">
                 <a:avLst/>
               </a:prstGeom>
+              <a:solidFill>
+                <a:schemeClr val="accent1">
+                  <a:lumMod val="60000"/>
+                  <a:lumOff val="40000"/>
+                </a:schemeClr>
+              </a:solidFill>
               <a:ln>
                 <a:solidFill>
                   <a:schemeClr val="tx1"/>
@@ -5830,7 +6096,7 @@
             </p:txBody>
           </p:sp>
         </mc:Choice>
-        <mc:Fallback xmlns="">
+        <mc:Fallback>
           <p:sp>
             <p:nvSpPr>
               <p:cNvPr id="4" name="Rectangle: Rounded Corners 3">
@@ -5847,7 +6113,7 @@
             </p:nvSpPr>
             <p:spPr>
               <a:xfrm>
-                <a:off x="2286000" y="2344595"/>
+                <a:off x="2274125" y="1222377"/>
                 <a:ext cx="1169720" cy="635329"/>
               </a:xfrm>
               <a:prstGeom prst="roundRect">
@@ -5880,8 +6146,8 @@
           </p:sp>
         </mc:Fallback>
       </mc:AlternateContent>
-      <mc:AlternateContent xmlns:mc="http://schemas.openxmlformats.org/markup-compatibility/2006" xmlns:a14="http://schemas.microsoft.com/office/drawing/2010/main">
-        <mc:Choice Requires="a14">
+      <mc:AlternateContent xmlns:mc="http://schemas.openxmlformats.org/markup-compatibility/2006">
+        <mc:Choice xmlns:a14="http://schemas.microsoft.com/office/drawing/2010/main" Requires="a14">
           <p:sp>
             <p:nvSpPr>
               <p:cNvPr id="5" name="Rectangle: Rounded Corners 4">
@@ -5896,12 +6162,18 @@
             </p:nvSpPr>
             <p:spPr>
               <a:xfrm>
-                <a:off x="4136571" y="2344594"/>
+                <a:off x="4124696" y="1222376"/>
                 <a:ext cx="1169720" cy="635329"/>
               </a:xfrm>
               <a:prstGeom prst="roundRect">
                 <a:avLst/>
               </a:prstGeom>
+              <a:solidFill>
+                <a:schemeClr val="accent1">
+                  <a:lumMod val="60000"/>
+                  <a:lumOff val="40000"/>
+                </a:schemeClr>
+              </a:solidFill>
               <a:ln>
                 <a:solidFill>
                   <a:schemeClr val="tx1"/>
@@ -6002,7 +6274,7 @@
             </p:txBody>
           </p:sp>
         </mc:Choice>
-        <mc:Fallback xmlns="">
+        <mc:Fallback>
           <p:sp>
             <p:nvSpPr>
               <p:cNvPr id="5" name="Rectangle: Rounded Corners 4">
@@ -6019,7 +6291,7 @@
             </p:nvSpPr>
             <p:spPr>
               <a:xfrm>
-                <a:off x="4136571" y="2344594"/>
+                <a:off x="4124696" y="1222376"/>
                 <a:ext cx="1169720" cy="635329"/>
               </a:xfrm>
               <a:prstGeom prst="roundRect">
@@ -6066,7 +6338,7 @@
         </p:nvSpPr>
         <p:spPr>
           <a:xfrm>
-            <a:off x="1377538" y="3003863"/>
+            <a:off x="1365663" y="1881645"/>
             <a:ext cx="1445820" cy="215444"/>
           </a:xfrm>
           <a:prstGeom prst="rect">
@@ -6133,7 +6405,7 @@
         </p:nvSpPr>
         <p:spPr>
           <a:xfrm>
-            <a:off x="4356594" y="3242369"/>
+            <a:off x="4344719" y="2120151"/>
             <a:ext cx="1222169" cy="215444"/>
           </a:xfrm>
           <a:prstGeom prst="rect">
@@ -6186,12 +6458,18 @@
         </p:nvSpPr>
         <p:spPr>
           <a:xfrm>
-            <a:off x="3213099" y="3429000"/>
+            <a:off x="3201224" y="2306782"/>
             <a:ext cx="1169720" cy="635329"/>
           </a:xfrm>
           <a:prstGeom prst="roundRect">
             <a:avLst/>
           </a:prstGeom>
+          <a:solidFill>
+            <a:schemeClr val="accent6">
+              <a:lumMod val="60000"/>
+              <a:lumOff val="40000"/>
+            </a:schemeClr>
+          </a:solidFill>
           <a:ln>
             <a:solidFill>
               <a:schemeClr val="tx1"/>
@@ -6259,12 +6537,18 @@
         </p:nvSpPr>
         <p:spPr>
           <a:xfrm>
-            <a:off x="3211119" y="4327153"/>
+            <a:off x="3199244" y="3204556"/>
             <a:ext cx="1169720" cy="635329"/>
           </a:xfrm>
           <a:prstGeom prst="roundRect">
             <a:avLst/>
           </a:prstGeom>
+          <a:solidFill>
+            <a:schemeClr val="accent1">
+              <a:lumMod val="60000"/>
+              <a:lumOff val="40000"/>
+            </a:schemeClr>
+          </a:solidFill>
           <a:ln>
             <a:solidFill>
               <a:schemeClr val="tx1"/>
@@ -6342,12 +6626,18 @@
         </p:nvSpPr>
         <p:spPr>
           <a:xfrm>
-            <a:off x="3211119" y="5287081"/>
+            <a:off x="3205182" y="4165897"/>
             <a:ext cx="1169720" cy="635329"/>
           </a:xfrm>
           <a:prstGeom prst="roundRect">
             <a:avLst/>
           </a:prstGeom>
+          <a:solidFill>
+            <a:schemeClr val="accent2">
+              <a:lumMod val="60000"/>
+              <a:lumOff val="40000"/>
+            </a:schemeClr>
+          </a:solidFill>
           <a:ln>
             <a:solidFill>
               <a:schemeClr val="tx1"/>
@@ -6415,7 +6705,7 @@
         </p:nvSpPr>
         <p:spPr>
           <a:xfrm>
-            <a:off x="2823358" y="5946101"/>
+            <a:off x="2404832" y="4801226"/>
             <a:ext cx="262742" cy="215444"/>
           </a:xfrm>
           <a:prstGeom prst="rect">
@@ -6454,7 +6744,7 @@
         </p:nvSpPr>
         <p:spPr>
           <a:xfrm>
-            <a:off x="3642643" y="5009862"/>
+            <a:off x="3630768" y="3887644"/>
             <a:ext cx="153336" cy="215444"/>
           </a:xfrm>
           <a:prstGeom prst="rect">
@@ -6493,7 +6783,7 @@
         </p:nvSpPr>
         <p:spPr>
           <a:xfrm>
-            <a:off x="4356594" y="5946101"/>
+            <a:off x="4713350" y="4823883"/>
             <a:ext cx="617188" cy="215444"/>
           </a:xfrm>
           <a:prstGeom prst="rect">
@@ -6532,7 +6822,7 @@
         </p:nvSpPr>
         <p:spPr>
           <a:xfrm>
-            <a:off x="5243941" y="4005097"/>
+            <a:off x="5232066" y="2882879"/>
             <a:ext cx="805215" cy="215444"/>
           </a:xfrm>
           <a:prstGeom prst="rect">
@@ -6588,7 +6878,7 @@
         </p:nvCxnSpPr>
         <p:spPr>
           <a:xfrm rot="5400000">
-            <a:off x="3109871" y="1656507"/>
+            <a:off x="3097996" y="534289"/>
             <a:ext cx="449078" cy="927099"/>
           </a:xfrm>
           <a:prstGeom prst="bentConnector3">
@@ -6631,7 +6921,7 @@
         </p:nvCxnSpPr>
         <p:spPr>
           <a:xfrm rot="16200000" flipH="1">
-            <a:off x="4035157" y="1658319"/>
+            <a:off x="4023282" y="536101"/>
             <a:ext cx="449077" cy="923472"/>
           </a:xfrm>
           <a:prstGeom prst="bentConnector3">
@@ -6676,7 +6966,7 @@
         </p:nvCxnSpPr>
         <p:spPr>
           <a:xfrm rot="5400000">
-            <a:off x="4035157" y="2742725"/>
+            <a:off x="4023282" y="1620507"/>
             <a:ext cx="449077" cy="923472"/>
           </a:xfrm>
           <a:prstGeom prst="bentConnector3">
@@ -6721,7 +7011,7 @@
         </p:nvCxnSpPr>
         <p:spPr>
           <a:xfrm rot="16200000" flipH="1">
-            <a:off x="3109871" y="2740912"/>
+            <a:off x="3097996" y="1618694"/>
             <a:ext cx="449076" cy="927099"/>
           </a:xfrm>
           <a:prstGeom prst="bentConnector3">
@@ -6765,7 +7055,7 @@
         </p:nvCxnSpPr>
         <p:spPr>
           <a:xfrm flipV="1">
-            <a:off x="3455720" y="2662259"/>
+            <a:off x="3443845" y="1540041"/>
             <a:ext cx="680851" cy="1"/>
           </a:xfrm>
           <a:prstGeom prst="bentConnector3">
@@ -6809,53 +7099,8 @@
         </p:nvCxnSpPr>
         <p:spPr>
           <a:xfrm rot="5400000">
-            <a:off x="3665557" y="4194751"/>
-            <a:ext cx="262824" cy="1980"/>
-          </a:xfrm>
-          <a:prstGeom prst="bentConnector3">
-            <a:avLst>
-              <a:gd name="adj1" fmla="val 50000"/>
-            </a:avLst>
-          </a:prstGeom>
-          <a:ln>
-            <a:tailEnd type="triangle"/>
-          </a:ln>
-        </p:spPr>
-        <p:style>
-          <a:lnRef idx="1">
-            <a:schemeClr val="dk1"/>
-          </a:lnRef>
-          <a:fillRef idx="0">
-            <a:schemeClr val="dk1"/>
-          </a:fillRef>
-          <a:effectRef idx="0">
-            <a:schemeClr val="dk1"/>
-          </a:effectRef>
-          <a:fontRef idx="minor">
-            <a:schemeClr val="tx1"/>
-          </a:fontRef>
-        </p:style>
-      </p:cxnSp>
-      <p:cxnSp>
-        <p:nvCxnSpPr>
-          <p:cNvPr id="38" name="Connector: Elbow 37">
-            <a:extLst>
-              <a:ext uri="{FF2B5EF4-FFF2-40B4-BE49-F238E27FC236}">
-                <a16:creationId xmlns:a16="http://schemas.microsoft.com/office/drawing/2014/main" id="{DC9D2800-E0D9-4F91-A867-F2B0F684A6A9}"/>
-              </a:ext>
-            </a:extLst>
-          </p:cNvPr>
-          <p:cNvCxnSpPr>
-            <a:cxnSpLocks/>
-            <a:stCxn id="9" idx="2"/>
-            <a:endCxn id="10" idx="0"/>
-          </p:cNvCxnSpPr>
-          <p:nvPr/>
-        </p:nvCxnSpPr>
-        <p:spPr>
-          <a:xfrm rot="5400000">
-            <a:off x="3633680" y="5124781"/>
-            <a:ext cx="324599" cy="12700"/>
+            <a:off x="3653872" y="3072343"/>
+            <a:ext cx="262445" cy="1980"/>
           </a:xfrm>
           <a:prstGeom prst="bentConnector3">
             <a:avLst>
@@ -6899,13 +7144,13 @@
         </p:nvCxnSpPr>
         <p:spPr>
           <a:xfrm rot="5400000" flipH="1" flipV="1">
-            <a:off x="2921059" y="3537179"/>
-            <a:ext cx="3260151" cy="1510312"/>
+            <a:off x="2911636" y="2418447"/>
+            <a:ext cx="3261185" cy="1504374"/>
           </a:xfrm>
           <a:prstGeom prst="bentConnector4">
             <a:avLst>
-              <a:gd name="adj1" fmla="val -7012"/>
-              <a:gd name="adj2" fmla="val 165274"/>
+              <a:gd name="adj1" fmla="val -7010"/>
+              <a:gd name="adj2" fmla="val 149929"/>
             </a:avLst>
           </a:prstGeom>
           <a:ln>
@@ -6945,13 +7190,13 @@
         </p:nvCxnSpPr>
         <p:spPr>
           <a:xfrm rot="5400000" flipH="1">
-            <a:off x="2416666" y="4543098"/>
-            <a:ext cx="2175745" cy="582880"/>
+            <a:off x="2407243" y="3418428"/>
+            <a:ext cx="2176779" cy="588818"/>
           </a:xfrm>
           <a:prstGeom prst="bentConnector4">
             <a:avLst>
-              <a:gd name="adj1" fmla="val -10507"/>
-              <a:gd name="adj2" fmla="val 223717"/>
+              <a:gd name="adj1" fmla="val -10502"/>
+              <a:gd name="adj2" fmla="val 252773"/>
             </a:avLst>
           </a:prstGeom>
           <a:ln>
@@ -6991,13 +7236,13 @@
         </p:nvCxnSpPr>
         <p:spPr>
           <a:xfrm rot="5400000" flipH="1" flipV="1">
-            <a:off x="1958683" y="3415148"/>
-            <a:ext cx="4344557" cy="669967"/>
+            <a:off x="1949260" y="2296416"/>
+            <a:ext cx="4345591" cy="664029"/>
           </a:xfrm>
           <a:prstGeom prst="bentConnector4">
             <a:avLst>
-              <a:gd name="adj1" fmla="val -5262"/>
-              <a:gd name="adj2" fmla="val 372969"/>
+              <a:gd name="adj1" fmla="val -5261"/>
+              <a:gd name="adj2" fmla="val 340089"/>
             </a:avLst>
           </a:prstGeom>
           <a:ln>
@@ -7036,7 +7281,7 @@
         </p:nvCxnSpPr>
         <p:spPr>
           <a:xfrm rot="16200000" flipH="1">
-            <a:off x="4876662" y="3235210"/>
+            <a:off x="4864787" y="2112992"/>
             <a:ext cx="1025176" cy="514598"/>
           </a:xfrm>
           <a:prstGeom prst="bentConnector3">
@@ -7063,6 +7308,363 @@
           </a:fontRef>
         </p:style>
       </p:cxnSp>
+      <p:sp>
+        <p:nvSpPr>
+          <p:cNvPr id="2" name="TextBox 1">
+            <a:extLst>
+              <a:ext uri="{FF2B5EF4-FFF2-40B4-BE49-F238E27FC236}">
+                <a16:creationId xmlns:a16="http://schemas.microsoft.com/office/drawing/2014/main" id="{26FFFE2C-9F16-5384-F0B2-B68723386BD4}"/>
+              </a:ext>
+            </a:extLst>
+          </p:cNvPr>
+          <p:cNvSpPr txBox="1"/>
+          <p:nvPr/>
+        </p:nvSpPr>
+        <p:spPr>
+          <a:xfrm>
+            <a:off x="7618021" y="932213"/>
+            <a:ext cx="3449782" cy="923330"/>
+          </a:xfrm>
+          <a:prstGeom prst="rect">
+            <a:avLst/>
+          </a:prstGeom>
+          <a:noFill/>
+        </p:spPr>
+        <p:txBody>
+          <a:bodyPr wrap="square" rtlCol="0">
+            <a:spAutoFit/>
+          </a:bodyPr>
+          <a:lstStyle/>
+          <a:p>
+            <a:r>
+              <a:rPr lang="en-US" dirty="0"/>
+              <a:t>models = light blue</a:t>
+            </a:r>
+          </a:p>
+          <a:p>
+            <a:r>
+              <a:rPr lang="en-US" dirty="0"/>
+              <a:t>Datasets = light green</a:t>
+            </a:r>
+          </a:p>
+          <a:p>
+            <a:r>
+              <a:rPr lang="en-US" dirty="0"/>
+              <a:t>Environment = light orange</a:t>
+            </a:r>
+          </a:p>
+        </p:txBody>
+      </p:sp>
+      <p:sp>
+        <p:nvSpPr>
+          <p:cNvPr id="26" name="Rectangle: Rounded Corners 25">
+            <a:extLst>
+              <a:ext uri="{FF2B5EF4-FFF2-40B4-BE49-F238E27FC236}">
+                <a16:creationId xmlns:a16="http://schemas.microsoft.com/office/drawing/2014/main" id="{02D100EB-3F9E-CBF0-6039-9D62B08386C7}"/>
+              </a:ext>
+            </a:extLst>
+          </p:cNvPr>
+          <p:cNvSpPr/>
+          <p:nvPr/>
+        </p:nvSpPr>
+        <p:spPr>
+          <a:xfrm>
+            <a:off x="2634921" y="5400410"/>
+            <a:ext cx="3225798" cy="430028"/>
+          </a:xfrm>
+          <a:prstGeom prst="roundRect">
+            <a:avLst/>
+          </a:prstGeom>
+          <a:solidFill>
+            <a:schemeClr val="accent6">
+              <a:lumMod val="60000"/>
+              <a:lumOff val="40000"/>
+            </a:schemeClr>
+          </a:solidFill>
+          <a:ln>
+            <a:solidFill>
+              <a:schemeClr val="tx1"/>
+            </a:solidFill>
+          </a:ln>
+        </p:spPr>
+        <p:style>
+          <a:lnRef idx="2">
+            <a:schemeClr val="accent3">
+              <a:shade val="50000"/>
+            </a:schemeClr>
+          </a:lnRef>
+          <a:fillRef idx="1">
+            <a:schemeClr val="accent3"/>
+          </a:fillRef>
+          <a:effectRef idx="0">
+            <a:schemeClr val="accent3"/>
+          </a:effectRef>
+          <a:fontRef idx="minor">
+            <a:schemeClr val="lt1"/>
+          </a:fontRef>
+        </p:style>
+        <p:txBody>
+          <a:bodyPr rtlCol="0" anchor="ctr"/>
+          <a:lstStyle/>
+          <a:p>
+            <a:pPr algn="ctr"/>
+            <a:r>
+              <a:rPr lang="en-US" sz="1000" dirty="0">
+                <a:solidFill>
+                  <a:schemeClr val="tx1"/>
+                </a:solidFill>
+                <a:latin typeface="Times New Roman" panose="02020603050405020304" pitchFamily="18" charset="0"/>
+                <a:cs typeface="Times New Roman" panose="02020603050405020304" pitchFamily="18" charset="0"/>
+              </a:rPr>
+              <a:t>Replay Memory</a:t>
+            </a:r>
+          </a:p>
+          <a:p>
+            <a:pPr algn="ctr"/>
+            <a:r>
+              <a:rPr lang="en-US" sz="1000" dirty="0">
+                <a:solidFill>
+                  <a:schemeClr val="tx1"/>
+                </a:solidFill>
+                <a:latin typeface="Times New Roman" panose="02020603050405020304" pitchFamily="18" charset="0"/>
+                <a:cs typeface="Times New Roman" panose="02020603050405020304" pitchFamily="18" charset="0"/>
+              </a:rPr>
+              <a:t>Ɗ ~ {(s, a, s’, r)}</a:t>
+            </a:r>
+          </a:p>
+        </p:txBody>
+      </p:sp>
+      <p:cxnSp>
+        <p:nvCxnSpPr>
+          <p:cNvPr id="34" name="Straight Arrow Connector 33">
+            <a:extLst>
+              <a:ext uri="{FF2B5EF4-FFF2-40B4-BE49-F238E27FC236}">
+                <a16:creationId xmlns:a16="http://schemas.microsoft.com/office/drawing/2014/main" id="{AF00A1EE-16F3-A994-4BE4-7DFD5C1CAC95}"/>
+              </a:ext>
+            </a:extLst>
+          </p:cNvPr>
+          <p:cNvCxnSpPr>
+            <a:cxnSpLocks/>
+            <a:stCxn id="14" idx="2"/>
+          </p:cNvCxnSpPr>
+          <p:nvPr/>
+        </p:nvCxnSpPr>
+        <p:spPr>
+          <a:xfrm>
+            <a:off x="5634674" y="3098323"/>
+            <a:ext cx="10722" cy="2302087"/>
+          </a:xfrm>
+          <a:prstGeom prst="straightConnector1">
+            <a:avLst/>
+          </a:prstGeom>
+          <a:ln>
+            <a:solidFill>
+              <a:schemeClr val="tx1"/>
+            </a:solidFill>
+            <a:prstDash val="sysDash"/>
+            <a:tailEnd type="triangle"/>
+          </a:ln>
+        </p:spPr>
+        <p:style>
+          <a:lnRef idx="1">
+            <a:schemeClr val="accent1"/>
+          </a:lnRef>
+          <a:fillRef idx="0">
+            <a:schemeClr val="accent1"/>
+          </a:fillRef>
+          <a:effectRef idx="0">
+            <a:schemeClr val="accent1"/>
+          </a:effectRef>
+          <a:fontRef idx="minor">
+            <a:schemeClr val="tx1"/>
+          </a:fontRef>
+        </p:style>
+      </p:cxnSp>
+      <p:cxnSp>
+        <p:nvCxnSpPr>
+          <p:cNvPr id="41" name="Connector: Elbow 40">
+            <a:extLst>
+              <a:ext uri="{FF2B5EF4-FFF2-40B4-BE49-F238E27FC236}">
+                <a16:creationId xmlns:a16="http://schemas.microsoft.com/office/drawing/2014/main" id="{809C3702-8916-36E8-30A5-B3A763CCD49C}"/>
+              </a:ext>
+            </a:extLst>
+          </p:cNvPr>
+          <p:cNvCxnSpPr>
+            <a:cxnSpLocks/>
+          </p:cNvCxnSpPr>
+          <p:nvPr/>
+        </p:nvCxnSpPr>
+        <p:spPr>
+          <a:xfrm rot="5400000">
+            <a:off x="2141378" y="3757684"/>
+            <a:ext cx="2409808" cy="875642"/>
+          </a:xfrm>
+          <a:prstGeom prst="bentConnector3">
+            <a:avLst>
+              <a:gd name="adj1" fmla="val 2084"/>
+            </a:avLst>
+          </a:prstGeom>
+          <a:ln>
+            <a:solidFill>
+              <a:schemeClr val="tx1"/>
+            </a:solidFill>
+            <a:prstDash val="sysDash"/>
+            <a:tailEnd type="triangle"/>
+          </a:ln>
+        </p:spPr>
+        <p:style>
+          <a:lnRef idx="1">
+            <a:schemeClr val="accent1"/>
+          </a:lnRef>
+          <a:fillRef idx="0">
+            <a:schemeClr val="accent1"/>
+          </a:fillRef>
+          <a:effectRef idx="0">
+            <a:schemeClr val="accent1"/>
+          </a:effectRef>
+          <a:fontRef idx="minor">
+            <a:schemeClr val="tx1"/>
+          </a:fontRef>
+        </p:style>
+      </p:cxnSp>
+      <p:cxnSp>
+        <p:nvCxnSpPr>
+          <p:cNvPr id="53" name="Straight Arrow Connector 52">
+            <a:extLst>
+              <a:ext uri="{FF2B5EF4-FFF2-40B4-BE49-F238E27FC236}">
+                <a16:creationId xmlns:a16="http://schemas.microsoft.com/office/drawing/2014/main" id="{07040061-0D9D-7B42-B6DB-3D97402C9875}"/>
+              </a:ext>
+            </a:extLst>
+          </p:cNvPr>
+          <p:cNvCxnSpPr>
+            <a:cxnSpLocks/>
+          </p:cNvCxnSpPr>
+          <p:nvPr/>
+        </p:nvCxnSpPr>
+        <p:spPr>
+          <a:xfrm>
+            <a:off x="3417042" y="5039327"/>
+            <a:ext cx="0" cy="361082"/>
+          </a:xfrm>
+          <a:prstGeom prst="straightConnector1">
+            <a:avLst/>
+          </a:prstGeom>
+          <a:ln>
+            <a:solidFill>
+              <a:schemeClr val="tx1"/>
+            </a:solidFill>
+            <a:prstDash val="sysDash"/>
+            <a:tailEnd type="triangle"/>
+          </a:ln>
+        </p:spPr>
+        <p:style>
+          <a:lnRef idx="1">
+            <a:schemeClr val="accent1"/>
+          </a:lnRef>
+          <a:fillRef idx="0">
+            <a:schemeClr val="accent1"/>
+          </a:fillRef>
+          <a:effectRef idx="0">
+            <a:schemeClr val="accent1"/>
+          </a:effectRef>
+          <a:fontRef idx="minor">
+            <a:schemeClr val="tx1"/>
+          </a:fontRef>
+        </p:style>
+      </p:cxnSp>
+      <p:cxnSp>
+        <p:nvCxnSpPr>
+          <p:cNvPr id="57" name="Straight Arrow Connector 56">
+            <a:extLst>
+              <a:ext uri="{FF2B5EF4-FFF2-40B4-BE49-F238E27FC236}">
+                <a16:creationId xmlns:a16="http://schemas.microsoft.com/office/drawing/2014/main" id="{4648F843-20AB-6CB0-6BC0-AF66F9405659}"/>
+              </a:ext>
+            </a:extLst>
+          </p:cNvPr>
+          <p:cNvCxnSpPr>
+            <a:cxnSpLocks/>
+            <a:stCxn id="9" idx="2"/>
+            <a:endCxn id="10" idx="0"/>
+          </p:cNvCxnSpPr>
+          <p:nvPr/>
+        </p:nvCxnSpPr>
+        <p:spPr>
+          <a:xfrm>
+            <a:off x="3784104" y="3839885"/>
+            <a:ext cx="5938" cy="326012"/>
+          </a:xfrm>
+          <a:prstGeom prst="straightConnector1">
+            <a:avLst/>
+          </a:prstGeom>
+          <a:ln>
+            <a:solidFill>
+              <a:schemeClr val="tx1"/>
+            </a:solidFill>
+            <a:prstDash val="solid"/>
+            <a:tailEnd type="triangle"/>
+          </a:ln>
+        </p:spPr>
+        <p:style>
+          <a:lnRef idx="1">
+            <a:schemeClr val="accent1"/>
+          </a:lnRef>
+          <a:fillRef idx="0">
+            <a:schemeClr val="accent1"/>
+          </a:fillRef>
+          <a:effectRef idx="0">
+            <a:schemeClr val="accent1"/>
+          </a:effectRef>
+          <a:fontRef idx="minor">
+            <a:schemeClr val="tx1"/>
+          </a:fontRef>
+        </p:style>
+      </p:cxnSp>
+      <p:cxnSp>
+        <p:nvCxnSpPr>
+          <p:cNvPr id="60" name="Connector: Elbow 59">
+            <a:extLst>
+              <a:ext uri="{FF2B5EF4-FFF2-40B4-BE49-F238E27FC236}">
+                <a16:creationId xmlns:a16="http://schemas.microsoft.com/office/drawing/2014/main" id="{22736249-B647-DF6B-15D7-A8630B03B5FF}"/>
+              </a:ext>
+            </a:extLst>
+          </p:cNvPr>
+          <p:cNvCxnSpPr>
+            <a:cxnSpLocks/>
+            <a:stCxn id="12" idx="3"/>
+          </p:cNvCxnSpPr>
+          <p:nvPr/>
+        </p:nvCxnSpPr>
+        <p:spPr>
+          <a:xfrm>
+            <a:off x="3784104" y="3995366"/>
+            <a:ext cx="697342" cy="1405043"/>
+          </a:xfrm>
+          <a:prstGeom prst="bentConnector2">
+            <a:avLst/>
+          </a:prstGeom>
+          <a:ln>
+            <a:solidFill>
+              <a:schemeClr val="tx1"/>
+            </a:solidFill>
+            <a:prstDash val="sysDash"/>
+            <a:tailEnd type="triangle"/>
+          </a:ln>
+        </p:spPr>
+        <p:style>
+          <a:lnRef idx="1">
+            <a:schemeClr val="accent1"/>
+          </a:lnRef>
+          <a:fillRef idx="0">
+            <a:schemeClr val="accent1"/>
+          </a:fillRef>
+          <a:effectRef idx="0">
+            <a:schemeClr val="accent1"/>
+          </a:effectRef>
+          <a:fontRef idx="minor">
+            <a:schemeClr val="tx1"/>
+          </a:fontRef>
+        </p:style>
+      </p:cxnSp>
     </p:spTree>
     <p:extLst>
       <p:ext uri="{BB962C8B-B14F-4D97-AF65-F5344CB8AC3E}">
@@ -7076,7 +7678,3633 @@
 </p:sld>
 </file>
 
-<file path=ppt/slides/slide4.xml><?xml version="1.0" encoding="utf-8"?>
+<file path=ppt/slides/slide5.xml><?xml version="1.0" encoding="utf-8"?>
+<p:sld xmlns:a="http://schemas.openxmlformats.org/drawingml/2006/main" xmlns:r="http://schemas.openxmlformats.org/officeDocument/2006/relationships" xmlns:p="http://schemas.openxmlformats.org/presentationml/2006/main">
+  <p:cSld>
+    <p:spTree>
+      <p:nvGrpSpPr>
+        <p:cNvPr id="1" name=""/>
+        <p:cNvGrpSpPr/>
+        <p:nvPr/>
+      </p:nvGrpSpPr>
+      <p:grpSpPr>
+        <a:xfrm>
+          <a:off x="0" y="0"/>
+          <a:ext cx="0" cy="0"/>
+          <a:chOff x="0" y="0"/>
+          <a:chExt cx="0" cy="0"/>
+        </a:xfrm>
+      </p:grpSpPr>
+      <p:sp>
+        <p:nvSpPr>
+          <p:cNvPr id="3" name="Rectangle: Rounded Corners 2">
+            <a:extLst>
+              <a:ext uri="{FF2B5EF4-FFF2-40B4-BE49-F238E27FC236}">
+                <a16:creationId xmlns:a16="http://schemas.microsoft.com/office/drawing/2014/main" id="{EB546DB7-DE15-B73F-B3C2-9083D89BD819}"/>
+              </a:ext>
+            </a:extLst>
+          </p:cNvPr>
+          <p:cNvSpPr/>
+          <p:nvPr/>
+        </p:nvSpPr>
+        <p:spPr>
+          <a:xfrm>
+            <a:off x="581157" y="2658281"/>
+            <a:ext cx="1303005" cy="430028"/>
+          </a:xfrm>
+          <a:prstGeom prst="roundRect">
+            <a:avLst/>
+          </a:prstGeom>
+          <a:solidFill>
+            <a:schemeClr val="accent6">
+              <a:lumMod val="60000"/>
+              <a:lumOff val="40000"/>
+            </a:schemeClr>
+          </a:solidFill>
+          <a:ln>
+            <a:solidFill>
+              <a:schemeClr val="tx1"/>
+            </a:solidFill>
+          </a:ln>
+        </p:spPr>
+        <p:style>
+          <a:lnRef idx="2">
+            <a:schemeClr val="accent3">
+              <a:shade val="50000"/>
+            </a:schemeClr>
+          </a:lnRef>
+          <a:fillRef idx="1">
+            <a:schemeClr val="accent3"/>
+          </a:fillRef>
+          <a:effectRef idx="0">
+            <a:schemeClr val="accent3"/>
+          </a:effectRef>
+          <a:fontRef idx="minor">
+            <a:schemeClr val="lt1"/>
+          </a:fontRef>
+        </p:style>
+        <p:txBody>
+          <a:bodyPr rtlCol="0" anchor="ctr"/>
+          <a:lstStyle/>
+          <a:p>
+            <a:pPr algn="ctr"/>
+            <a:r>
+              <a:rPr lang="en-US" sz="1000" dirty="0">
+                <a:solidFill>
+                  <a:schemeClr val="tx1"/>
+                </a:solidFill>
+                <a:latin typeface="Times New Roman" panose="02020603050405020304" pitchFamily="18" charset="0"/>
+                <a:cs typeface="Times New Roman" panose="02020603050405020304" pitchFamily="18" charset="0"/>
+              </a:rPr>
+              <a:t>Replay Memory</a:t>
+            </a:r>
+          </a:p>
+          <a:p>
+            <a:pPr algn="ctr"/>
+            <a:r>
+              <a:rPr lang="en-US" sz="1000" dirty="0">
+                <a:solidFill>
+                  <a:schemeClr val="tx1"/>
+                </a:solidFill>
+                <a:latin typeface="Times New Roman" panose="02020603050405020304" pitchFamily="18" charset="0"/>
+                <a:cs typeface="Times New Roman" panose="02020603050405020304" pitchFamily="18" charset="0"/>
+              </a:rPr>
+              <a:t>Ɗ ~ {(s, a, s’, r)}</a:t>
+            </a:r>
+          </a:p>
+        </p:txBody>
+      </p:sp>
+      <mc:AlternateContent xmlns:mc="http://schemas.openxmlformats.org/markup-compatibility/2006">
+        <mc:Choice xmlns:a14="http://schemas.microsoft.com/office/drawing/2010/main" Requires="a14">
+          <p:sp>
+            <p:nvSpPr>
+              <p:cNvPr id="4" name="Rectangle: Rounded Corners 3">
+                <a:extLst>
+                  <a:ext uri="{FF2B5EF4-FFF2-40B4-BE49-F238E27FC236}">
+                    <a16:creationId xmlns:a16="http://schemas.microsoft.com/office/drawing/2014/main" id="{8384E9F1-34E6-B84A-E65C-E1704BDA6499}"/>
+                  </a:ext>
+                </a:extLst>
+              </p:cNvPr>
+              <p:cNvSpPr/>
+              <p:nvPr/>
+            </p:nvSpPr>
+            <p:spPr>
+              <a:xfrm>
+                <a:off x="2523436" y="1501417"/>
+                <a:ext cx="2050544" cy="430028"/>
+              </a:xfrm>
+              <a:prstGeom prst="roundRect">
+                <a:avLst/>
+              </a:prstGeom>
+              <a:solidFill>
+                <a:schemeClr val="accent4">
+                  <a:lumMod val="60000"/>
+                  <a:lumOff val="40000"/>
+                </a:schemeClr>
+              </a:solidFill>
+              <a:ln>
+                <a:solidFill>
+                  <a:schemeClr val="tx1"/>
+                </a:solidFill>
+              </a:ln>
+            </p:spPr>
+            <p:style>
+              <a:lnRef idx="2">
+                <a:schemeClr val="accent3">
+                  <a:shade val="50000"/>
+                </a:schemeClr>
+              </a:lnRef>
+              <a:fillRef idx="1">
+                <a:schemeClr val="accent3"/>
+              </a:fillRef>
+              <a:effectRef idx="0">
+                <a:schemeClr val="accent3"/>
+              </a:effectRef>
+              <a:fontRef idx="minor">
+                <a:schemeClr val="lt1"/>
+              </a:fontRef>
+            </p:style>
+            <p:txBody>
+              <a:bodyPr rtlCol="0" anchor="ctr"/>
+              <a:lstStyle/>
+              <a:p>
+                <a:pPr algn="ctr"/>
+                <a14:m>
+                  <m:oMathPara xmlns:m="http://schemas.openxmlformats.org/officeDocument/2006/math">
+                    <m:oMathParaPr>
+                      <m:jc m:val="centerGroup"/>
+                    </m:oMathParaPr>
+                    <m:oMath xmlns:m="http://schemas.openxmlformats.org/officeDocument/2006/math">
+                      <m:nary>
+                        <m:naryPr>
+                          <m:chr m:val="∑"/>
+                          <m:supHide m:val="on"/>
+                          <m:ctrlPr>
+                            <a:rPr lang="en-US" sz="1000" b="0" i="1" smtClean="0">
+                              <a:solidFill>
+                                <a:schemeClr val="tx1"/>
+                              </a:solidFill>
+                              <a:latin typeface="Cambria Math" panose="02040503050406030204" pitchFamily="18" charset="0"/>
+                              <a:cs typeface="Times New Roman" panose="02020603050405020304" pitchFamily="18" charset="0"/>
+                            </a:rPr>
+                          </m:ctrlPr>
+                        </m:naryPr>
+                        <m:sub>
+                          <m:r>
+                            <a:rPr lang="en-US" sz="1000" b="0" i="1" smtClean="0">
+                              <a:solidFill>
+                                <a:schemeClr val="tx1"/>
+                              </a:solidFill>
+                              <a:latin typeface="Cambria Math" panose="02040503050406030204" pitchFamily="18" charset="0"/>
+                              <a:cs typeface="Times New Roman" panose="02020603050405020304" pitchFamily="18" charset="0"/>
+                            </a:rPr>
+                            <m:t>𝐷</m:t>
+                          </m:r>
+                        </m:sub>
+                        <m:sup/>
+                        <m:e>
+                          <m:r>
+                            <a:rPr lang="en-US" sz="1000" b="0" i="1" smtClean="0">
+                              <a:solidFill>
+                                <a:schemeClr val="tx1"/>
+                              </a:solidFill>
+                              <a:latin typeface="Cambria Math" panose="02040503050406030204" pitchFamily="18" charset="0"/>
+                              <a:cs typeface="Times New Roman" panose="02020603050405020304" pitchFamily="18" charset="0"/>
+                            </a:rPr>
+                            <m:t>𝑄</m:t>
+                          </m:r>
+                          <m:d>
+                            <m:dPr>
+                              <m:ctrlPr>
+                                <a:rPr lang="en-US" sz="1000" b="0" i="1" smtClean="0">
+                                  <a:solidFill>
+                                    <a:schemeClr val="tx1"/>
+                                  </a:solidFill>
+                                  <a:latin typeface="Cambria Math" panose="02040503050406030204" pitchFamily="18" charset="0"/>
+                                  <a:cs typeface="Times New Roman" panose="02020603050405020304" pitchFamily="18" charset="0"/>
+                                </a:rPr>
+                              </m:ctrlPr>
+                            </m:dPr>
+                            <m:e>
+                              <m:r>
+                                <a:rPr lang="en-US" sz="1000" b="0" i="1" smtClean="0">
+                                  <a:solidFill>
+                                    <a:schemeClr val="tx1"/>
+                                  </a:solidFill>
+                                  <a:latin typeface="Cambria Math" panose="02040503050406030204" pitchFamily="18" charset="0"/>
+                                  <a:cs typeface="Times New Roman" panose="02020603050405020304" pitchFamily="18" charset="0"/>
+                                </a:rPr>
+                                <m:t>𝑠</m:t>
+                              </m:r>
+                              <m:r>
+                                <a:rPr lang="en-US" sz="1000" b="0" i="1" smtClean="0">
+                                  <a:solidFill>
+                                    <a:schemeClr val="tx1"/>
+                                  </a:solidFill>
+                                  <a:latin typeface="Cambria Math" panose="02040503050406030204" pitchFamily="18" charset="0"/>
+                                  <a:cs typeface="Times New Roman" panose="02020603050405020304" pitchFamily="18" charset="0"/>
+                                </a:rPr>
+                                <m:t>,</m:t>
+                              </m:r>
+                              <m:r>
+                                <a:rPr lang="en-US" sz="1000" b="0" i="1" smtClean="0">
+                                  <a:solidFill>
+                                    <a:schemeClr val="tx1"/>
+                                  </a:solidFill>
+                                  <a:latin typeface="Cambria Math" panose="02040503050406030204" pitchFamily="18" charset="0"/>
+                                  <a:cs typeface="Times New Roman" panose="02020603050405020304" pitchFamily="18" charset="0"/>
+                                </a:rPr>
+                                <m:t>𝑎</m:t>
+                              </m:r>
+                            </m:e>
+                          </m:d>
+                        </m:e>
+                      </m:nary>
+                      <m:r>
+                        <a:rPr lang="en-US" sz="1000" b="0" i="1" smtClean="0">
+                          <a:solidFill>
+                            <a:schemeClr val="tx1"/>
+                          </a:solidFill>
+                          <a:latin typeface="Cambria Math" panose="02040503050406030204" pitchFamily="18" charset="0"/>
+                          <a:cs typeface="Times New Roman" panose="02020603050405020304" pitchFamily="18" charset="0"/>
+                        </a:rPr>
+                        <m:t>=</m:t>
+                      </m:r>
+                      <m:r>
+                        <a:rPr lang="en-US" sz="1000" b="0" i="1" smtClean="0">
+                          <a:solidFill>
+                            <a:schemeClr val="tx1"/>
+                          </a:solidFill>
+                          <a:latin typeface="Cambria Math" panose="02040503050406030204" pitchFamily="18" charset="0"/>
+                          <a:cs typeface="Times New Roman" panose="02020603050405020304" pitchFamily="18" charset="0"/>
+                        </a:rPr>
+                        <m:t>𝑟</m:t>
+                      </m:r>
+                      <m:r>
+                        <a:rPr lang="en-US" sz="1000" b="0" i="1" smtClean="0">
+                          <a:solidFill>
+                            <a:schemeClr val="tx1"/>
+                          </a:solidFill>
+                          <a:latin typeface="Cambria Math" panose="02040503050406030204" pitchFamily="18" charset="0"/>
+                          <a:cs typeface="Times New Roman" panose="02020603050405020304" pitchFamily="18" charset="0"/>
+                        </a:rPr>
+                        <m:t>+</m:t>
+                      </m:r>
+                      <m:acc>
+                        <m:accPr>
+                          <m:chr m:val="̂"/>
+                          <m:ctrlPr>
+                            <a:rPr lang="en-US" sz="1000" b="0" i="1" smtClean="0">
+                              <a:solidFill>
+                                <a:schemeClr val="tx1"/>
+                              </a:solidFill>
+                              <a:latin typeface="Cambria Math" panose="02040503050406030204" pitchFamily="18" charset="0"/>
+                              <a:cs typeface="Times New Roman" panose="02020603050405020304" pitchFamily="18" charset="0"/>
+                            </a:rPr>
+                          </m:ctrlPr>
+                        </m:accPr>
+                        <m:e>
+                          <m:sSup>
+                            <m:sSupPr>
+                              <m:ctrlPr>
+                                <a:rPr lang="en-US" sz="1000" b="0" i="1" smtClean="0">
+                                  <a:solidFill>
+                                    <a:schemeClr val="tx1"/>
+                                  </a:solidFill>
+                                  <a:latin typeface="Cambria Math" panose="02040503050406030204" pitchFamily="18" charset="0"/>
+                                  <a:cs typeface="Times New Roman" panose="02020603050405020304" pitchFamily="18" charset="0"/>
+                                </a:rPr>
+                              </m:ctrlPr>
+                            </m:sSupPr>
+                            <m:e>
+                              <m:r>
+                                <a:rPr lang="en-US" sz="1000" b="0" i="1" smtClean="0">
+                                  <a:solidFill>
+                                    <a:schemeClr val="tx1"/>
+                                  </a:solidFill>
+                                  <a:latin typeface="Cambria Math" panose="02040503050406030204" pitchFamily="18" charset="0"/>
+                                  <a:cs typeface="Times New Roman" panose="02020603050405020304" pitchFamily="18" charset="0"/>
+                                </a:rPr>
+                                <m:t>𝑄</m:t>
+                              </m:r>
+                            </m:e>
+                            <m:sup>
+                              <m:r>
+                                <a:rPr lang="en-US" sz="1000" b="0" i="1" smtClean="0">
+                                  <a:solidFill>
+                                    <a:schemeClr val="tx1"/>
+                                  </a:solidFill>
+                                  <a:latin typeface="Cambria Math" panose="02040503050406030204" pitchFamily="18" charset="0"/>
+                                  <a:cs typeface="Times New Roman" panose="02020603050405020304" pitchFamily="18" charset="0"/>
+                                </a:rPr>
+                                <m:t>′</m:t>
+                              </m:r>
+                            </m:sup>
+                          </m:sSup>
+                        </m:e>
+                      </m:acc>
+                      <m:r>
+                        <a:rPr lang="en-US" sz="1000" b="0" i="1" smtClean="0">
+                          <a:solidFill>
+                            <a:schemeClr val="tx1"/>
+                          </a:solidFill>
+                          <a:latin typeface="Cambria Math" panose="02040503050406030204" pitchFamily="18" charset="0"/>
+                          <a:cs typeface="Times New Roman" panose="02020603050405020304" pitchFamily="18" charset="0"/>
+                        </a:rPr>
+                        <m:t>(</m:t>
+                      </m:r>
+                      <m:sSup>
+                        <m:sSupPr>
+                          <m:ctrlPr>
+                            <a:rPr lang="en-US" sz="1000" b="0" i="1" smtClean="0">
+                              <a:solidFill>
+                                <a:schemeClr val="tx1"/>
+                              </a:solidFill>
+                              <a:latin typeface="Cambria Math" panose="02040503050406030204" pitchFamily="18" charset="0"/>
+                              <a:cs typeface="Times New Roman" panose="02020603050405020304" pitchFamily="18" charset="0"/>
+                            </a:rPr>
+                          </m:ctrlPr>
+                        </m:sSupPr>
+                        <m:e>
+                          <m:r>
+                            <a:rPr lang="en-US" sz="1000" b="0" i="1" smtClean="0">
+                              <a:solidFill>
+                                <a:schemeClr val="tx1"/>
+                              </a:solidFill>
+                              <a:latin typeface="Cambria Math" panose="02040503050406030204" pitchFamily="18" charset="0"/>
+                              <a:cs typeface="Times New Roman" panose="02020603050405020304" pitchFamily="18" charset="0"/>
+                            </a:rPr>
+                            <m:t>𝑠</m:t>
+                          </m:r>
+                        </m:e>
+                        <m:sup>
+                          <m:r>
+                            <a:rPr lang="en-US" sz="1000" b="0" i="1" smtClean="0">
+                              <a:solidFill>
+                                <a:schemeClr val="tx1"/>
+                              </a:solidFill>
+                              <a:latin typeface="Cambria Math" panose="02040503050406030204" pitchFamily="18" charset="0"/>
+                              <a:cs typeface="Times New Roman" panose="02020603050405020304" pitchFamily="18" charset="0"/>
+                            </a:rPr>
+                            <m:t>′</m:t>
+                          </m:r>
+                        </m:sup>
+                      </m:sSup>
+                      <m:r>
+                        <a:rPr lang="en-US" sz="1000" b="0" i="1" smtClean="0">
+                          <a:solidFill>
+                            <a:schemeClr val="tx1"/>
+                          </a:solidFill>
+                          <a:latin typeface="Cambria Math" panose="02040503050406030204" pitchFamily="18" charset="0"/>
+                          <a:cs typeface="Times New Roman" panose="02020603050405020304" pitchFamily="18" charset="0"/>
+                        </a:rPr>
+                        <m:t>,</m:t>
+                      </m:r>
+                      <m:sSub>
+                        <m:sSubPr>
+                          <m:ctrlPr>
+                            <a:rPr lang="en-US" sz="1000" b="0" i="1" smtClean="0">
+                              <a:solidFill>
+                                <a:schemeClr val="tx1"/>
+                              </a:solidFill>
+                              <a:latin typeface="Cambria Math" panose="02040503050406030204" pitchFamily="18" charset="0"/>
+                              <a:cs typeface="Times New Roman" panose="02020603050405020304" pitchFamily="18" charset="0"/>
+                            </a:rPr>
+                          </m:ctrlPr>
+                        </m:sSubPr>
+                        <m:e>
+                          <m:r>
+                            <a:rPr lang="en-US" sz="1000" b="0" i="1" smtClean="0">
+                              <a:solidFill>
+                                <a:schemeClr val="tx1"/>
+                              </a:solidFill>
+                              <a:latin typeface="Cambria Math" panose="02040503050406030204" pitchFamily="18" charset="0"/>
+                              <a:cs typeface="Times New Roman" panose="02020603050405020304" pitchFamily="18" charset="0"/>
+                            </a:rPr>
+                            <m:t>𝜋</m:t>
+                          </m:r>
+                        </m:e>
+                        <m:sub>
+                          <m:r>
+                            <a:rPr lang="en-US" sz="1000" b="0" i="1" smtClean="0">
+                              <a:solidFill>
+                                <a:schemeClr val="tx1"/>
+                              </a:solidFill>
+                              <a:latin typeface="Cambria Math" panose="02040503050406030204" pitchFamily="18" charset="0"/>
+                              <a:cs typeface="Times New Roman" panose="02020603050405020304" pitchFamily="18" charset="0"/>
+                            </a:rPr>
+                            <m:t>𝜃</m:t>
+                          </m:r>
+                        </m:sub>
+                      </m:sSub>
+                      <m:d>
+                        <m:dPr>
+                          <m:ctrlPr>
+                            <a:rPr lang="en-US" sz="1000" b="0" i="1" smtClean="0">
+                              <a:solidFill>
+                                <a:schemeClr val="tx1"/>
+                              </a:solidFill>
+                              <a:latin typeface="Cambria Math" panose="02040503050406030204" pitchFamily="18" charset="0"/>
+                              <a:cs typeface="Times New Roman" panose="02020603050405020304" pitchFamily="18" charset="0"/>
+                            </a:rPr>
+                          </m:ctrlPr>
+                        </m:dPr>
+                        <m:e>
+                          <m:sSup>
+                            <m:sSupPr>
+                              <m:ctrlPr>
+                                <a:rPr lang="en-US" sz="1000" b="0" i="1" smtClean="0">
+                                  <a:solidFill>
+                                    <a:schemeClr val="tx1"/>
+                                  </a:solidFill>
+                                  <a:latin typeface="Cambria Math" panose="02040503050406030204" pitchFamily="18" charset="0"/>
+                                  <a:cs typeface="Times New Roman" panose="02020603050405020304" pitchFamily="18" charset="0"/>
+                                </a:rPr>
+                              </m:ctrlPr>
+                            </m:sSupPr>
+                            <m:e>
+                              <m:r>
+                                <a:rPr lang="en-US" sz="1000" b="0" i="1" smtClean="0">
+                                  <a:solidFill>
+                                    <a:schemeClr val="tx1"/>
+                                  </a:solidFill>
+                                  <a:latin typeface="Cambria Math" panose="02040503050406030204" pitchFamily="18" charset="0"/>
+                                  <a:cs typeface="Times New Roman" panose="02020603050405020304" pitchFamily="18" charset="0"/>
+                                </a:rPr>
+                                <m:t>𝑠</m:t>
+                              </m:r>
+                            </m:e>
+                            <m:sup>
+                              <m:r>
+                                <a:rPr lang="en-US" sz="1000" b="0" i="1" smtClean="0">
+                                  <a:solidFill>
+                                    <a:schemeClr val="tx1"/>
+                                  </a:solidFill>
+                                  <a:latin typeface="Cambria Math" panose="02040503050406030204" pitchFamily="18" charset="0"/>
+                                  <a:cs typeface="Times New Roman" panose="02020603050405020304" pitchFamily="18" charset="0"/>
+                                </a:rPr>
+                                <m:t>′</m:t>
+                              </m:r>
+                            </m:sup>
+                          </m:sSup>
+                        </m:e>
+                      </m:d>
+                      <m:r>
+                        <a:rPr lang="en-US" sz="1000" b="0" i="1" smtClean="0">
+                          <a:solidFill>
+                            <a:schemeClr val="tx1"/>
+                          </a:solidFill>
+                          <a:latin typeface="Cambria Math" panose="02040503050406030204" pitchFamily="18" charset="0"/>
+                          <a:cs typeface="Times New Roman" panose="02020603050405020304" pitchFamily="18" charset="0"/>
+                        </a:rPr>
+                        <m:t>)</m:t>
+                      </m:r>
+                    </m:oMath>
+                  </m:oMathPara>
+                </a14:m>
+                <a:endParaRPr lang="en-US" sz="1000" dirty="0">
+                  <a:solidFill>
+                    <a:schemeClr val="tx1"/>
+                  </a:solidFill>
+                  <a:latin typeface="Times New Roman" panose="02020603050405020304" pitchFamily="18" charset="0"/>
+                  <a:cs typeface="Times New Roman" panose="02020603050405020304" pitchFamily="18" charset="0"/>
+                </a:endParaRPr>
+              </a:p>
+            </p:txBody>
+          </p:sp>
+        </mc:Choice>
+        <mc:Fallback>
+          <p:sp>
+            <p:nvSpPr>
+              <p:cNvPr id="4" name="Rectangle: Rounded Corners 3">
+                <a:extLst>
+                  <a:ext uri="{FF2B5EF4-FFF2-40B4-BE49-F238E27FC236}">
+                    <a16:creationId xmlns:a16="http://schemas.microsoft.com/office/drawing/2014/main" id="{8384E9F1-34E6-B84A-E65C-E1704BDA6499}"/>
+                  </a:ext>
+                </a:extLst>
+              </p:cNvPr>
+              <p:cNvSpPr>
+                <a:spLocks noRot="1" noChangeAspect="1" noMove="1" noResize="1" noEditPoints="1" noAdjustHandles="1" noChangeArrowheads="1" noChangeShapeType="1" noTextEdit="1"/>
+              </p:cNvSpPr>
+              <p:nvPr/>
+            </p:nvSpPr>
+            <p:spPr>
+              <a:xfrm>
+                <a:off x="2523436" y="1501417"/>
+                <a:ext cx="2050544" cy="430028"/>
+              </a:xfrm>
+              <a:prstGeom prst="roundRect">
+                <a:avLst/>
+              </a:prstGeom>
+              <a:blipFill>
+                <a:blip r:embed="rId2"/>
+                <a:stretch>
+                  <a:fillRect l="-15385" t="-117808" b="-167123"/>
+                </a:stretch>
+              </a:blipFill>
+              <a:ln>
+                <a:solidFill>
+                  <a:schemeClr val="tx1"/>
+                </a:solidFill>
+              </a:ln>
+            </p:spPr>
+            <p:txBody>
+              <a:bodyPr/>
+              <a:lstStyle/>
+              <a:p>
+                <a:r>
+                  <a:rPr lang="en-US">
+                    <a:noFill/>
+                  </a:rPr>
+                  <a:t> </a:t>
+                </a:r>
+              </a:p>
+            </p:txBody>
+          </p:sp>
+        </mc:Fallback>
+      </mc:AlternateContent>
+      <p:sp>
+        <p:nvSpPr>
+          <p:cNvPr id="5" name="TextBox 4">
+            <a:extLst>
+              <a:ext uri="{FF2B5EF4-FFF2-40B4-BE49-F238E27FC236}">
+                <a16:creationId xmlns:a16="http://schemas.microsoft.com/office/drawing/2014/main" id="{1B0AC573-193C-8857-028B-81B2E92A5373}"/>
+              </a:ext>
+            </a:extLst>
+          </p:cNvPr>
+          <p:cNvSpPr txBox="1"/>
+          <p:nvPr/>
+        </p:nvSpPr>
+        <p:spPr>
+          <a:xfrm>
+            <a:off x="9453495" y="793101"/>
+            <a:ext cx="3449782" cy="923330"/>
+          </a:xfrm>
+          <a:prstGeom prst="rect">
+            <a:avLst/>
+          </a:prstGeom>
+          <a:noFill/>
+        </p:spPr>
+        <p:txBody>
+          <a:bodyPr wrap="square" rtlCol="0">
+            <a:spAutoFit/>
+          </a:bodyPr>
+          <a:lstStyle/>
+          <a:p>
+            <a:r>
+              <a:rPr lang="en-US" dirty="0"/>
+              <a:t>models = light blue</a:t>
+            </a:r>
+          </a:p>
+          <a:p>
+            <a:r>
+              <a:rPr lang="en-US" dirty="0"/>
+              <a:t>Datasets = light green</a:t>
+            </a:r>
+          </a:p>
+          <a:p>
+            <a:r>
+              <a:rPr lang="en-US" dirty="0"/>
+              <a:t>formulas = light yellow</a:t>
+            </a:r>
+          </a:p>
+        </p:txBody>
+      </p:sp>
+      <mc:AlternateContent xmlns:mc="http://schemas.openxmlformats.org/markup-compatibility/2006">
+        <mc:Choice xmlns:a14="http://schemas.microsoft.com/office/drawing/2010/main" Requires="a14">
+          <p:sp>
+            <p:nvSpPr>
+              <p:cNvPr id="6" name="Rectangle: Rounded Corners 5">
+                <a:extLst>
+                  <a:ext uri="{FF2B5EF4-FFF2-40B4-BE49-F238E27FC236}">
+                    <a16:creationId xmlns:a16="http://schemas.microsoft.com/office/drawing/2014/main" id="{249F819B-AA25-04A3-1BDD-69AD24EF5029}"/>
+                  </a:ext>
+                </a:extLst>
+              </p:cNvPr>
+              <p:cNvSpPr/>
+              <p:nvPr/>
+            </p:nvSpPr>
+            <p:spPr>
+              <a:xfrm>
+                <a:off x="2523436" y="3081635"/>
+                <a:ext cx="2050544" cy="430028"/>
+              </a:xfrm>
+              <a:prstGeom prst="roundRect">
+                <a:avLst/>
+              </a:prstGeom>
+              <a:solidFill>
+                <a:schemeClr val="accent4">
+                  <a:lumMod val="60000"/>
+                  <a:lumOff val="40000"/>
+                </a:schemeClr>
+              </a:solidFill>
+              <a:ln>
+                <a:solidFill>
+                  <a:schemeClr val="tx1"/>
+                </a:solidFill>
+              </a:ln>
+            </p:spPr>
+            <p:style>
+              <a:lnRef idx="2">
+                <a:schemeClr val="accent3">
+                  <a:shade val="50000"/>
+                </a:schemeClr>
+              </a:lnRef>
+              <a:fillRef idx="1">
+                <a:schemeClr val="accent3"/>
+              </a:fillRef>
+              <a:effectRef idx="0">
+                <a:schemeClr val="accent3"/>
+              </a:effectRef>
+              <a:fontRef idx="minor">
+                <a:schemeClr val="lt1"/>
+              </a:fontRef>
+            </p:style>
+            <p:txBody>
+              <a:bodyPr rtlCol="0" anchor="ctr"/>
+              <a:lstStyle/>
+              <a:p>
+                <a:pPr algn="ctr"/>
+                <a14:m>
+                  <m:oMathPara xmlns:m="http://schemas.openxmlformats.org/officeDocument/2006/math">
+                    <m:oMathParaPr>
+                      <m:jc m:val="centerGroup"/>
+                    </m:oMathParaPr>
+                    <m:oMath xmlns:m="http://schemas.openxmlformats.org/officeDocument/2006/math">
+                      <m:nary>
+                        <m:naryPr>
+                          <m:chr m:val="∑"/>
+                          <m:supHide m:val="on"/>
+                          <m:ctrlPr>
+                            <a:rPr lang="en-US" sz="1000" b="0" i="1" smtClean="0">
+                              <a:solidFill>
+                                <a:schemeClr val="tx1"/>
+                              </a:solidFill>
+                              <a:latin typeface="Cambria Math" panose="02040503050406030204" pitchFamily="18" charset="0"/>
+                              <a:cs typeface="Times New Roman" panose="02020603050405020304" pitchFamily="18" charset="0"/>
+                            </a:rPr>
+                          </m:ctrlPr>
+                        </m:naryPr>
+                        <m:sub>
+                          <m:r>
+                            <a:rPr lang="en-US" sz="1000" b="0" i="1" smtClean="0">
+                              <a:solidFill>
+                                <a:schemeClr val="tx1"/>
+                              </a:solidFill>
+                              <a:latin typeface="Cambria Math" panose="02040503050406030204" pitchFamily="18" charset="0"/>
+                              <a:cs typeface="Times New Roman" panose="02020603050405020304" pitchFamily="18" charset="0"/>
+                            </a:rPr>
+                            <m:t>𝐷</m:t>
+                          </m:r>
+                        </m:sub>
+                        <m:sup/>
+                        <m:e>
+                          <m:sSub>
+                            <m:sSubPr>
+                              <m:ctrlPr>
+                                <a:rPr lang="en-US" sz="1000" b="0" i="1" smtClean="0">
+                                  <a:solidFill>
+                                    <a:schemeClr val="tx1"/>
+                                  </a:solidFill>
+                                  <a:latin typeface="Cambria Math" panose="02040503050406030204" pitchFamily="18" charset="0"/>
+                                  <a:cs typeface="Times New Roman" panose="02020603050405020304" pitchFamily="18" charset="0"/>
+                                </a:rPr>
+                              </m:ctrlPr>
+                            </m:sSubPr>
+                            <m:e>
+                              <m:r>
+                                <a:rPr lang="en-US" sz="1000" b="0" i="1" smtClean="0">
+                                  <a:solidFill>
+                                    <a:schemeClr val="tx1"/>
+                                  </a:solidFill>
+                                  <a:latin typeface="Cambria Math" panose="02040503050406030204" pitchFamily="18" charset="0"/>
+                                  <a:cs typeface="Times New Roman" panose="02020603050405020304" pitchFamily="18" charset="0"/>
+                                </a:rPr>
+                                <m:t>𝜋</m:t>
+                              </m:r>
+                            </m:e>
+                            <m:sub>
+                              <m:r>
+                                <a:rPr lang="en-US" sz="1000" b="0" i="1" smtClean="0">
+                                  <a:solidFill>
+                                    <a:schemeClr val="tx1"/>
+                                  </a:solidFill>
+                                  <a:latin typeface="Cambria Math" panose="02040503050406030204" pitchFamily="18" charset="0"/>
+                                  <a:cs typeface="Times New Roman" panose="02020603050405020304" pitchFamily="18" charset="0"/>
+                                </a:rPr>
+                                <m:t>𝜃</m:t>
+                              </m:r>
+                            </m:sub>
+                          </m:sSub>
+                          <m:r>
+                            <a:rPr lang="en-US" sz="1000" b="0" i="1" smtClean="0">
+                              <a:solidFill>
+                                <a:schemeClr val="tx1"/>
+                              </a:solidFill>
+                              <a:latin typeface="Cambria Math" panose="02040503050406030204" pitchFamily="18" charset="0"/>
+                              <a:cs typeface="Times New Roman" panose="02020603050405020304" pitchFamily="18" charset="0"/>
+                            </a:rPr>
+                            <m:t>(</m:t>
+                          </m:r>
+                          <m:r>
+                            <a:rPr lang="en-US" sz="1000" b="0" i="1" smtClean="0">
+                              <a:solidFill>
+                                <a:schemeClr val="tx1"/>
+                              </a:solidFill>
+                              <a:latin typeface="Cambria Math" panose="02040503050406030204" pitchFamily="18" charset="0"/>
+                              <a:cs typeface="Times New Roman" panose="02020603050405020304" pitchFamily="18" charset="0"/>
+                            </a:rPr>
+                            <m:t>𝑠</m:t>
+                          </m:r>
+                          <m:r>
+                            <a:rPr lang="en-US" sz="1000" b="0" i="1" smtClean="0">
+                              <a:solidFill>
+                                <a:schemeClr val="tx1"/>
+                              </a:solidFill>
+                              <a:latin typeface="Cambria Math" panose="02040503050406030204" pitchFamily="18" charset="0"/>
+                              <a:cs typeface="Times New Roman" panose="02020603050405020304" pitchFamily="18" charset="0"/>
+                            </a:rPr>
+                            <m:t>)</m:t>
+                          </m:r>
+                        </m:e>
+                      </m:nary>
+                      <m:r>
+                        <a:rPr lang="en-US" sz="1000" b="0" i="1" smtClean="0">
+                          <a:solidFill>
+                            <a:schemeClr val="tx1"/>
+                          </a:solidFill>
+                          <a:latin typeface="Cambria Math" panose="02040503050406030204" pitchFamily="18" charset="0"/>
+                          <a:cs typeface="Times New Roman" panose="02020603050405020304" pitchFamily="18" charset="0"/>
+                        </a:rPr>
+                        <m:t>=</m:t>
+                      </m:r>
+                      <m:sSub>
+                        <m:sSubPr>
+                          <m:ctrlPr>
+                            <a:rPr lang="en-US" sz="1000" b="0" i="1" smtClean="0">
+                              <a:solidFill>
+                                <a:schemeClr val="tx1"/>
+                              </a:solidFill>
+                              <a:latin typeface="Cambria Math" panose="02040503050406030204" pitchFamily="18" charset="0"/>
+                              <a:cs typeface="Times New Roman" panose="02020603050405020304" pitchFamily="18" charset="0"/>
+                            </a:rPr>
+                          </m:ctrlPr>
+                        </m:sSubPr>
+                        <m:e>
+                          <m:r>
+                            <a:rPr lang="en-US" sz="1000" b="0" i="1" smtClean="0">
+                              <a:solidFill>
+                                <a:schemeClr val="tx1"/>
+                              </a:solidFill>
+                              <a:latin typeface="Cambria Math" panose="02040503050406030204" pitchFamily="18" charset="0"/>
+                              <a:cs typeface="Times New Roman" panose="02020603050405020304" pitchFamily="18" charset="0"/>
+                            </a:rPr>
+                            <m:t>𝜇</m:t>
+                          </m:r>
+                        </m:e>
+                        <m:sub>
+                          <m:acc>
+                            <m:accPr>
+                              <m:chr m:val="̃"/>
+                              <m:ctrlPr>
+                                <a:rPr lang="en-US" sz="1000" b="0" i="1" smtClean="0">
+                                  <a:solidFill>
+                                    <a:schemeClr val="tx1"/>
+                                  </a:solidFill>
+                                  <a:latin typeface="Cambria Math" panose="02040503050406030204" pitchFamily="18" charset="0"/>
+                                  <a:cs typeface="Times New Roman" panose="02020603050405020304" pitchFamily="18" charset="0"/>
+                                </a:rPr>
+                              </m:ctrlPr>
+                            </m:accPr>
+                            <m:e>
+                              <m:r>
+                                <a:rPr lang="en-US" sz="1000" b="0" i="1" smtClean="0">
+                                  <a:solidFill>
+                                    <a:schemeClr val="tx1"/>
+                                  </a:solidFill>
+                                  <a:latin typeface="Cambria Math" panose="02040503050406030204" pitchFamily="18" charset="0"/>
+                                  <a:cs typeface="Times New Roman" panose="02020603050405020304" pitchFamily="18" charset="0"/>
+                                </a:rPr>
+                                <m:t>𝑎</m:t>
+                              </m:r>
+                            </m:e>
+                          </m:acc>
+                        </m:sub>
+                      </m:sSub>
+                      <m:r>
+                        <a:rPr lang="en-US" sz="1000" b="0" i="1" smtClean="0">
+                          <a:solidFill>
+                            <a:schemeClr val="tx1"/>
+                          </a:solidFill>
+                          <a:latin typeface="Cambria Math" panose="02040503050406030204" pitchFamily="18" charset="0"/>
+                          <a:cs typeface="Times New Roman" panose="02020603050405020304" pitchFamily="18" charset="0"/>
+                        </a:rPr>
+                        <m:t>, </m:t>
+                      </m:r>
+                      <m:sSub>
+                        <m:sSubPr>
+                          <m:ctrlPr>
+                            <a:rPr lang="en-US" sz="1000" b="0" i="1" smtClean="0">
+                              <a:solidFill>
+                                <a:schemeClr val="tx1"/>
+                              </a:solidFill>
+                              <a:latin typeface="Cambria Math" panose="02040503050406030204" pitchFamily="18" charset="0"/>
+                              <a:cs typeface="Times New Roman" panose="02020603050405020304" pitchFamily="18" charset="0"/>
+                            </a:rPr>
+                          </m:ctrlPr>
+                        </m:sSubPr>
+                        <m:e>
+                          <m:r>
+                            <a:rPr lang="en-US" sz="1000" b="0" i="1" smtClean="0">
+                              <a:solidFill>
+                                <a:schemeClr val="tx1"/>
+                              </a:solidFill>
+                              <a:latin typeface="Cambria Math" panose="02040503050406030204" pitchFamily="18" charset="0"/>
+                              <a:cs typeface="Times New Roman" panose="02020603050405020304" pitchFamily="18" charset="0"/>
+                            </a:rPr>
+                            <m:t>𝜎</m:t>
+                          </m:r>
+                        </m:e>
+                        <m:sub>
+                          <m:acc>
+                            <m:accPr>
+                              <m:chr m:val="̃"/>
+                              <m:ctrlPr>
+                                <a:rPr lang="en-US" sz="1000" b="0" i="1" smtClean="0">
+                                  <a:solidFill>
+                                    <a:schemeClr val="tx1"/>
+                                  </a:solidFill>
+                                  <a:latin typeface="Cambria Math" panose="02040503050406030204" pitchFamily="18" charset="0"/>
+                                  <a:cs typeface="Times New Roman" panose="02020603050405020304" pitchFamily="18" charset="0"/>
+                                </a:rPr>
+                              </m:ctrlPr>
+                            </m:accPr>
+                            <m:e>
+                              <m:r>
+                                <a:rPr lang="en-US" sz="1000" b="0" i="1" smtClean="0">
+                                  <a:solidFill>
+                                    <a:schemeClr val="tx1"/>
+                                  </a:solidFill>
+                                  <a:latin typeface="Cambria Math" panose="02040503050406030204" pitchFamily="18" charset="0"/>
+                                  <a:cs typeface="Times New Roman" panose="02020603050405020304" pitchFamily="18" charset="0"/>
+                                </a:rPr>
+                                <m:t>𝑎</m:t>
+                              </m:r>
+                            </m:e>
+                          </m:acc>
+                        </m:sub>
+                      </m:sSub>
+                      <m:r>
+                        <a:rPr lang="en-US" sz="1000" b="0" i="1" smtClean="0">
+                          <a:solidFill>
+                            <a:schemeClr val="tx1"/>
+                          </a:solidFill>
+                          <a:latin typeface="Cambria Math" panose="02040503050406030204" pitchFamily="18" charset="0"/>
+                          <a:cs typeface="Times New Roman" panose="02020603050405020304" pitchFamily="18" charset="0"/>
+                        </a:rPr>
+                        <m:t> →</m:t>
+                      </m:r>
+                      <m:acc>
+                        <m:accPr>
+                          <m:chr m:val="̂"/>
+                          <m:ctrlPr>
+                            <a:rPr lang="en-US" sz="1000" b="0" i="1" smtClean="0">
+                              <a:solidFill>
+                                <a:schemeClr val="tx1"/>
+                              </a:solidFill>
+                              <a:latin typeface="Cambria Math" panose="02040503050406030204" pitchFamily="18" charset="0"/>
+                              <a:cs typeface="Times New Roman" panose="02020603050405020304" pitchFamily="18" charset="0"/>
+                            </a:rPr>
+                          </m:ctrlPr>
+                        </m:accPr>
+                        <m:e>
+                          <m:sSub>
+                            <m:sSubPr>
+                              <m:ctrlPr>
+                                <a:rPr lang="en-US" sz="1000" b="0" i="1" smtClean="0">
+                                  <a:solidFill>
+                                    <a:schemeClr val="tx1"/>
+                                  </a:solidFill>
+                                  <a:latin typeface="Cambria Math" panose="02040503050406030204" pitchFamily="18" charset="0"/>
+                                  <a:cs typeface="Times New Roman" panose="02020603050405020304" pitchFamily="18" charset="0"/>
+                                </a:rPr>
+                              </m:ctrlPr>
+                            </m:sSubPr>
+                            <m:e>
+                              <m:r>
+                                <a:rPr lang="en-US" sz="1000" b="0" i="1" smtClean="0">
+                                  <a:solidFill>
+                                    <a:schemeClr val="tx1"/>
+                                  </a:solidFill>
+                                  <a:latin typeface="Cambria Math" panose="02040503050406030204" pitchFamily="18" charset="0"/>
+                                  <a:cs typeface="Times New Roman" panose="02020603050405020304" pitchFamily="18" charset="0"/>
+                                </a:rPr>
+                                <m:t>𝑄</m:t>
+                              </m:r>
+                            </m:e>
+                            <m:sub>
+                              <m:r>
+                                <a:rPr lang="en-US" sz="1000" b="0" i="1" smtClean="0">
+                                  <a:solidFill>
+                                    <a:schemeClr val="tx1"/>
+                                  </a:solidFill>
+                                  <a:latin typeface="Cambria Math" panose="02040503050406030204" pitchFamily="18" charset="0"/>
+                                  <a:cs typeface="Times New Roman" panose="02020603050405020304" pitchFamily="18" charset="0"/>
+                                </a:rPr>
+                                <m:t>𝜙</m:t>
+                              </m:r>
+                            </m:sub>
+                          </m:sSub>
+                        </m:e>
+                      </m:acc>
+                      <m:r>
+                        <a:rPr lang="en-US" sz="1000" b="0" i="1" smtClean="0">
+                          <a:solidFill>
+                            <a:schemeClr val="tx1"/>
+                          </a:solidFill>
+                          <a:latin typeface="Cambria Math" panose="02040503050406030204" pitchFamily="18" charset="0"/>
+                          <a:cs typeface="Times New Roman" panose="02020603050405020304" pitchFamily="18" charset="0"/>
+                        </a:rPr>
+                        <m:t>(</m:t>
+                      </m:r>
+                      <m:r>
+                        <a:rPr lang="en-US" sz="1000" b="0" i="1" smtClean="0">
+                          <a:solidFill>
+                            <a:schemeClr val="tx1"/>
+                          </a:solidFill>
+                          <a:latin typeface="Cambria Math" panose="02040503050406030204" pitchFamily="18" charset="0"/>
+                          <a:cs typeface="Times New Roman" panose="02020603050405020304" pitchFamily="18" charset="0"/>
+                        </a:rPr>
+                        <m:t>𝑠</m:t>
+                      </m:r>
+                      <m:r>
+                        <a:rPr lang="en-US" sz="1000" b="0" i="1" smtClean="0">
+                          <a:solidFill>
+                            <a:schemeClr val="tx1"/>
+                          </a:solidFill>
+                          <a:latin typeface="Cambria Math" panose="02040503050406030204" pitchFamily="18" charset="0"/>
+                          <a:cs typeface="Times New Roman" panose="02020603050405020304" pitchFamily="18" charset="0"/>
+                        </a:rPr>
+                        <m:t>,</m:t>
+                      </m:r>
+                      <m:acc>
+                        <m:accPr>
+                          <m:chr m:val="̃"/>
+                          <m:ctrlPr>
+                            <a:rPr lang="en-US" sz="1000" b="0" i="1" smtClean="0">
+                              <a:solidFill>
+                                <a:schemeClr val="tx1"/>
+                              </a:solidFill>
+                              <a:latin typeface="Cambria Math" panose="02040503050406030204" pitchFamily="18" charset="0"/>
+                              <a:cs typeface="Times New Roman" panose="02020603050405020304" pitchFamily="18" charset="0"/>
+                            </a:rPr>
+                          </m:ctrlPr>
+                        </m:accPr>
+                        <m:e>
+                          <m:r>
+                            <a:rPr lang="en-US" sz="1000" b="0" i="1" smtClean="0">
+                              <a:solidFill>
+                                <a:schemeClr val="tx1"/>
+                              </a:solidFill>
+                              <a:latin typeface="Cambria Math" panose="02040503050406030204" pitchFamily="18" charset="0"/>
+                              <a:cs typeface="Times New Roman" panose="02020603050405020304" pitchFamily="18" charset="0"/>
+                            </a:rPr>
+                            <m:t>𝑎</m:t>
+                          </m:r>
+                        </m:e>
+                      </m:acc>
+                      <m:r>
+                        <a:rPr lang="en-US" sz="1000" b="0" i="1" smtClean="0">
+                          <a:solidFill>
+                            <a:schemeClr val="tx1"/>
+                          </a:solidFill>
+                          <a:latin typeface="Cambria Math" panose="02040503050406030204" pitchFamily="18" charset="0"/>
+                          <a:cs typeface="Times New Roman" panose="02020603050405020304" pitchFamily="18" charset="0"/>
+                        </a:rPr>
+                        <m:t>)</m:t>
+                      </m:r>
+                    </m:oMath>
+                  </m:oMathPara>
+                </a14:m>
+                <a:endParaRPr lang="en-US" sz="1000" dirty="0">
+                  <a:solidFill>
+                    <a:schemeClr val="tx1"/>
+                  </a:solidFill>
+                  <a:latin typeface="Times New Roman" panose="02020603050405020304" pitchFamily="18" charset="0"/>
+                  <a:cs typeface="Times New Roman" panose="02020603050405020304" pitchFamily="18" charset="0"/>
+                </a:endParaRPr>
+              </a:p>
+            </p:txBody>
+          </p:sp>
+        </mc:Choice>
+        <mc:Fallback>
+          <p:sp>
+            <p:nvSpPr>
+              <p:cNvPr id="6" name="Rectangle: Rounded Corners 5">
+                <a:extLst>
+                  <a:ext uri="{FF2B5EF4-FFF2-40B4-BE49-F238E27FC236}">
+                    <a16:creationId xmlns:a16="http://schemas.microsoft.com/office/drawing/2014/main" id="{249F819B-AA25-04A3-1BDD-69AD24EF5029}"/>
+                  </a:ext>
+                </a:extLst>
+              </p:cNvPr>
+              <p:cNvSpPr>
+                <a:spLocks noRot="1" noChangeAspect="1" noMove="1" noResize="1" noEditPoints="1" noAdjustHandles="1" noChangeArrowheads="1" noChangeShapeType="1" noTextEdit="1"/>
+              </p:cNvSpPr>
+              <p:nvPr/>
+            </p:nvSpPr>
+            <p:spPr>
+              <a:xfrm>
+                <a:off x="2523436" y="3081635"/>
+                <a:ext cx="2050544" cy="430028"/>
+              </a:xfrm>
+              <a:prstGeom prst="roundRect">
+                <a:avLst/>
+              </a:prstGeom>
+              <a:blipFill>
+                <a:blip r:embed="rId3"/>
+                <a:stretch>
+                  <a:fillRect l="-14201" t="-120833" b="-169444"/>
+                </a:stretch>
+              </a:blipFill>
+              <a:ln>
+                <a:solidFill>
+                  <a:schemeClr val="tx1"/>
+                </a:solidFill>
+              </a:ln>
+            </p:spPr>
+            <p:txBody>
+              <a:bodyPr/>
+              <a:lstStyle/>
+              <a:p>
+                <a:r>
+                  <a:rPr lang="en-US">
+                    <a:noFill/>
+                  </a:rPr>
+                  <a:t> </a:t>
+                </a:r>
+              </a:p>
+            </p:txBody>
+          </p:sp>
+        </mc:Fallback>
+      </mc:AlternateContent>
+      <mc:AlternateContent xmlns:mc="http://schemas.openxmlformats.org/markup-compatibility/2006">
+        <mc:Choice xmlns:a14="http://schemas.microsoft.com/office/drawing/2010/main" Requires="a14">
+          <p:sp>
+            <p:nvSpPr>
+              <p:cNvPr id="7" name="Rectangle: Rounded Corners 6">
+                <a:extLst>
+                  <a:ext uri="{FF2B5EF4-FFF2-40B4-BE49-F238E27FC236}">
+                    <a16:creationId xmlns:a16="http://schemas.microsoft.com/office/drawing/2014/main" id="{A757DCEF-0E1E-7AF4-1F2C-1F9CCA7E26B2}"/>
+                  </a:ext>
+                </a:extLst>
+              </p:cNvPr>
+              <p:cNvSpPr/>
+              <p:nvPr/>
+            </p:nvSpPr>
+            <p:spPr>
+              <a:xfrm>
+                <a:off x="2523436" y="2291526"/>
+                <a:ext cx="2050544" cy="430028"/>
+              </a:xfrm>
+              <a:prstGeom prst="roundRect">
+                <a:avLst/>
+              </a:prstGeom>
+              <a:solidFill>
+                <a:schemeClr val="accent1">
+                  <a:lumMod val="60000"/>
+                  <a:lumOff val="40000"/>
+                </a:schemeClr>
+              </a:solidFill>
+              <a:ln>
+                <a:solidFill>
+                  <a:schemeClr val="tx1"/>
+                </a:solidFill>
+              </a:ln>
+            </p:spPr>
+            <p:style>
+              <a:lnRef idx="2">
+                <a:schemeClr val="accent3">
+                  <a:shade val="50000"/>
+                </a:schemeClr>
+              </a:lnRef>
+              <a:fillRef idx="1">
+                <a:schemeClr val="accent3"/>
+              </a:fillRef>
+              <a:effectRef idx="0">
+                <a:schemeClr val="accent3"/>
+              </a:effectRef>
+              <a:fontRef idx="minor">
+                <a:schemeClr val="lt1"/>
+              </a:fontRef>
+            </p:style>
+            <p:txBody>
+              <a:bodyPr rtlCol="0" anchor="ctr"/>
+              <a:lstStyle/>
+              <a:p>
+                <a:pPr algn="ctr"/>
+                <a:r>
+                  <a:rPr lang="en-US" sz="1000" dirty="0">
+                    <a:solidFill>
+                      <a:schemeClr val="tx1"/>
+                    </a:solidFill>
+                    <a:latin typeface="Times New Roman" panose="02020603050405020304" pitchFamily="18" charset="0"/>
+                    <a:cs typeface="Times New Roman" panose="02020603050405020304" pitchFamily="18" charset="0"/>
+                  </a:rPr>
+                  <a:t>Train main Q-networks:</a:t>
+                </a:r>
+              </a:p>
+              <a:p>
+                <a:pPr algn="ctr"/>
+                <a14:m>
+                  <m:oMathPara xmlns:m="http://schemas.openxmlformats.org/officeDocument/2006/math">
+                    <m:oMathParaPr>
+                      <m:jc m:val="centerGroup"/>
+                    </m:oMathParaPr>
+                    <m:oMath xmlns:m="http://schemas.openxmlformats.org/officeDocument/2006/math">
+                      <m:r>
+                        <a:rPr lang="en-US" sz="1000" i="1" smtClean="0">
+                          <a:solidFill>
+                            <a:schemeClr val="tx1"/>
+                          </a:solidFill>
+                          <a:latin typeface="Cambria Math" panose="02040503050406030204" pitchFamily="18" charset="0"/>
+                          <a:ea typeface="Cambria Math" panose="02040503050406030204" pitchFamily="18" charset="0"/>
+                          <a:cs typeface="Times New Roman" panose="02020603050405020304" pitchFamily="18" charset="0"/>
+                        </a:rPr>
+                        <m:t>ℒ</m:t>
+                      </m:r>
+                      <m:d>
+                        <m:dPr>
+                          <m:ctrlPr>
+                            <a:rPr lang="en-US" sz="1000" b="0" i="1" smtClean="0">
+                              <a:solidFill>
+                                <a:schemeClr val="tx1"/>
+                              </a:solidFill>
+                              <a:latin typeface="Cambria Math" panose="02040503050406030204" pitchFamily="18" charset="0"/>
+                              <a:ea typeface="Cambria Math" panose="02040503050406030204" pitchFamily="18" charset="0"/>
+                              <a:cs typeface="Times New Roman" panose="02020603050405020304" pitchFamily="18" charset="0"/>
+                            </a:rPr>
+                          </m:ctrlPr>
+                        </m:dPr>
+                        <m:e>
+                          <m:r>
+                            <a:rPr lang="en-US" sz="1000" b="0" i="1" smtClean="0">
+                              <a:solidFill>
+                                <a:schemeClr val="tx1"/>
+                              </a:solidFill>
+                              <a:latin typeface="Cambria Math" panose="02040503050406030204" pitchFamily="18" charset="0"/>
+                              <a:ea typeface="Cambria Math" panose="02040503050406030204" pitchFamily="18" charset="0"/>
+                              <a:cs typeface="Times New Roman" panose="02020603050405020304" pitchFamily="18" charset="0"/>
+                            </a:rPr>
+                            <m:t>𝜙</m:t>
+                          </m:r>
+                          <m:r>
+                            <a:rPr lang="en-US" sz="1000" b="0" i="1" smtClean="0">
+                              <a:solidFill>
+                                <a:schemeClr val="tx1"/>
+                              </a:solidFill>
+                              <a:latin typeface="Cambria Math" panose="02040503050406030204" pitchFamily="18" charset="0"/>
+                              <a:ea typeface="Cambria Math" panose="02040503050406030204" pitchFamily="18" charset="0"/>
+                              <a:cs typeface="Times New Roman" panose="02020603050405020304" pitchFamily="18" charset="0"/>
+                            </a:rPr>
+                            <m:t>,</m:t>
+                          </m:r>
+                          <m:r>
+                            <a:rPr lang="en-US" sz="1000" b="0" i="1" smtClean="0">
+                              <a:solidFill>
+                                <a:schemeClr val="tx1"/>
+                              </a:solidFill>
+                              <a:latin typeface="Cambria Math" panose="02040503050406030204" pitchFamily="18" charset="0"/>
+                              <a:ea typeface="Cambria Math" panose="02040503050406030204" pitchFamily="18" charset="0"/>
+                              <a:cs typeface="Times New Roman" panose="02020603050405020304" pitchFamily="18" charset="0"/>
+                            </a:rPr>
+                            <m:t>𝐷</m:t>
+                          </m:r>
+                        </m:e>
+                      </m:d>
+                      <m:r>
+                        <a:rPr lang="en-US" sz="1000" b="0" i="1" smtClean="0">
+                          <a:solidFill>
+                            <a:schemeClr val="tx1"/>
+                          </a:solidFill>
+                          <a:latin typeface="Cambria Math" panose="02040503050406030204" pitchFamily="18" charset="0"/>
+                          <a:ea typeface="Cambria Math" panose="02040503050406030204" pitchFamily="18" charset="0"/>
+                          <a:cs typeface="Times New Roman" panose="02020603050405020304" pitchFamily="18" charset="0"/>
+                        </a:rPr>
+                        <m:t>→ </m:t>
+                      </m:r>
+                      <m:acc>
+                        <m:accPr>
+                          <m:chr m:val="̂"/>
+                          <m:ctrlPr>
+                            <a:rPr lang="en-US" sz="1000" b="0" i="1" smtClean="0">
+                              <a:solidFill>
+                                <a:schemeClr val="tx1"/>
+                              </a:solidFill>
+                              <a:latin typeface="Cambria Math" panose="02040503050406030204" pitchFamily="18" charset="0"/>
+                              <a:ea typeface="Cambria Math" panose="02040503050406030204" pitchFamily="18" charset="0"/>
+                              <a:cs typeface="Times New Roman" panose="02020603050405020304" pitchFamily="18" charset="0"/>
+                            </a:rPr>
+                          </m:ctrlPr>
+                        </m:accPr>
+                        <m:e>
+                          <m:sSub>
+                            <m:sSubPr>
+                              <m:ctrlPr>
+                                <a:rPr lang="en-US" sz="1000" b="0" i="1" smtClean="0">
+                                  <a:solidFill>
+                                    <a:schemeClr val="tx1"/>
+                                  </a:solidFill>
+                                  <a:latin typeface="Cambria Math" panose="02040503050406030204" pitchFamily="18" charset="0"/>
+                                  <a:ea typeface="Cambria Math" panose="02040503050406030204" pitchFamily="18" charset="0"/>
+                                  <a:cs typeface="Times New Roman" panose="02020603050405020304" pitchFamily="18" charset="0"/>
+                                </a:rPr>
+                              </m:ctrlPr>
+                            </m:sSubPr>
+                            <m:e>
+                              <m:r>
+                                <a:rPr lang="en-US" sz="1000" b="0" i="1" smtClean="0">
+                                  <a:solidFill>
+                                    <a:schemeClr val="tx1"/>
+                                  </a:solidFill>
+                                  <a:latin typeface="Cambria Math" panose="02040503050406030204" pitchFamily="18" charset="0"/>
+                                  <a:ea typeface="Cambria Math" panose="02040503050406030204" pitchFamily="18" charset="0"/>
+                                  <a:cs typeface="Times New Roman" panose="02020603050405020304" pitchFamily="18" charset="0"/>
+                                </a:rPr>
+                                <m:t>𝑄</m:t>
+                              </m:r>
+                            </m:e>
+                            <m:sub>
+                              <m:r>
+                                <a:rPr lang="en-US" sz="1000" b="0" i="1" smtClean="0">
+                                  <a:solidFill>
+                                    <a:schemeClr val="tx1"/>
+                                  </a:solidFill>
+                                  <a:latin typeface="Cambria Math" panose="02040503050406030204" pitchFamily="18" charset="0"/>
+                                  <a:ea typeface="Cambria Math" panose="02040503050406030204" pitchFamily="18" charset="0"/>
+                                  <a:cs typeface="Times New Roman" panose="02020603050405020304" pitchFamily="18" charset="0"/>
+                                </a:rPr>
+                                <m:t>𝜙</m:t>
+                              </m:r>
+                            </m:sub>
+                          </m:sSub>
+                        </m:e>
+                      </m:acc>
+                      <m:r>
+                        <a:rPr lang="en-US" sz="1000" b="0" i="1" smtClean="0">
+                          <a:solidFill>
+                            <a:schemeClr val="tx1"/>
+                          </a:solidFill>
+                          <a:latin typeface="Cambria Math" panose="02040503050406030204" pitchFamily="18" charset="0"/>
+                          <a:ea typeface="Cambria Math" panose="02040503050406030204" pitchFamily="18" charset="0"/>
+                          <a:cs typeface="Times New Roman" panose="02020603050405020304" pitchFamily="18" charset="0"/>
+                        </a:rPr>
+                        <m:t>(</m:t>
+                      </m:r>
+                      <m:r>
+                        <a:rPr lang="en-US" sz="1000" b="0" i="1" smtClean="0">
+                          <a:solidFill>
+                            <a:schemeClr val="tx1"/>
+                          </a:solidFill>
+                          <a:latin typeface="Cambria Math" panose="02040503050406030204" pitchFamily="18" charset="0"/>
+                          <a:ea typeface="Cambria Math" panose="02040503050406030204" pitchFamily="18" charset="0"/>
+                          <a:cs typeface="Times New Roman" panose="02020603050405020304" pitchFamily="18" charset="0"/>
+                        </a:rPr>
+                        <m:t>𝑠</m:t>
+                      </m:r>
+                      <m:r>
+                        <a:rPr lang="en-US" sz="1000" b="0" i="1" smtClean="0">
+                          <a:solidFill>
+                            <a:schemeClr val="tx1"/>
+                          </a:solidFill>
+                          <a:latin typeface="Cambria Math" panose="02040503050406030204" pitchFamily="18" charset="0"/>
+                          <a:ea typeface="Cambria Math" panose="02040503050406030204" pitchFamily="18" charset="0"/>
+                          <a:cs typeface="Times New Roman" panose="02020603050405020304" pitchFamily="18" charset="0"/>
+                        </a:rPr>
+                        <m:t>,</m:t>
+                      </m:r>
+                      <m:r>
+                        <a:rPr lang="en-US" sz="1000" b="0" i="1" smtClean="0">
+                          <a:solidFill>
+                            <a:schemeClr val="tx1"/>
+                          </a:solidFill>
+                          <a:latin typeface="Cambria Math" panose="02040503050406030204" pitchFamily="18" charset="0"/>
+                          <a:ea typeface="Cambria Math" panose="02040503050406030204" pitchFamily="18" charset="0"/>
+                          <a:cs typeface="Times New Roman" panose="02020603050405020304" pitchFamily="18" charset="0"/>
+                        </a:rPr>
+                        <m:t>𝑎</m:t>
+                      </m:r>
+                      <m:r>
+                        <a:rPr lang="en-US" sz="1000" b="0" i="1" smtClean="0">
+                          <a:solidFill>
+                            <a:schemeClr val="tx1"/>
+                          </a:solidFill>
+                          <a:latin typeface="Cambria Math" panose="02040503050406030204" pitchFamily="18" charset="0"/>
+                          <a:ea typeface="Cambria Math" panose="02040503050406030204" pitchFamily="18" charset="0"/>
+                          <a:cs typeface="Times New Roman" panose="02020603050405020304" pitchFamily="18" charset="0"/>
+                        </a:rPr>
+                        <m:t>)</m:t>
+                      </m:r>
+                    </m:oMath>
+                  </m:oMathPara>
+                </a14:m>
+                <a:endParaRPr lang="en-US" sz="1000" dirty="0">
+                  <a:solidFill>
+                    <a:schemeClr val="tx1"/>
+                  </a:solidFill>
+                  <a:latin typeface="Times New Roman" panose="02020603050405020304" pitchFamily="18" charset="0"/>
+                  <a:cs typeface="Times New Roman" panose="02020603050405020304" pitchFamily="18" charset="0"/>
+                </a:endParaRPr>
+              </a:p>
+            </p:txBody>
+          </p:sp>
+        </mc:Choice>
+        <mc:Fallback>
+          <p:sp>
+            <p:nvSpPr>
+              <p:cNvPr id="7" name="Rectangle: Rounded Corners 6">
+                <a:extLst>
+                  <a:ext uri="{FF2B5EF4-FFF2-40B4-BE49-F238E27FC236}">
+                    <a16:creationId xmlns:a16="http://schemas.microsoft.com/office/drawing/2014/main" id="{A757DCEF-0E1E-7AF4-1F2C-1F9CCA7E26B2}"/>
+                  </a:ext>
+                </a:extLst>
+              </p:cNvPr>
+              <p:cNvSpPr>
+                <a:spLocks noRot="1" noChangeAspect="1" noMove="1" noResize="1" noEditPoints="1" noAdjustHandles="1" noChangeArrowheads="1" noChangeShapeType="1" noTextEdit="1"/>
+              </p:cNvSpPr>
+              <p:nvPr/>
+            </p:nvSpPr>
+            <p:spPr>
+              <a:xfrm>
+                <a:off x="2523436" y="2291526"/>
+                <a:ext cx="2050544" cy="430028"/>
+              </a:xfrm>
+              <a:prstGeom prst="roundRect">
+                <a:avLst/>
+              </a:prstGeom>
+              <a:blipFill>
+                <a:blip r:embed="rId4"/>
+                <a:stretch>
+                  <a:fillRect/>
+                </a:stretch>
+              </a:blipFill>
+              <a:ln>
+                <a:solidFill>
+                  <a:schemeClr val="tx1"/>
+                </a:solidFill>
+              </a:ln>
+            </p:spPr>
+            <p:txBody>
+              <a:bodyPr/>
+              <a:lstStyle/>
+              <a:p>
+                <a:r>
+                  <a:rPr lang="en-US">
+                    <a:noFill/>
+                  </a:rPr>
+                  <a:t> </a:t>
+                </a:r>
+              </a:p>
+            </p:txBody>
+          </p:sp>
+        </mc:Fallback>
+      </mc:AlternateContent>
+      <mc:AlternateContent xmlns:mc="http://schemas.openxmlformats.org/markup-compatibility/2006">
+        <mc:Choice xmlns:a14="http://schemas.microsoft.com/office/drawing/2010/main" Requires="a14">
+          <p:sp>
+            <p:nvSpPr>
+              <p:cNvPr id="8" name="Rectangle: Rounded Corners 7">
+                <a:extLst>
+                  <a:ext uri="{FF2B5EF4-FFF2-40B4-BE49-F238E27FC236}">
+                    <a16:creationId xmlns:a16="http://schemas.microsoft.com/office/drawing/2014/main" id="{EB261963-2E54-9617-DE3A-CD4161156E64}"/>
+                  </a:ext>
+                </a:extLst>
+              </p:cNvPr>
+              <p:cNvSpPr/>
+              <p:nvPr/>
+            </p:nvSpPr>
+            <p:spPr>
+              <a:xfrm>
+                <a:off x="2523436" y="3871744"/>
+                <a:ext cx="2050544" cy="430028"/>
+              </a:xfrm>
+              <a:prstGeom prst="roundRect">
+                <a:avLst/>
+              </a:prstGeom>
+              <a:solidFill>
+                <a:schemeClr val="accent1">
+                  <a:lumMod val="60000"/>
+                  <a:lumOff val="40000"/>
+                </a:schemeClr>
+              </a:solidFill>
+              <a:ln>
+                <a:solidFill>
+                  <a:schemeClr val="tx1"/>
+                </a:solidFill>
+              </a:ln>
+            </p:spPr>
+            <p:style>
+              <a:lnRef idx="2">
+                <a:schemeClr val="accent3">
+                  <a:shade val="50000"/>
+                </a:schemeClr>
+              </a:lnRef>
+              <a:fillRef idx="1">
+                <a:schemeClr val="accent3"/>
+              </a:fillRef>
+              <a:effectRef idx="0">
+                <a:schemeClr val="accent3"/>
+              </a:effectRef>
+              <a:fontRef idx="minor">
+                <a:schemeClr val="lt1"/>
+              </a:fontRef>
+            </p:style>
+            <p:txBody>
+              <a:bodyPr rtlCol="0" anchor="ctr"/>
+              <a:lstStyle/>
+              <a:p>
+                <a:pPr algn="ctr"/>
+                <a:r>
+                  <a:rPr lang="en-US" sz="1000" dirty="0">
+                    <a:solidFill>
+                      <a:schemeClr val="tx1"/>
+                    </a:solidFill>
+                    <a:latin typeface="Times New Roman" panose="02020603050405020304" pitchFamily="18" charset="0"/>
+                    <a:cs typeface="Times New Roman" panose="02020603050405020304" pitchFamily="18" charset="0"/>
+                  </a:rPr>
+                  <a:t>Train policy networks:</a:t>
+                </a:r>
+              </a:p>
+              <a:p>
+                <a:pPr algn="ctr"/>
+                <a14:m>
+                  <m:oMathPara xmlns:m="http://schemas.openxmlformats.org/officeDocument/2006/math">
+                    <m:oMathParaPr>
+                      <m:jc m:val="centerGroup"/>
+                    </m:oMathParaPr>
+                    <m:oMath xmlns:m="http://schemas.openxmlformats.org/officeDocument/2006/math">
+                      <m:r>
+                        <a:rPr lang="en-US" sz="1000" i="1" smtClean="0">
+                          <a:solidFill>
+                            <a:schemeClr val="tx1"/>
+                          </a:solidFill>
+                          <a:latin typeface="Cambria Math" panose="02040503050406030204" pitchFamily="18" charset="0"/>
+                          <a:ea typeface="Cambria Math" panose="02040503050406030204" pitchFamily="18" charset="0"/>
+                          <a:cs typeface="Times New Roman" panose="02020603050405020304" pitchFamily="18" charset="0"/>
+                        </a:rPr>
+                        <m:t>ℒ</m:t>
+                      </m:r>
+                      <m:d>
+                        <m:dPr>
+                          <m:ctrlPr>
+                            <a:rPr lang="en-US" sz="1000" b="0" i="1" smtClean="0">
+                              <a:solidFill>
+                                <a:schemeClr val="tx1"/>
+                              </a:solidFill>
+                              <a:latin typeface="Cambria Math" panose="02040503050406030204" pitchFamily="18" charset="0"/>
+                              <a:ea typeface="Cambria Math" panose="02040503050406030204" pitchFamily="18" charset="0"/>
+                              <a:cs typeface="Times New Roman" panose="02020603050405020304" pitchFamily="18" charset="0"/>
+                            </a:rPr>
+                          </m:ctrlPr>
+                        </m:dPr>
+                        <m:e>
+                          <m:r>
+                            <a:rPr lang="en-US" sz="1000" b="0" i="1" smtClean="0">
+                              <a:solidFill>
+                                <a:schemeClr val="tx1"/>
+                              </a:solidFill>
+                              <a:latin typeface="Cambria Math" panose="02040503050406030204" pitchFamily="18" charset="0"/>
+                              <a:ea typeface="Cambria Math" panose="02040503050406030204" pitchFamily="18" charset="0"/>
+                              <a:cs typeface="Times New Roman" panose="02020603050405020304" pitchFamily="18" charset="0"/>
+                            </a:rPr>
+                            <m:t>𝜃</m:t>
+                          </m:r>
+                          <m:r>
+                            <a:rPr lang="en-US" sz="1000" b="0" i="1" smtClean="0">
+                              <a:solidFill>
+                                <a:schemeClr val="tx1"/>
+                              </a:solidFill>
+                              <a:latin typeface="Cambria Math" panose="02040503050406030204" pitchFamily="18" charset="0"/>
+                              <a:ea typeface="Cambria Math" panose="02040503050406030204" pitchFamily="18" charset="0"/>
+                              <a:cs typeface="Times New Roman" panose="02020603050405020304" pitchFamily="18" charset="0"/>
+                            </a:rPr>
+                            <m:t>,</m:t>
+                          </m:r>
+                          <m:r>
+                            <a:rPr lang="en-US" sz="1000" b="0" i="1" smtClean="0">
+                              <a:solidFill>
+                                <a:schemeClr val="tx1"/>
+                              </a:solidFill>
+                              <a:latin typeface="Cambria Math" panose="02040503050406030204" pitchFamily="18" charset="0"/>
+                              <a:ea typeface="Cambria Math" panose="02040503050406030204" pitchFamily="18" charset="0"/>
+                              <a:cs typeface="Times New Roman" panose="02020603050405020304" pitchFamily="18" charset="0"/>
+                            </a:rPr>
+                            <m:t>𝐷</m:t>
+                          </m:r>
+                        </m:e>
+                      </m:d>
+                      <m:r>
+                        <a:rPr lang="en-US" sz="1000" b="0" i="1" smtClean="0">
+                          <a:solidFill>
+                            <a:schemeClr val="tx1"/>
+                          </a:solidFill>
+                          <a:latin typeface="Cambria Math" panose="02040503050406030204" pitchFamily="18" charset="0"/>
+                          <a:ea typeface="Cambria Math" panose="02040503050406030204" pitchFamily="18" charset="0"/>
+                          <a:cs typeface="Times New Roman" panose="02020603050405020304" pitchFamily="18" charset="0"/>
+                        </a:rPr>
+                        <m:t>→</m:t>
+                      </m:r>
+                      <m:sSub>
+                        <m:sSubPr>
+                          <m:ctrlPr>
+                            <a:rPr lang="en-US" sz="1000" b="0" i="1" smtClean="0">
+                              <a:solidFill>
+                                <a:schemeClr val="tx1"/>
+                              </a:solidFill>
+                              <a:latin typeface="Cambria Math" panose="02040503050406030204" pitchFamily="18" charset="0"/>
+                              <a:ea typeface="Cambria Math" panose="02040503050406030204" pitchFamily="18" charset="0"/>
+                              <a:cs typeface="Times New Roman" panose="02020603050405020304" pitchFamily="18" charset="0"/>
+                            </a:rPr>
+                          </m:ctrlPr>
+                        </m:sSubPr>
+                        <m:e>
+                          <m:r>
+                            <a:rPr lang="en-US" sz="1000" b="0" i="1" smtClean="0">
+                              <a:solidFill>
+                                <a:schemeClr val="tx1"/>
+                              </a:solidFill>
+                              <a:latin typeface="Cambria Math" panose="02040503050406030204" pitchFamily="18" charset="0"/>
+                              <a:ea typeface="Cambria Math" panose="02040503050406030204" pitchFamily="18" charset="0"/>
+                              <a:cs typeface="Times New Roman" panose="02020603050405020304" pitchFamily="18" charset="0"/>
+                            </a:rPr>
+                            <m:t>𝜋</m:t>
+                          </m:r>
+                        </m:e>
+                        <m:sub>
+                          <m:r>
+                            <a:rPr lang="en-US" sz="1000" b="0" i="1" smtClean="0">
+                              <a:solidFill>
+                                <a:schemeClr val="tx1"/>
+                              </a:solidFill>
+                              <a:latin typeface="Cambria Math" panose="02040503050406030204" pitchFamily="18" charset="0"/>
+                              <a:ea typeface="Cambria Math" panose="02040503050406030204" pitchFamily="18" charset="0"/>
+                              <a:cs typeface="Times New Roman" panose="02020603050405020304" pitchFamily="18" charset="0"/>
+                            </a:rPr>
+                            <m:t>𝜃</m:t>
+                          </m:r>
+                        </m:sub>
+                      </m:sSub>
+                      <m:r>
+                        <a:rPr lang="en-US" sz="1000" b="0" i="1" smtClean="0">
+                          <a:solidFill>
+                            <a:schemeClr val="tx1"/>
+                          </a:solidFill>
+                          <a:latin typeface="Cambria Math" panose="02040503050406030204" pitchFamily="18" charset="0"/>
+                          <a:ea typeface="Cambria Math" panose="02040503050406030204" pitchFamily="18" charset="0"/>
+                          <a:cs typeface="Times New Roman" panose="02020603050405020304" pitchFamily="18" charset="0"/>
+                        </a:rPr>
+                        <m:t>(</m:t>
+                      </m:r>
+                      <m:r>
+                        <a:rPr lang="en-US" sz="1000" b="0" i="1" smtClean="0">
+                          <a:solidFill>
+                            <a:schemeClr val="tx1"/>
+                          </a:solidFill>
+                          <a:latin typeface="Cambria Math" panose="02040503050406030204" pitchFamily="18" charset="0"/>
+                          <a:ea typeface="Cambria Math" panose="02040503050406030204" pitchFamily="18" charset="0"/>
+                          <a:cs typeface="Times New Roman" panose="02020603050405020304" pitchFamily="18" charset="0"/>
+                        </a:rPr>
+                        <m:t>𝑠</m:t>
+                      </m:r>
+                      <m:r>
+                        <a:rPr lang="en-US" sz="1000" b="0" i="1" smtClean="0">
+                          <a:solidFill>
+                            <a:schemeClr val="tx1"/>
+                          </a:solidFill>
+                          <a:latin typeface="Cambria Math" panose="02040503050406030204" pitchFamily="18" charset="0"/>
+                          <a:ea typeface="Cambria Math" panose="02040503050406030204" pitchFamily="18" charset="0"/>
+                          <a:cs typeface="Times New Roman" panose="02020603050405020304" pitchFamily="18" charset="0"/>
+                        </a:rPr>
+                        <m:t>)</m:t>
+                      </m:r>
+                    </m:oMath>
+                  </m:oMathPara>
+                </a14:m>
+                <a:endParaRPr lang="en-US" sz="1000" dirty="0">
+                  <a:solidFill>
+                    <a:schemeClr val="tx1"/>
+                  </a:solidFill>
+                  <a:latin typeface="Times New Roman" panose="02020603050405020304" pitchFamily="18" charset="0"/>
+                  <a:cs typeface="Times New Roman" panose="02020603050405020304" pitchFamily="18" charset="0"/>
+                </a:endParaRPr>
+              </a:p>
+            </p:txBody>
+          </p:sp>
+        </mc:Choice>
+        <mc:Fallback>
+          <p:sp>
+            <p:nvSpPr>
+              <p:cNvPr id="8" name="Rectangle: Rounded Corners 7">
+                <a:extLst>
+                  <a:ext uri="{FF2B5EF4-FFF2-40B4-BE49-F238E27FC236}">
+                    <a16:creationId xmlns:a16="http://schemas.microsoft.com/office/drawing/2014/main" id="{EB261963-2E54-9617-DE3A-CD4161156E64}"/>
+                  </a:ext>
+                </a:extLst>
+              </p:cNvPr>
+              <p:cNvSpPr>
+                <a:spLocks noRot="1" noChangeAspect="1" noMove="1" noResize="1" noEditPoints="1" noAdjustHandles="1" noChangeArrowheads="1" noChangeShapeType="1" noTextEdit="1"/>
+              </p:cNvSpPr>
+              <p:nvPr/>
+            </p:nvSpPr>
+            <p:spPr>
+              <a:xfrm>
+                <a:off x="2523436" y="3871744"/>
+                <a:ext cx="2050544" cy="430028"/>
+              </a:xfrm>
+              <a:prstGeom prst="roundRect">
+                <a:avLst/>
+              </a:prstGeom>
+              <a:blipFill>
+                <a:blip r:embed="rId5"/>
+                <a:stretch>
+                  <a:fillRect/>
+                </a:stretch>
+              </a:blipFill>
+              <a:ln>
+                <a:solidFill>
+                  <a:schemeClr val="tx1"/>
+                </a:solidFill>
+              </a:ln>
+            </p:spPr>
+            <p:txBody>
+              <a:bodyPr/>
+              <a:lstStyle/>
+              <a:p>
+                <a:r>
+                  <a:rPr lang="en-US">
+                    <a:noFill/>
+                  </a:rPr>
+                  <a:t> </a:t>
+                </a:r>
+              </a:p>
+            </p:txBody>
+          </p:sp>
+        </mc:Fallback>
+      </mc:AlternateContent>
+      <mc:AlternateContent xmlns:mc="http://schemas.openxmlformats.org/markup-compatibility/2006">
+        <mc:Choice xmlns:a14="http://schemas.microsoft.com/office/drawing/2010/main" Requires="a14">
+          <p:sp>
+            <p:nvSpPr>
+              <p:cNvPr id="9" name="Rectangle: Rounded Corners 8">
+                <a:extLst>
+                  <a:ext uri="{FF2B5EF4-FFF2-40B4-BE49-F238E27FC236}">
+                    <a16:creationId xmlns:a16="http://schemas.microsoft.com/office/drawing/2014/main" id="{2A090828-71D1-57D0-0DED-C6A54CCBF2BF}"/>
+                  </a:ext>
+                </a:extLst>
+              </p:cNvPr>
+              <p:cNvSpPr/>
+              <p:nvPr/>
+            </p:nvSpPr>
+            <p:spPr>
+              <a:xfrm>
+                <a:off x="5490985" y="2291526"/>
+                <a:ext cx="1583797" cy="430028"/>
+              </a:xfrm>
+              <a:prstGeom prst="roundRect">
+                <a:avLst/>
+              </a:prstGeom>
+              <a:solidFill>
+                <a:schemeClr val="accent4">
+                  <a:lumMod val="60000"/>
+                  <a:lumOff val="40000"/>
+                </a:schemeClr>
+              </a:solidFill>
+              <a:ln>
+                <a:solidFill>
+                  <a:schemeClr val="tx1"/>
+                </a:solidFill>
+              </a:ln>
+            </p:spPr>
+            <p:style>
+              <a:lnRef idx="2">
+                <a:schemeClr val="accent3">
+                  <a:shade val="50000"/>
+                </a:schemeClr>
+              </a:lnRef>
+              <a:fillRef idx="1">
+                <a:schemeClr val="accent3"/>
+              </a:fillRef>
+              <a:effectRef idx="0">
+                <a:schemeClr val="accent3"/>
+              </a:effectRef>
+              <a:fontRef idx="minor">
+                <a:schemeClr val="lt1"/>
+              </a:fontRef>
+            </p:style>
+            <p:txBody>
+              <a:bodyPr rtlCol="0" anchor="ctr"/>
+              <a:lstStyle/>
+              <a:p>
+                <a:pPr algn="ctr"/>
+                <a:r>
+                  <a:rPr lang="en-US" sz="1000" dirty="0">
+                    <a:solidFill>
+                      <a:schemeClr val="tx1"/>
+                    </a:solidFill>
+                    <a:latin typeface="Times New Roman" panose="02020603050405020304" pitchFamily="18" charset="0"/>
+                    <a:cs typeface="Times New Roman" panose="02020603050405020304" pitchFamily="18" charset="0"/>
+                  </a:rPr>
+                  <a:t>Updated Target network:</a:t>
+                </a:r>
+              </a:p>
+              <a:p>
+                <a:pPr algn="ctr"/>
+                <a14:m>
+                  <m:oMathPara xmlns:m="http://schemas.openxmlformats.org/officeDocument/2006/math">
+                    <m:oMathParaPr>
+                      <m:jc m:val="centerGroup"/>
+                    </m:oMathParaPr>
+                    <m:oMath xmlns:m="http://schemas.openxmlformats.org/officeDocument/2006/math">
+                      <m:sSup>
+                        <m:sSupPr>
+                          <m:ctrlPr>
+                            <a:rPr lang="en-US" sz="1000" b="0" i="1" smtClean="0">
+                              <a:solidFill>
+                                <a:schemeClr val="tx1"/>
+                              </a:solidFill>
+                              <a:latin typeface="Cambria Math" panose="02040503050406030204" pitchFamily="18" charset="0"/>
+                              <a:cs typeface="Times New Roman" panose="02020603050405020304" pitchFamily="18" charset="0"/>
+                            </a:rPr>
+                          </m:ctrlPr>
+                        </m:sSupPr>
+                        <m:e>
+                          <m:r>
+                            <a:rPr lang="en-US" sz="1000" b="0" i="1" smtClean="0">
+                              <a:solidFill>
+                                <a:schemeClr val="tx1"/>
+                              </a:solidFill>
+                              <a:latin typeface="Cambria Math" panose="02040503050406030204" pitchFamily="18" charset="0"/>
+                              <a:cs typeface="Times New Roman" panose="02020603050405020304" pitchFamily="18" charset="0"/>
+                            </a:rPr>
+                            <m:t>𝜙</m:t>
+                          </m:r>
+                        </m:e>
+                        <m:sup>
+                          <m:r>
+                            <a:rPr lang="en-US" sz="1000" b="0" i="1" smtClean="0">
+                              <a:solidFill>
+                                <a:schemeClr val="tx1"/>
+                              </a:solidFill>
+                              <a:latin typeface="Cambria Math" panose="02040503050406030204" pitchFamily="18" charset="0"/>
+                              <a:cs typeface="Times New Roman" panose="02020603050405020304" pitchFamily="18" charset="0"/>
+                            </a:rPr>
+                            <m:t>′</m:t>
+                          </m:r>
+                        </m:sup>
+                      </m:sSup>
+                      <m:r>
+                        <a:rPr lang="en-US" sz="1000" b="0" i="1" smtClean="0">
+                          <a:solidFill>
+                            <a:schemeClr val="tx1"/>
+                          </a:solidFill>
+                          <a:latin typeface="Cambria Math" panose="02040503050406030204" pitchFamily="18" charset="0"/>
+                          <a:cs typeface="Times New Roman" panose="02020603050405020304" pitchFamily="18" charset="0"/>
+                        </a:rPr>
+                        <m:t>=</m:t>
+                      </m:r>
+                      <m:sSup>
+                        <m:sSupPr>
+                          <m:ctrlPr>
+                            <a:rPr lang="en-US" sz="1000" b="0" i="1" smtClean="0">
+                              <a:solidFill>
+                                <a:schemeClr val="tx1"/>
+                              </a:solidFill>
+                              <a:latin typeface="Cambria Math" panose="02040503050406030204" pitchFamily="18" charset="0"/>
+                              <a:cs typeface="Times New Roman" panose="02020603050405020304" pitchFamily="18" charset="0"/>
+                            </a:rPr>
+                          </m:ctrlPr>
+                        </m:sSupPr>
+                        <m:e>
+                          <m:r>
+                            <a:rPr lang="en-US" sz="1000" b="0" i="1" smtClean="0">
+                              <a:solidFill>
+                                <a:schemeClr val="tx1"/>
+                              </a:solidFill>
+                              <a:latin typeface="Cambria Math" panose="02040503050406030204" pitchFamily="18" charset="0"/>
+                              <a:cs typeface="Times New Roman" panose="02020603050405020304" pitchFamily="18" charset="0"/>
+                            </a:rPr>
+                            <m:t>𝜙</m:t>
+                          </m:r>
+                        </m:e>
+                        <m:sup>
+                          <m:r>
+                            <a:rPr lang="en-US" sz="1000" b="0" i="1" smtClean="0">
+                              <a:solidFill>
+                                <a:schemeClr val="tx1"/>
+                              </a:solidFill>
+                              <a:latin typeface="Cambria Math" panose="02040503050406030204" pitchFamily="18" charset="0"/>
+                              <a:cs typeface="Times New Roman" panose="02020603050405020304" pitchFamily="18" charset="0"/>
+                            </a:rPr>
+                            <m:t>′</m:t>
+                          </m:r>
+                        </m:sup>
+                      </m:sSup>
+                      <m:r>
+                        <a:rPr lang="en-US" sz="1000" b="0" i="1" smtClean="0">
+                          <a:solidFill>
+                            <a:schemeClr val="tx1"/>
+                          </a:solidFill>
+                          <a:latin typeface="Cambria Math" panose="02040503050406030204" pitchFamily="18" charset="0"/>
+                          <a:cs typeface="Times New Roman" panose="02020603050405020304" pitchFamily="18" charset="0"/>
+                        </a:rPr>
+                        <m:t>+</m:t>
+                      </m:r>
+                      <m:r>
+                        <a:rPr lang="en-US" sz="1000" b="0" i="1" smtClean="0">
+                          <a:solidFill>
+                            <a:schemeClr val="tx1"/>
+                          </a:solidFill>
+                          <a:latin typeface="Cambria Math" panose="02040503050406030204" pitchFamily="18" charset="0"/>
+                          <a:cs typeface="Times New Roman" panose="02020603050405020304" pitchFamily="18" charset="0"/>
+                        </a:rPr>
+                        <m:t>𝜏</m:t>
+                      </m:r>
+                      <m:r>
+                        <a:rPr lang="en-US" sz="1000" b="0" i="1" smtClean="0">
+                          <a:solidFill>
+                            <a:schemeClr val="tx1"/>
+                          </a:solidFill>
+                          <a:latin typeface="Cambria Math" panose="02040503050406030204" pitchFamily="18" charset="0"/>
+                          <a:cs typeface="Times New Roman" panose="02020603050405020304" pitchFamily="18" charset="0"/>
+                        </a:rPr>
+                        <m:t> ( </m:t>
+                      </m:r>
+                      <m:sSup>
+                        <m:sSupPr>
+                          <m:ctrlPr>
+                            <a:rPr lang="en-US" sz="1000" b="0" i="1" smtClean="0">
+                              <a:solidFill>
+                                <a:schemeClr val="tx1"/>
+                              </a:solidFill>
+                              <a:latin typeface="Cambria Math" panose="02040503050406030204" pitchFamily="18" charset="0"/>
+                              <a:cs typeface="Times New Roman" panose="02020603050405020304" pitchFamily="18" charset="0"/>
+                            </a:rPr>
+                          </m:ctrlPr>
+                        </m:sSupPr>
+                        <m:e>
+                          <m:r>
+                            <a:rPr lang="en-US" sz="1000" b="0" i="1" smtClean="0">
+                              <a:solidFill>
+                                <a:schemeClr val="tx1"/>
+                              </a:solidFill>
+                              <a:latin typeface="Cambria Math" panose="02040503050406030204" pitchFamily="18" charset="0"/>
+                              <a:cs typeface="Times New Roman" panose="02020603050405020304" pitchFamily="18" charset="0"/>
+                            </a:rPr>
+                            <m:t>𝜙</m:t>
+                          </m:r>
+                        </m:e>
+                        <m:sup>
+                          <m:r>
+                            <a:rPr lang="en-US" sz="1000" b="0" i="1" smtClean="0">
+                              <a:solidFill>
+                                <a:schemeClr val="tx1"/>
+                              </a:solidFill>
+                              <a:latin typeface="Cambria Math" panose="02040503050406030204" pitchFamily="18" charset="0"/>
+                              <a:cs typeface="Times New Roman" panose="02020603050405020304" pitchFamily="18" charset="0"/>
+                            </a:rPr>
+                            <m:t>′</m:t>
+                          </m:r>
+                        </m:sup>
+                      </m:sSup>
+                      <m:r>
+                        <a:rPr lang="en-US" sz="1000" b="0" i="1" smtClean="0">
+                          <a:solidFill>
+                            <a:schemeClr val="tx1"/>
+                          </a:solidFill>
+                          <a:latin typeface="Cambria Math" panose="02040503050406030204" pitchFamily="18" charset="0"/>
+                          <a:cs typeface="Times New Roman" panose="02020603050405020304" pitchFamily="18" charset="0"/>
+                        </a:rPr>
+                        <m:t>−</m:t>
+                      </m:r>
+                      <m:r>
+                        <a:rPr lang="en-US" sz="1000" b="0" i="1" smtClean="0">
+                          <a:solidFill>
+                            <a:schemeClr val="tx1"/>
+                          </a:solidFill>
+                          <a:latin typeface="Cambria Math" panose="02040503050406030204" pitchFamily="18" charset="0"/>
+                          <a:cs typeface="Times New Roman" panose="02020603050405020304" pitchFamily="18" charset="0"/>
+                        </a:rPr>
+                        <m:t>𝜙</m:t>
+                      </m:r>
+                      <m:r>
+                        <a:rPr lang="en-US" sz="1000" b="0" i="1" smtClean="0">
+                          <a:solidFill>
+                            <a:schemeClr val="tx1"/>
+                          </a:solidFill>
+                          <a:latin typeface="Cambria Math" panose="02040503050406030204" pitchFamily="18" charset="0"/>
+                          <a:cs typeface="Times New Roman" panose="02020603050405020304" pitchFamily="18" charset="0"/>
+                        </a:rPr>
+                        <m:t>)</m:t>
+                      </m:r>
+                    </m:oMath>
+                  </m:oMathPara>
+                </a14:m>
+                <a:endParaRPr lang="en-US" sz="1000" dirty="0">
+                  <a:solidFill>
+                    <a:schemeClr val="tx1"/>
+                  </a:solidFill>
+                  <a:latin typeface="Times New Roman" panose="02020603050405020304" pitchFamily="18" charset="0"/>
+                  <a:cs typeface="Times New Roman" panose="02020603050405020304" pitchFamily="18" charset="0"/>
+                </a:endParaRPr>
+              </a:p>
+            </p:txBody>
+          </p:sp>
+        </mc:Choice>
+        <mc:Fallback>
+          <p:sp>
+            <p:nvSpPr>
+              <p:cNvPr id="9" name="Rectangle: Rounded Corners 8">
+                <a:extLst>
+                  <a:ext uri="{FF2B5EF4-FFF2-40B4-BE49-F238E27FC236}">
+                    <a16:creationId xmlns:a16="http://schemas.microsoft.com/office/drawing/2014/main" id="{2A090828-71D1-57D0-0DED-C6A54CCBF2BF}"/>
+                  </a:ext>
+                </a:extLst>
+              </p:cNvPr>
+              <p:cNvSpPr>
+                <a:spLocks noRot="1" noChangeAspect="1" noMove="1" noResize="1" noEditPoints="1" noAdjustHandles="1" noChangeArrowheads="1" noChangeShapeType="1" noTextEdit="1"/>
+              </p:cNvSpPr>
+              <p:nvPr/>
+            </p:nvSpPr>
+            <p:spPr>
+              <a:xfrm>
+                <a:off x="5490985" y="2291526"/>
+                <a:ext cx="1583797" cy="430028"/>
+              </a:xfrm>
+              <a:prstGeom prst="roundRect">
+                <a:avLst/>
+              </a:prstGeom>
+              <a:blipFill>
+                <a:blip r:embed="rId6"/>
+                <a:stretch>
+                  <a:fillRect/>
+                </a:stretch>
+              </a:blipFill>
+              <a:ln>
+                <a:solidFill>
+                  <a:schemeClr val="tx1"/>
+                </a:solidFill>
+              </a:ln>
+            </p:spPr>
+            <p:txBody>
+              <a:bodyPr/>
+              <a:lstStyle/>
+              <a:p>
+                <a:r>
+                  <a:rPr lang="en-US">
+                    <a:noFill/>
+                  </a:rPr>
+                  <a:t> </a:t>
+                </a:r>
+              </a:p>
+            </p:txBody>
+          </p:sp>
+        </mc:Fallback>
+      </mc:AlternateContent>
+      <mc:AlternateContent xmlns:mc="http://schemas.openxmlformats.org/markup-compatibility/2006">
+        <mc:Choice xmlns:a14="http://schemas.microsoft.com/office/drawing/2010/main" Requires="a14">
+          <p:sp>
+            <p:nvSpPr>
+              <p:cNvPr id="10" name="Rectangle: Rounded Corners 9">
+                <a:extLst>
+                  <a:ext uri="{FF2B5EF4-FFF2-40B4-BE49-F238E27FC236}">
+                    <a16:creationId xmlns:a16="http://schemas.microsoft.com/office/drawing/2014/main" id="{71B0586B-2BBE-A033-D835-B98ABC98E561}"/>
+                  </a:ext>
+                </a:extLst>
+              </p:cNvPr>
+              <p:cNvSpPr/>
+              <p:nvPr/>
+            </p:nvSpPr>
+            <p:spPr>
+              <a:xfrm>
+                <a:off x="5490985" y="1501417"/>
+                <a:ext cx="1583797" cy="430028"/>
+              </a:xfrm>
+              <a:prstGeom prst="roundRect">
+                <a:avLst/>
+              </a:prstGeom>
+              <a:solidFill>
+                <a:schemeClr val="accent1">
+                  <a:lumMod val="60000"/>
+                  <a:lumOff val="40000"/>
+                </a:schemeClr>
+              </a:solidFill>
+              <a:ln>
+                <a:solidFill>
+                  <a:schemeClr val="tx1"/>
+                </a:solidFill>
+              </a:ln>
+            </p:spPr>
+            <p:style>
+              <a:lnRef idx="2">
+                <a:schemeClr val="accent3">
+                  <a:shade val="50000"/>
+                </a:schemeClr>
+              </a:lnRef>
+              <a:fillRef idx="1">
+                <a:schemeClr val="accent3"/>
+              </a:fillRef>
+              <a:effectRef idx="0">
+                <a:schemeClr val="accent3"/>
+              </a:effectRef>
+              <a:fontRef idx="minor">
+                <a:schemeClr val="lt1"/>
+              </a:fontRef>
+            </p:style>
+            <p:txBody>
+              <a:bodyPr rtlCol="0" anchor="ctr"/>
+              <a:lstStyle/>
+              <a:p>
+                <a:pPr algn="ctr"/>
+                <a:r>
+                  <a:rPr lang="en-US" sz="1000" dirty="0">
+                    <a:solidFill>
+                      <a:schemeClr val="tx1"/>
+                    </a:solidFill>
+                    <a:latin typeface="Times New Roman" panose="02020603050405020304" pitchFamily="18" charset="0"/>
+                    <a:cs typeface="Times New Roman" panose="02020603050405020304" pitchFamily="18" charset="0"/>
+                  </a:rPr>
+                  <a:t>Target network:</a:t>
+                </a:r>
+              </a:p>
+              <a:p>
+                <a:pPr algn="ctr"/>
+                <a14:m>
+                  <m:oMathPara xmlns:m="http://schemas.openxmlformats.org/officeDocument/2006/math">
+                    <m:oMathParaPr>
+                      <m:jc m:val="centerGroup"/>
+                    </m:oMathParaPr>
+                    <m:oMath xmlns:m="http://schemas.openxmlformats.org/officeDocument/2006/math">
+                      <m:acc>
+                        <m:accPr>
+                          <m:chr m:val="̂"/>
+                          <m:ctrlPr>
+                            <a:rPr lang="en-US" sz="1000" i="1" smtClean="0">
+                              <a:solidFill>
+                                <a:schemeClr val="tx1"/>
+                              </a:solidFill>
+                              <a:latin typeface="Cambria Math" panose="02040503050406030204" pitchFamily="18" charset="0"/>
+                              <a:cs typeface="Times New Roman" panose="02020603050405020304" pitchFamily="18" charset="0"/>
+                            </a:rPr>
+                          </m:ctrlPr>
+                        </m:accPr>
+                        <m:e>
+                          <m:sSub>
+                            <m:sSubPr>
+                              <m:ctrlPr>
+                                <a:rPr lang="en-US" sz="1000" i="1">
+                                  <a:solidFill>
+                                    <a:schemeClr val="tx1"/>
+                                  </a:solidFill>
+                                  <a:latin typeface="Cambria Math" panose="02040503050406030204" pitchFamily="18" charset="0"/>
+                                  <a:cs typeface="Times New Roman" panose="02020603050405020304" pitchFamily="18" charset="0"/>
+                                </a:rPr>
+                              </m:ctrlPr>
+                            </m:sSubPr>
+                            <m:e>
+                              <m:sSup>
+                                <m:sSupPr>
+                                  <m:ctrlPr>
+                                    <a:rPr lang="en-US" sz="1000" i="1">
+                                      <a:solidFill>
+                                        <a:schemeClr val="tx1"/>
+                                      </a:solidFill>
+                                      <a:latin typeface="Cambria Math" panose="02040503050406030204" pitchFamily="18" charset="0"/>
+                                      <a:cs typeface="Times New Roman" panose="02020603050405020304" pitchFamily="18" charset="0"/>
+                                    </a:rPr>
+                                  </m:ctrlPr>
+                                </m:sSupPr>
+                                <m:e>
+                                  <m:r>
+                                    <a:rPr lang="en-US" sz="1000" i="1">
+                                      <a:solidFill>
+                                        <a:schemeClr val="tx1"/>
+                                      </a:solidFill>
+                                      <a:latin typeface="Cambria Math" panose="02040503050406030204" pitchFamily="18" charset="0"/>
+                                      <a:cs typeface="Times New Roman" panose="02020603050405020304" pitchFamily="18" charset="0"/>
+                                    </a:rPr>
+                                    <m:t>𝑄</m:t>
+                                  </m:r>
+                                </m:e>
+                                <m:sup>
+                                  <m:r>
+                                    <a:rPr lang="en-US" sz="1000" i="1">
+                                      <a:solidFill>
+                                        <a:schemeClr val="tx1"/>
+                                      </a:solidFill>
+                                      <a:latin typeface="Cambria Math" panose="02040503050406030204" pitchFamily="18" charset="0"/>
+                                      <a:cs typeface="Times New Roman" panose="02020603050405020304" pitchFamily="18" charset="0"/>
+                                    </a:rPr>
+                                    <m:t>′</m:t>
+                                  </m:r>
+                                </m:sup>
+                              </m:sSup>
+                            </m:e>
+                            <m:sub>
+                              <m:r>
+                                <a:rPr lang="en-US" sz="1000" i="1">
+                                  <a:solidFill>
+                                    <a:schemeClr val="tx1"/>
+                                  </a:solidFill>
+                                  <a:latin typeface="Cambria Math" panose="02040503050406030204" pitchFamily="18" charset="0"/>
+                                  <a:cs typeface="Times New Roman" panose="02020603050405020304" pitchFamily="18" charset="0"/>
+                                </a:rPr>
+                                <m:t>𝜙</m:t>
+                              </m:r>
+                              <m:r>
+                                <a:rPr lang="en-US" sz="1000" b="0" i="1" smtClean="0">
+                                  <a:solidFill>
+                                    <a:schemeClr val="tx1"/>
+                                  </a:solidFill>
+                                  <a:latin typeface="Cambria Math" panose="02040503050406030204" pitchFamily="18" charset="0"/>
+                                  <a:cs typeface="Times New Roman" panose="02020603050405020304" pitchFamily="18" charset="0"/>
+                                </a:rPr>
+                                <m:t>′</m:t>
+                              </m:r>
+                            </m:sub>
+                          </m:sSub>
+                        </m:e>
+                      </m:acc>
+                      <m:d>
+                        <m:dPr>
+                          <m:ctrlPr>
+                            <a:rPr lang="en-US" sz="1000" b="0" i="1" smtClean="0">
+                              <a:solidFill>
+                                <a:schemeClr val="tx1"/>
+                              </a:solidFill>
+                              <a:latin typeface="Cambria Math" panose="02040503050406030204" pitchFamily="18" charset="0"/>
+                              <a:cs typeface="Times New Roman" panose="02020603050405020304" pitchFamily="18" charset="0"/>
+                            </a:rPr>
+                          </m:ctrlPr>
+                        </m:dPr>
+                        <m:e>
+                          <m:r>
+                            <a:rPr lang="en-US" sz="1000" b="0" i="1" smtClean="0">
+                              <a:solidFill>
+                                <a:schemeClr val="tx1"/>
+                              </a:solidFill>
+                              <a:latin typeface="Cambria Math" panose="02040503050406030204" pitchFamily="18" charset="0"/>
+                              <a:cs typeface="Times New Roman" panose="02020603050405020304" pitchFamily="18" charset="0"/>
+                            </a:rPr>
+                            <m:t>𝑠</m:t>
+                          </m:r>
+                          <m:r>
+                            <a:rPr lang="en-US" sz="1000" b="0" i="1" smtClean="0">
+                              <a:solidFill>
+                                <a:schemeClr val="tx1"/>
+                              </a:solidFill>
+                              <a:latin typeface="Cambria Math" panose="02040503050406030204" pitchFamily="18" charset="0"/>
+                              <a:cs typeface="Times New Roman" panose="02020603050405020304" pitchFamily="18" charset="0"/>
+                            </a:rPr>
+                            <m:t>,</m:t>
+                          </m:r>
+                          <m:r>
+                            <a:rPr lang="en-US" sz="1000" b="0" i="1" smtClean="0">
+                              <a:solidFill>
+                                <a:schemeClr val="tx1"/>
+                              </a:solidFill>
+                              <a:latin typeface="Cambria Math" panose="02040503050406030204" pitchFamily="18" charset="0"/>
+                              <a:cs typeface="Times New Roman" panose="02020603050405020304" pitchFamily="18" charset="0"/>
+                            </a:rPr>
+                            <m:t>𝑎</m:t>
+                          </m:r>
+                        </m:e>
+                      </m:d>
+                    </m:oMath>
+                  </m:oMathPara>
+                </a14:m>
+                <a:endParaRPr lang="en-US" sz="1000" dirty="0">
+                  <a:solidFill>
+                    <a:schemeClr val="tx1"/>
+                  </a:solidFill>
+                  <a:latin typeface="Times New Roman" panose="02020603050405020304" pitchFamily="18" charset="0"/>
+                  <a:cs typeface="Times New Roman" panose="02020603050405020304" pitchFamily="18" charset="0"/>
+                </a:endParaRPr>
+              </a:p>
+            </p:txBody>
+          </p:sp>
+        </mc:Choice>
+        <mc:Fallback>
+          <p:sp>
+            <p:nvSpPr>
+              <p:cNvPr id="10" name="Rectangle: Rounded Corners 9">
+                <a:extLst>
+                  <a:ext uri="{FF2B5EF4-FFF2-40B4-BE49-F238E27FC236}">
+                    <a16:creationId xmlns:a16="http://schemas.microsoft.com/office/drawing/2014/main" id="{71B0586B-2BBE-A033-D835-B98ABC98E561}"/>
+                  </a:ext>
+                </a:extLst>
+              </p:cNvPr>
+              <p:cNvSpPr>
+                <a:spLocks noRot="1" noChangeAspect="1" noMove="1" noResize="1" noEditPoints="1" noAdjustHandles="1" noChangeArrowheads="1" noChangeShapeType="1" noTextEdit="1"/>
+              </p:cNvSpPr>
+              <p:nvPr/>
+            </p:nvSpPr>
+            <p:spPr>
+              <a:xfrm>
+                <a:off x="5490985" y="1501417"/>
+                <a:ext cx="1583797" cy="430028"/>
+              </a:xfrm>
+              <a:prstGeom prst="roundRect">
+                <a:avLst/>
+              </a:prstGeom>
+              <a:blipFill>
+                <a:blip r:embed="rId7"/>
+                <a:stretch>
+                  <a:fillRect/>
+                </a:stretch>
+              </a:blipFill>
+              <a:ln>
+                <a:solidFill>
+                  <a:schemeClr val="tx1"/>
+                </a:solidFill>
+              </a:ln>
+            </p:spPr>
+            <p:txBody>
+              <a:bodyPr/>
+              <a:lstStyle/>
+              <a:p>
+                <a:r>
+                  <a:rPr lang="en-US">
+                    <a:noFill/>
+                  </a:rPr>
+                  <a:t> </a:t>
+                </a:r>
+              </a:p>
+            </p:txBody>
+          </p:sp>
+        </mc:Fallback>
+      </mc:AlternateContent>
+      <p:cxnSp>
+        <p:nvCxnSpPr>
+          <p:cNvPr id="14" name="Connector: Elbow 13">
+            <a:extLst>
+              <a:ext uri="{FF2B5EF4-FFF2-40B4-BE49-F238E27FC236}">
+                <a16:creationId xmlns:a16="http://schemas.microsoft.com/office/drawing/2014/main" id="{43A582C6-52E1-325F-8F89-4FCB77988C1A}"/>
+              </a:ext>
+            </a:extLst>
+          </p:cNvPr>
+          <p:cNvCxnSpPr>
+            <a:cxnSpLocks/>
+            <a:stCxn id="8" idx="2"/>
+          </p:cNvCxnSpPr>
+          <p:nvPr/>
+        </p:nvCxnSpPr>
+        <p:spPr>
+          <a:xfrm rot="5400000">
+            <a:off x="3253407" y="4597073"/>
+            <a:ext cx="590602" cy="1"/>
+          </a:xfrm>
+          <a:prstGeom prst="bentConnector3">
+            <a:avLst/>
+          </a:prstGeom>
+          <a:ln>
+            <a:solidFill>
+              <a:schemeClr val="tx1"/>
+            </a:solidFill>
+            <a:tailEnd type="triangle"/>
+          </a:ln>
+        </p:spPr>
+        <p:style>
+          <a:lnRef idx="1">
+            <a:schemeClr val="accent1"/>
+          </a:lnRef>
+          <a:fillRef idx="0">
+            <a:schemeClr val="accent1"/>
+          </a:fillRef>
+          <a:effectRef idx="0">
+            <a:schemeClr val="accent1"/>
+          </a:effectRef>
+          <a:fontRef idx="minor">
+            <a:schemeClr val="tx1"/>
+          </a:fontRef>
+        </p:style>
+      </p:cxnSp>
+      <p:cxnSp>
+        <p:nvCxnSpPr>
+          <p:cNvPr id="18" name="Connector: Elbow 17">
+            <a:extLst>
+              <a:ext uri="{FF2B5EF4-FFF2-40B4-BE49-F238E27FC236}">
+                <a16:creationId xmlns:a16="http://schemas.microsoft.com/office/drawing/2014/main" id="{7C916DE7-4120-58E9-DE1E-875D60ECB6D3}"/>
+              </a:ext>
+            </a:extLst>
+          </p:cNvPr>
+          <p:cNvCxnSpPr>
+            <a:cxnSpLocks/>
+            <a:endCxn id="7" idx="0"/>
+          </p:cNvCxnSpPr>
+          <p:nvPr/>
+        </p:nvCxnSpPr>
+        <p:spPr>
+          <a:xfrm rot="16200000" flipH="1">
+            <a:off x="3365721" y="2108539"/>
+            <a:ext cx="365972" cy="2"/>
+          </a:xfrm>
+          <a:prstGeom prst="bentConnector3">
+            <a:avLst/>
+          </a:prstGeom>
+          <a:ln>
+            <a:solidFill>
+              <a:schemeClr val="tx1"/>
+            </a:solidFill>
+            <a:tailEnd type="triangle"/>
+          </a:ln>
+        </p:spPr>
+        <p:style>
+          <a:lnRef idx="1">
+            <a:schemeClr val="accent1"/>
+          </a:lnRef>
+          <a:fillRef idx="0">
+            <a:schemeClr val="accent1"/>
+          </a:fillRef>
+          <a:effectRef idx="0">
+            <a:schemeClr val="accent1"/>
+          </a:effectRef>
+          <a:fontRef idx="minor">
+            <a:schemeClr val="tx1"/>
+          </a:fontRef>
+        </p:style>
+      </p:cxnSp>
+      <p:cxnSp>
+        <p:nvCxnSpPr>
+          <p:cNvPr id="20" name="Connector: Elbow 19">
+            <a:extLst>
+              <a:ext uri="{FF2B5EF4-FFF2-40B4-BE49-F238E27FC236}">
+                <a16:creationId xmlns:a16="http://schemas.microsoft.com/office/drawing/2014/main" id="{E21E4965-D043-F493-8867-1CC9D512C4D0}"/>
+              </a:ext>
+            </a:extLst>
+          </p:cNvPr>
+          <p:cNvCxnSpPr>
+            <a:cxnSpLocks/>
+          </p:cNvCxnSpPr>
+          <p:nvPr/>
+        </p:nvCxnSpPr>
+        <p:spPr>
+          <a:xfrm rot="16200000" flipH="1">
+            <a:off x="3365719" y="2898648"/>
+            <a:ext cx="365972" cy="2"/>
+          </a:xfrm>
+          <a:prstGeom prst="bentConnector3">
+            <a:avLst/>
+          </a:prstGeom>
+          <a:ln>
+            <a:solidFill>
+              <a:schemeClr val="tx1"/>
+            </a:solidFill>
+            <a:tailEnd type="triangle"/>
+          </a:ln>
+        </p:spPr>
+        <p:style>
+          <a:lnRef idx="1">
+            <a:schemeClr val="accent1"/>
+          </a:lnRef>
+          <a:fillRef idx="0">
+            <a:schemeClr val="accent1"/>
+          </a:fillRef>
+          <a:effectRef idx="0">
+            <a:schemeClr val="accent1"/>
+          </a:effectRef>
+          <a:fontRef idx="minor">
+            <a:schemeClr val="tx1"/>
+          </a:fontRef>
+        </p:style>
+      </p:cxnSp>
+      <p:cxnSp>
+        <p:nvCxnSpPr>
+          <p:cNvPr id="21" name="Connector: Elbow 20">
+            <a:extLst>
+              <a:ext uri="{FF2B5EF4-FFF2-40B4-BE49-F238E27FC236}">
+                <a16:creationId xmlns:a16="http://schemas.microsoft.com/office/drawing/2014/main" id="{73C10EC0-DED8-67BC-A205-0B97B3A48223}"/>
+              </a:ext>
+            </a:extLst>
+          </p:cNvPr>
+          <p:cNvCxnSpPr>
+            <a:cxnSpLocks/>
+          </p:cNvCxnSpPr>
+          <p:nvPr/>
+        </p:nvCxnSpPr>
+        <p:spPr>
+          <a:xfrm rot="16200000" flipH="1">
+            <a:off x="3365717" y="3688757"/>
+            <a:ext cx="365972" cy="2"/>
+          </a:xfrm>
+          <a:prstGeom prst="bentConnector3">
+            <a:avLst/>
+          </a:prstGeom>
+          <a:ln>
+            <a:solidFill>
+              <a:schemeClr val="tx1"/>
+            </a:solidFill>
+            <a:tailEnd type="triangle"/>
+          </a:ln>
+        </p:spPr>
+        <p:style>
+          <a:lnRef idx="1">
+            <a:schemeClr val="accent1"/>
+          </a:lnRef>
+          <a:fillRef idx="0">
+            <a:schemeClr val="accent1"/>
+          </a:fillRef>
+          <a:effectRef idx="0">
+            <a:schemeClr val="accent1"/>
+          </a:effectRef>
+          <a:fontRef idx="minor">
+            <a:schemeClr val="tx1"/>
+          </a:fontRef>
+        </p:style>
+      </p:cxnSp>
+      <p:cxnSp>
+        <p:nvCxnSpPr>
+          <p:cNvPr id="27" name="Straight Arrow Connector 26">
+            <a:extLst>
+              <a:ext uri="{FF2B5EF4-FFF2-40B4-BE49-F238E27FC236}">
+                <a16:creationId xmlns:a16="http://schemas.microsoft.com/office/drawing/2014/main" id="{11C7F124-99B9-583B-8EA1-3475133A4480}"/>
+              </a:ext>
+            </a:extLst>
+          </p:cNvPr>
+          <p:cNvCxnSpPr>
+            <a:stCxn id="10" idx="1"/>
+            <a:endCxn id="4" idx="3"/>
+          </p:cNvCxnSpPr>
+          <p:nvPr/>
+        </p:nvCxnSpPr>
+        <p:spPr>
+          <a:xfrm flipH="1">
+            <a:off x="4573980" y="1716431"/>
+            <a:ext cx="917005" cy="0"/>
+          </a:xfrm>
+          <a:prstGeom prst="straightConnector1">
+            <a:avLst/>
+          </a:prstGeom>
+          <a:ln>
+            <a:solidFill>
+              <a:schemeClr val="tx1"/>
+            </a:solidFill>
+            <a:tailEnd type="triangle"/>
+          </a:ln>
+        </p:spPr>
+        <p:style>
+          <a:lnRef idx="1">
+            <a:schemeClr val="accent1"/>
+          </a:lnRef>
+          <a:fillRef idx="0">
+            <a:schemeClr val="accent1"/>
+          </a:fillRef>
+          <a:effectRef idx="0">
+            <a:schemeClr val="accent1"/>
+          </a:effectRef>
+          <a:fontRef idx="minor">
+            <a:schemeClr val="tx1"/>
+          </a:fontRef>
+        </p:style>
+      </p:cxnSp>
+      <p:cxnSp>
+        <p:nvCxnSpPr>
+          <p:cNvPr id="28" name="Straight Arrow Connector 27">
+            <a:extLst>
+              <a:ext uri="{FF2B5EF4-FFF2-40B4-BE49-F238E27FC236}">
+                <a16:creationId xmlns:a16="http://schemas.microsoft.com/office/drawing/2014/main" id="{ED5A121F-30B1-B035-82BF-8068D6CAC6F6}"/>
+              </a:ext>
+            </a:extLst>
+          </p:cNvPr>
+          <p:cNvCxnSpPr>
+            <a:cxnSpLocks/>
+            <a:stCxn id="7" idx="3"/>
+            <a:endCxn id="9" idx="1"/>
+          </p:cNvCxnSpPr>
+          <p:nvPr/>
+        </p:nvCxnSpPr>
+        <p:spPr>
+          <a:xfrm>
+            <a:off x="4573980" y="2506540"/>
+            <a:ext cx="917005" cy="0"/>
+          </a:xfrm>
+          <a:prstGeom prst="straightConnector1">
+            <a:avLst/>
+          </a:prstGeom>
+          <a:ln>
+            <a:solidFill>
+              <a:schemeClr val="tx1"/>
+            </a:solidFill>
+            <a:tailEnd type="triangle"/>
+          </a:ln>
+        </p:spPr>
+        <p:style>
+          <a:lnRef idx="1">
+            <a:schemeClr val="accent1"/>
+          </a:lnRef>
+          <a:fillRef idx="0">
+            <a:schemeClr val="accent1"/>
+          </a:fillRef>
+          <a:effectRef idx="0">
+            <a:schemeClr val="accent1"/>
+          </a:effectRef>
+          <a:fontRef idx="minor">
+            <a:schemeClr val="tx1"/>
+          </a:fontRef>
+        </p:style>
+      </p:cxnSp>
+      <p:cxnSp>
+        <p:nvCxnSpPr>
+          <p:cNvPr id="31" name="Straight Arrow Connector 30">
+            <a:extLst>
+              <a:ext uri="{FF2B5EF4-FFF2-40B4-BE49-F238E27FC236}">
+                <a16:creationId xmlns:a16="http://schemas.microsoft.com/office/drawing/2014/main" id="{45288107-70A8-8AA4-6EBB-D179B53F71B5}"/>
+              </a:ext>
+            </a:extLst>
+          </p:cNvPr>
+          <p:cNvCxnSpPr>
+            <a:cxnSpLocks/>
+            <a:stCxn id="9" idx="0"/>
+            <a:endCxn id="10" idx="2"/>
+          </p:cNvCxnSpPr>
+          <p:nvPr/>
+        </p:nvCxnSpPr>
+        <p:spPr>
+          <a:xfrm flipV="1">
+            <a:off x="6282884" y="1931445"/>
+            <a:ext cx="0" cy="360081"/>
+          </a:xfrm>
+          <a:prstGeom prst="straightConnector1">
+            <a:avLst/>
+          </a:prstGeom>
+          <a:ln>
+            <a:solidFill>
+              <a:schemeClr val="tx1"/>
+            </a:solidFill>
+            <a:tailEnd type="triangle"/>
+          </a:ln>
+        </p:spPr>
+        <p:style>
+          <a:lnRef idx="1">
+            <a:schemeClr val="accent1"/>
+          </a:lnRef>
+          <a:fillRef idx="0">
+            <a:schemeClr val="accent1"/>
+          </a:fillRef>
+          <a:effectRef idx="0">
+            <a:schemeClr val="accent1"/>
+          </a:effectRef>
+          <a:fontRef idx="minor">
+            <a:schemeClr val="tx1"/>
+          </a:fontRef>
+        </p:style>
+      </p:cxnSp>
+      <p:cxnSp>
+        <p:nvCxnSpPr>
+          <p:cNvPr id="39" name="Connector: Elbow 38">
+            <a:extLst>
+              <a:ext uri="{FF2B5EF4-FFF2-40B4-BE49-F238E27FC236}">
+                <a16:creationId xmlns:a16="http://schemas.microsoft.com/office/drawing/2014/main" id="{1C778F45-ABA6-6F9E-448A-3AFCDAC2C508}"/>
+              </a:ext>
+            </a:extLst>
+          </p:cNvPr>
+          <p:cNvCxnSpPr>
+            <a:stCxn id="3" idx="3"/>
+            <a:endCxn id="4" idx="1"/>
+          </p:cNvCxnSpPr>
+          <p:nvPr/>
+        </p:nvCxnSpPr>
+        <p:spPr>
+          <a:xfrm flipV="1">
+            <a:off x="1884162" y="1716431"/>
+            <a:ext cx="639274" cy="1156864"/>
+          </a:xfrm>
+          <a:prstGeom prst="bentConnector3">
+            <a:avLst/>
+          </a:prstGeom>
+          <a:ln>
+            <a:solidFill>
+              <a:schemeClr val="tx1"/>
+            </a:solidFill>
+            <a:prstDash val="sysDash"/>
+            <a:tailEnd type="triangle"/>
+          </a:ln>
+        </p:spPr>
+        <p:style>
+          <a:lnRef idx="1">
+            <a:schemeClr val="accent1"/>
+          </a:lnRef>
+          <a:fillRef idx="0">
+            <a:schemeClr val="accent1"/>
+          </a:fillRef>
+          <a:effectRef idx="0">
+            <a:schemeClr val="accent1"/>
+          </a:effectRef>
+          <a:fontRef idx="minor">
+            <a:schemeClr val="tx1"/>
+          </a:fontRef>
+        </p:style>
+      </p:cxnSp>
+      <p:cxnSp>
+        <p:nvCxnSpPr>
+          <p:cNvPr id="40" name="Connector: Elbow 39">
+            <a:extLst>
+              <a:ext uri="{FF2B5EF4-FFF2-40B4-BE49-F238E27FC236}">
+                <a16:creationId xmlns:a16="http://schemas.microsoft.com/office/drawing/2014/main" id="{D59B9E7E-48C5-D565-B614-35E18BD2B403}"/>
+              </a:ext>
+            </a:extLst>
+          </p:cNvPr>
+          <p:cNvCxnSpPr>
+            <a:cxnSpLocks/>
+            <a:stCxn id="3" idx="3"/>
+            <a:endCxn id="7" idx="1"/>
+          </p:cNvCxnSpPr>
+          <p:nvPr/>
+        </p:nvCxnSpPr>
+        <p:spPr>
+          <a:xfrm flipV="1">
+            <a:off x="1884162" y="2506540"/>
+            <a:ext cx="639274" cy="366755"/>
+          </a:xfrm>
+          <a:prstGeom prst="bentConnector3">
+            <a:avLst>
+              <a:gd name="adj1" fmla="val 50000"/>
+            </a:avLst>
+          </a:prstGeom>
+          <a:ln>
+            <a:solidFill>
+              <a:schemeClr val="tx1"/>
+            </a:solidFill>
+            <a:prstDash val="sysDash"/>
+            <a:tailEnd type="triangle"/>
+          </a:ln>
+        </p:spPr>
+        <p:style>
+          <a:lnRef idx="1">
+            <a:schemeClr val="accent1"/>
+          </a:lnRef>
+          <a:fillRef idx="0">
+            <a:schemeClr val="accent1"/>
+          </a:fillRef>
+          <a:effectRef idx="0">
+            <a:schemeClr val="accent1"/>
+          </a:effectRef>
+          <a:fontRef idx="minor">
+            <a:schemeClr val="tx1"/>
+          </a:fontRef>
+        </p:style>
+      </p:cxnSp>
+      <p:cxnSp>
+        <p:nvCxnSpPr>
+          <p:cNvPr id="43" name="Connector: Elbow 42">
+            <a:extLst>
+              <a:ext uri="{FF2B5EF4-FFF2-40B4-BE49-F238E27FC236}">
+                <a16:creationId xmlns:a16="http://schemas.microsoft.com/office/drawing/2014/main" id="{2B82FD5E-621C-6C10-E4E0-F97D7B570B79}"/>
+              </a:ext>
+            </a:extLst>
+          </p:cNvPr>
+          <p:cNvCxnSpPr>
+            <a:cxnSpLocks/>
+            <a:stCxn id="3" idx="3"/>
+            <a:endCxn id="6" idx="1"/>
+          </p:cNvCxnSpPr>
+          <p:nvPr/>
+        </p:nvCxnSpPr>
+        <p:spPr>
+          <a:xfrm>
+            <a:off x="1884162" y="2873295"/>
+            <a:ext cx="639274" cy="423354"/>
+          </a:xfrm>
+          <a:prstGeom prst="bentConnector3">
+            <a:avLst>
+              <a:gd name="adj1" fmla="val 50000"/>
+            </a:avLst>
+          </a:prstGeom>
+          <a:ln>
+            <a:solidFill>
+              <a:schemeClr val="tx1"/>
+            </a:solidFill>
+            <a:prstDash val="sysDash"/>
+            <a:tailEnd type="triangle"/>
+          </a:ln>
+        </p:spPr>
+        <p:style>
+          <a:lnRef idx="1">
+            <a:schemeClr val="accent1"/>
+          </a:lnRef>
+          <a:fillRef idx="0">
+            <a:schemeClr val="accent1"/>
+          </a:fillRef>
+          <a:effectRef idx="0">
+            <a:schemeClr val="accent1"/>
+          </a:effectRef>
+          <a:fontRef idx="minor">
+            <a:schemeClr val="tx1"/>
+          </a:fontRef>
+        </p:style>
+      </p:cxnSp>
+      <p:cxnSp>
+        <p:nvCxnSpPr>
+          <p:cNvPr id="46" name="Connector: Elbow 45">
+            <a:extLst>
+              <a:ext uri="{FF2B5EF4-FFF2-40B4-BE49-F238E27FC236}">
+                <a16:creationId xmlns:a16="http://schemas.microsoft.com/office/drawing/2014/main" id="{4BBFE7B9-8C71-5CCC-5424-82EA5A009BA6}"/>
+              </a:ext>
+            </a:extLst>
+          </p:cNvPr>
+          <p:cNvCxnSpPr>
+            <a:cxnSpLocks/>
+            <a:stCxn id="3" idx="3"/>
+            <a:endCxn id="8" idx="1"/>
+          </p:cNvCxnSpPr>
+          <p:nvPr/>
+        </p:nvCxnSpPr>
+        <p:spPr>
+          <a:xfrm>
+            <a:off x="1884162" y="2873295"/>
+            <a:ext cx="639274" cy="1213463"/>
+          </a:xfrm>
+          <a:prstGeom prst="bentConnector3">
+            <a:avLst>
+              <a:gd name="adj1" fmla="val 50000"/>
+            </a:avLst>
+          </a:prstGeom>
+          <a:ln>
+            <a:solidFill>
+              <a:schemeClr val="tx1"/>
+            </a:solidFill>
+            <a:prstDash val="sysDash"/>
+            <a:tailEnd type="triangle"/>
+          </a:ln>
+        </p:spPr>
+        <p:style>
+          <a:lnRef idx="1">
+            <a:schemeClr val="accent1"/>
+          </a:lnRef>
+          <a:fillRef idx="0">
+            <a:schemeClr val="accent1"/>
+          </a:fillRef>
+          <a:effectRef idx="0">
+            <a:schemeClr val="accent1"/>
+          </a:effectRef>
+          <a:fontRef idx="minor">
+            <a:schemeClr val="tx1"/>
+          </a:fontRef>
+        </p:style>
+      </p:cxnSp>
+      <mc:AlternateContent xmlns:mc="http://schemas.openxmlformats.org/markup-compatibility/2006">
+        <mc:Choice xmlns:a14="http://schemas.microsoft.com/office/drawing/2010/main" Requires="a14">
+          <p:sp>
+            <p:nvSpPr>
+              <p:cNvPr id="49" name="TextBox 48">
+                <a:extLst>
+                  <a:ext uri="{FF2B5EF4-FFF2-40B4-BE49-F238E27FC236}">
+                    <a16:creationId xmlns:a16="http://schemas.microsoft.com/office/drawing/2014/main" id="{70D07CC8-F038-244D-7D95-6432B4C33C4D}"/>
+                  </a:ext>
+                </a:extLst>
+              </p:cNvPr>
+              <p:cNvSpPr txBox="1"/>
+              <p:nvPr/>
+            </p:nvSpPr>
+            <p:spPr>
+              <a:xfrm>
+                <a:off x="3603405" y="1980525"/>
+                <a:ext cx="574237" cy="246221"/>
+              </a:xfrm>
+              <a:prstGeom prst="rect">
+                <a:avLst/>
+              </a:prstGeom>
+              <a:noFill/>
+            </p:spPr>
+            <p:txBody>
+              <a:bodyPr wrap="square" rtlCol="0">
+                <a:spAutoFit/>
+              </a:bodyPr>
+              <a:lstStyle/>
+              <a:p>
+                <a14:m>
+                  <m:oMathPara xmlns:m="http://schemas.openxmlformats.org/officeDocument/2006/math">
+                    <m:oMathParaPr>
+                      <m:jc m:val="centerGroup"/>
+                    </m:oMathParaPr>
+                    <m:oMath xmlns:m="http://schemas.openxmlformats.org/officeDocument/2006/math">
+                      <m:r>
+                        <a:rPr lang="en-US" sz="1000" b="0" i="1" smtClean="0">
+                          <a:latin typeface="Cambria Math" panose="02040503050406030204" pitchFamily="18" charset="0"/>
+                          <a:cs typeface="Times New Roman" panose="02020603050405020304" pitchFamily="18" charset="0"/>
+                        </a:rPr>
+                        <m:t>𝑄</m:t>
+                      </m:r>
+                      <m:r>
+                        <a:rPr lang="en-US" sz="1000" b="0" i="1" smtClean="0">
+                          <a:latin typeface="Cambria Math" panose="02040503050406030204" pitchFamily="18" charset="0"/>
+                          <a:cs typeface="Times New Roman" panose="02020603050405020304" pitchFamily="18" charset="0"/>
+                        </a:rPr>
+                        <m:t>(</m:t>
+                      </m:r>
+                      <m:r>
+                        <a:rPr lang="en-US" sz="1000" b="0" i="1" smtClean="0">
+                          <a:latin typeface="Cambria Math" panose="02040503050406030204" pitchFamily="18" charset="0"/>
+                          <a:cs typeface="Times New Roman" panose="02020603050405020304" pitchFamily="18" charset="0"/>
+                        </a:rPr>
+                        <m:t>𝑠</m:t>
+                      </m:r>
+                      <m:r>
+                        <a:rPr lang="en-US" sz="1000" b="0" i="1" smtClean="0">
+                          <a:latin typeface="Cambria Math" panose="02040503050406030204" pitchFamily="18" charset="0"/>
+                          <a:cs typeface="Times New Roman" panose="02020603050405020304" pitchFamily="18" charset="0"/>
+                        </a:rPr>
+                        <m:t>,</m:t>
+                      </m:r>
+                      <m:r>
+                        <a:rPr lang="en-US" sz="1000" b="0" i="1" smtClean="0">
+                          <a:latin typeface="Cambria Math" panose="02040503050406030204" pitchFamily="18" charset="0"/>
+                          <a:cs typeface="Times New Roman" panose="02020603050405020304" pitchFamily="18" charset="0"/>
+                        </a:rPr>
+                        <m:t>𝑎</m:t>
+                      </m:r>
+                      <m:r>
+                        <a:rPr lang="en-US" sz="1000" b="0" i="1" smtClean="0">
+                          <a:latin typeface="Cambria Math" panose="02040503050406030204" pitchFamily="18" charset="0"/>
+                          <a:cs typeface="Times New Roman" panose="02020603050405020304" pitchFamily="18" charset="0"/>
+                        </a:rPr>
+                        <m:t>)</m:t>
+                      </m:r>
+                    </m:oMath>
+                  </m:oMathPara>
+                </a14:m>
+                <a:endParaRPr lang="en-US" sz="1000" dirty="0">
+                  <a:latin typeface="Times New Roman" panose="02020603050405020304" pitchFamily="18" charset="0"/>
+                  <a:cs typeface="Times New Roman" panose="02020603050405020304" pitchFamily="18" charset="0"/>
+                </a:endParaRPr>
+              </a:p>
+            </p:txBody>
+          </p:sp>
+        </mc:Choice>
+        <mc:Fallback>
+          <p:sp>
+            <p:nvSpPr>
+              <p:cNvPr id="49" name="TextBox 48">
+                <a:extLst>
+                  <a:ext uri="{FF2B5EF4-FFF2-40B4-BE49-F238E27FC236}">
+                    <a16:creationId xmlns:a16="http://schemas.microsoft.com/office/drawing/2014/main" id="{70D07CC8-F038-244D-7D95-6432B4C33C4D}"/>
+                  </a:ext>
+                </a:extLst>
+              </p:cNvPr>
+              <p:cNvSpPr txBox="1">
+                <a:spLocks noRot="1" noChangeAspect="1" noMove="1" noResize="1" noEditPoints="1" noAdjustHandles="1" noChangeArrowheads="1" noChangeShapeType="1" noTextEdit="1"/>
+              </p:cNvSpPr>
+              <p:nvPr/>
+            </p:nvSpPr>
+            <p:spPr>
+              <a:xfrm>
+                <a:off x="3603405" y="1980525"/>
+                <a:ext cx="574237" cy="246221"/>
+              </a:xfrm>
+              <a:prstGeom prst="rect">
+                <a:avLst/>
+              </a:prstGeom>
+              <a:blipFill>
+                <a:blip r:embed="rId8"/>
+                <a:stretch>
+                  <a:fillRect b="-7500"/>
+                </a:stretch>
+              </a:blipFill>
+            </p:spPr>
+            <p:txBody>
+              <a:bodyPr/>
+              <a:lstStyle/>
+              <a:p>
+                <a:r>
+                  <a:rPr lang="en-US">
+                    <a:noFill/>
+                  </a:rPr>
+                  <a:t> </a:t>
+                </a:r>
+              </a:p>
+            </p:txBody>
+          </p:sp>
+        </mc:Fallback>
+      </mc:AlternateContent>
+      <mc:AlternateContent xmlns:mc="http://schemas.openxmlformats.org/markup-compatibility/2006">
+        <mc:Choice xmlns:a14="http://schemas.microsoft.com/office/drawing/2010/main" Requires="a14">
+          <p:sp>
+            <p:nvSpPr>
+              <p:cNvPr id="50" name="TextBox 49">
+                <a:extLst>
+                  <a:ext uri="{FF2B5EF4-FFF2-40B4-BE49-F238E27FC236}">
+                    <a16:creationId xmlns:a16="http://schemas.microsoft.com/office/drawing/2014/main" id="{4E7C07D3-53D0-4ED0-C076-A20D6EFDEEAA}"/>
+                  </a:ext>
+                </a:extLst>
+              </p:cNvPr>
+              <p:cNvSpPr txBox="1"/>
+              <p:nvPr/>
+            </p:nvSpPr>
+            <p:spPr>
+              <a:xfrm>
+                <a:off x="3603404" y="2770634"/>
+                <a:ext cx="574237" cy="268535"/>
+              </a:xfrm>
+              <a:prstGeom prst="rect">
+                <a:avLst/>
+              </a:prstGeom>
+              <a:noFill/>
+            </p:spPr>
+            <p:txBody>
+              <a:bodyPr wrap="square" rtlCol="0">
+                <a:spAutoFit/>
+              </a:bodyPr>
+              <a:lstStyle/>
+              <a:p>
+                <a14:m>
+                  <m:oMathPara xmlns:m="http://schemas.openxmlformats.org/officeDocument/2006/math">
+                    <m:oMathParaPr>
+                      <m:jc m:val="centerGroup"/>
+                    </m:oMathParaPr>
+                    <m:oMath xmlns:m="http://schemas.openxmlformats.org/officeDocument/2006/math">
+                      <m:acc>
+                        <m:accPr>
+                          <m:chr m:val="̂"/>
+                          <m:ctrlPr>
+                            <a:rPr lang="en-US" sz="1000" i="1">
+                              <a:latin typeface="Cambria Math" panose="02040503050406030204" pitchFamily="18" charset="0"/>
+                              <a:ea typeface="Cambria Math" panose="02040503050406030204" pitchFamily="18" charset="0"/>
+                              <a:cs typeface="Times New Roman" panose="02020603050405020304" pitchFamily="18" charset="0"/>
+                            </a:rPr>
+                          </m:ctrlPr>
+                        </m:accPr>
+                        <m:e>
+                          <m:sSub>
+                            <m:sSubPr>
+                              <m:ctrlPr>
+                                <a:rPr lang="en-US" sz="1000" i="1">
+                                  <a:latin typeface="Cambria Math" panose="02040503050406030204" pitchFamily="18" charset="0"/>
+                                  <a:ea typeface="Cambria Math" panose="02040503050406030204" pitchFamily="18" charset="0"/>
+                                  <a:cs typeface="Times New Roman" panose="02020603050405020304" pitchFamily="18" charset="0"/>
+                                </a:rPr>
+                              </m:ctrlPr>
+                            </m:sSubPr>
+                            <m:e>
+                              <m:r>
+                                <a:rPr lang="en-US" sz="1000" i="1">
+                                  <a:latin typeface="Cambria Math" panose="02040503050406030204" pitchFamily="18" charset="0"/>
+                                  <a:ea typeface="Cambria Math" panose="02040503050406030204" pitchFamily="18" charset="0"/>
+                                  <a:cs typeface="Times New Roman" panose="02020603050405020304" pitchFamily="18" charset="0"/>
+                                </a:rPr>
+                                <m:t>𝑄</m:t>
+                              </m:r>
+                            </m:e>
+                            <m:sub>
+                              <m:r>
+                                <a:rPr lang="en-US" sz="1000" i="1">
+                                  <a:latin typeface="Cambria Math" panose="02040503050406030204" pitchFamily="18" charset="0"/>
+                                  <a:ea typeface="Cambria Math" panose="02040503050406030204" pitchFamily="18" charset="0"/>
+                                  <a:cs typeface="Times New Roman" panose="02020603050405020304" pitchFamily="18" charset="0"/>
+                                </a:rPr>
+                                <m:t>𝜙</m:t>
+                              </m:r>
+                            </m:sub>
+                          </m:sSub>
+                        </m:e>
+                      </m:acc>
+                    </m:oMath>
+                  </m:oMathPara>
+                </a14:m>
+                <a:endParaRPr lang="en-US" sz="1000" dirty="0">
+                  <a:latin typeface="Times New Roman" panose="02020603050405020304" pitchFamily="18" charset="0"/>
+                  <a:cs typeface="Times New Roman" panose="02020603050405020304" pitchFamily="18" charset="0"/>
+                </a:endParaRPr>
+              </a:p>
+            </p:txBody>
+          </p:sp>
+        </mc:Choice>
+        <mc:Fallback>
+          <p:sp>
+            <p:nvSpPr>
+              <p:cNvPr id="50" name="TextBox 49">
+                <a:extLst>
+                  <a:ext uri="{FF2B5EF4-FFF2-40B4-BE49-F238E27FC236}">
+                    <a16:creationId xmlns:a16="http://schemas.microsoft.com/office/drawing/2014/main" id="{4E7C07D3-53D0-4ED0-C076-A20D6EFDEEAA}"/>
+                  </a:ext>
+                </a:extLst>
+              </p:cNvPr>
+              <p:cNvSpPr txBox="1">
+                <a:spLocks noRot="1" noChangeAspect="1" noMove="1" noResize="1" noEditPoints="1" noAdjustHandles="1" noChangeArrowheads="1" noChangeShapeType="1" noTextEdit="1"/>
+              </p:cNvSpPr>
+              <p:nvPr/>
+            </p:nvSpPr>
+            <p:spPr>
+              <a:xfrm>
+                <a:off x="3603404" y="2770634"/>
+                <a:ext cx="574237" cy="268535"/>
+              </a:xfrm>
+              <a:prstGeom prst="rect">
+                <a:avLst/>
+              </a:prstGeom>
+              <a:blipFill>
+                <a:blip r:embed="rId9"/>
+                <a:stretch>
+                  <a:fillRect r="-14894"/>
+                </a:stretch>
+              </a:blipFill>
+            </p:spPr>
+            <p:txBody>
+              <a:bodyPr/>
+              <a:lstStyle/>
+              <a:p>
+                <a:r>
+                  <a:rPr lang="en-US">
+                    <a:noFill/>
+                  </a:rPr>
+                  <a:t> </a:t>
+                </a:r>
+              </a:p>
+            </p:txBody>
+          </p:sp>
+        </mc:Fallback>
+      </mc:AlternateContent>
+      <mc:AlternateContent xmlns:mc="http://schemas.openxmlformats.org/markup-compatibility/2006">
+        <mc:Choice xmlns:a14="http://schemas.microsoft.com/office/drawing/2010/main" Requires="a14">
+          <p:sp>
+            <p:nvSpPr>
+              <p:cNvPr id="51" name="TextBox 50">
+                <a:extLst>
+                  <a:ext uri="{FF2B5EF4-FFF2-40B4-BE49-F238E27FC236}">
+                    <a16:creationId xmlns:a16="http://schemas.microsoft.com/office/drawing/2014/main" id="{A2CEBF64-6804-227E-7574-55265895516B}"/>
+                  </a:ext>
+                </a:extLst>
+              </p:cNvPr>
+              <p:cNvSpPr txBox="1"/>
+              <p:nvPr/>
+            </p:nvSpPr>
+            <p:spPr>
+              <a:xfrm>
+                <a:off x="3669036" y="3554489"/>
+                <a:ext cx="574237" cy="268535"/>
+              </a:xfrm>
+              <a:prstGeom prst="rect">
+                <a:avLst/>
+              </a:prstGeom>
+              <a:noFill/>
+            </p:spPr>
+            <p:txBody>
+              <a:bodyPr wrap="square" rtlCol="0">
+                <a:spAutoFit/>
+              </a:bodyPr>
+              <a:lstStyle/>
+              <a:p>
+                <a14:m>
+                  <m:oMathPara xmlns:m="http://schemas.openxmlformats.org/officeDocument/2006/math">
+                    <m:oMathParaPr>
+                      <m:jc m:val="centerGroup"/>
+                    </m:oMathParaPr>
+                    <m:oMath xmlns:m="http://schemas.openxmlformats.org/officeDocument/2006/math">
+                      <m:acc>
+                        <m:accPr>
+                          <m:chr m:val="̂"/>
+                          <m:ctrlPr>
+                            <a:rPr lang="en-US" sz="1000" i="1" smtClean="0">
+                              <a:latin typeface="Cambria Math" panose="02040503050406030204" pitchFamily="18" charset="0"/>
+                              <a:ea typeface="Cambria Math" panose="02040503050406030204" pitchFamily="18" charset="0"/>
+                              <a:cs typeface="Times New Roman" panose="02020603050405020304" pitchFamily="18" charset="0"/>
+                            </a:rPr>
+                          </m:ctrlPr>
+                        </m:accPr>
+                        <m:e>
+                          <m:sSub>
+                            <m:sSubPr>
+                              <m:ctrlPr>
+                                <a:rPr lang="en-US" sz="1000" i="1">
+                                  <a:latin typeface="Cambria Math" panose="02040503050406030204" pitchFamily="18" charset="0"/>
+                                  <a:ea typeface="Cambria Math" panose="02040503050406030204" pitchFamily="18" charset="0"/>
+                                  <a:cs typeface="Times New Roman" panose="02020603050405020304" pitchFamily="18" charset="0"/>
+                                </a:rPr>
+                              </m:ctrlPr>
+                            </m:sSubPr>
+                            <m:e>
+                              <m:r>
+                                <a:rPr lang="en-US" sz="1000" i="1">
+                                  <a:latin typeface="Cambria Math" panose="02040503050406030204" pitchFamily="18" charset="0"/>
+                                  <a:ea typeface="Cambria Math" panose="02040503050406030204" pitchFamily="18" charset="0"/>
+                                  <a:cs typeface="Times New Roman" panose="02020603050405020304" pitchFamily="18" charset="0"/>
+                                </a:rPr>
+                                <m:t>𝑄</m:t>
+                              </m:r>
+                            </m:e>
+                            <m:sub>
+                              <m:r>
+                                <a:rPr lang="en-US" sz="1000" i="1">
+                                  <a:latin typeface="Cambria Math" panose="02040503050406030204" pitchFamily="18" charset="0"/>
+                                  <a:ea typeface="Cambria Math" panose="02040503050406030204" pitchFamily="18" charset="0"/>
+                                  <a:cs typeface="Times New Roman" panose="02020603050405020304" pitchFamily="18" charset="0"/>
+                                </a:rPr>
+                                <m:t>𝜙</m:t>
+                              </m:r>
+                            </m:sub>
+                          </m:sSub>
+                        </m:e>
+                      </m:acc>
+                      <m:r>
+                        <a:rPr lang="en-US" sz="1000" i="1">
+                          <a:latin typeface="Cambria Math" panose="02040503050406030204" pitchFamily="18" charset="0"/>
+                          <a:ea typeface="Cambria Math" panose="02040503050406030204" pitchFamily="18" charset="0"/>
+                          <a:cs typeface="Times New Roman" panose="02020603050405020304" pitchFamily="18" charset="0"/>
+                        </a:rPr>
+                        <m:t>(</m:t>
+                      </m:r>
+                      <m:r>
+                        <a:rPr lang="en-US" sz="1000" i="1">
+                          <a:latin typeface="Cambria Math" panose="02040503050406030204" pitchFamily="18" charset="0"/>
+                          <a:ea typeface="Cambria Math" panose="02040503050406030204" pitchFamily="18" charset="0"/>
+                          <a:cs typeface="Times New Roman" panose="02020603050405020304" pitchFamily="18" charset="0"/>
+                        </a:rPr>
+                        <m:t>𝑠</m:t>
+                      </m:r>
+                      <m:r>
+                        <a:rPr lang="en-US" sz="1000" i="1">
+                          <a:latin typeface="Cambria Math" panose="02040503050406030204" pitchFamily="18" charset="0"/>
+                          <a:ea typeface="Cambria Math" panose="02040503050406030204" pitchFamily="18" charset="0"/>
+                          <a:cs typeface="Times New Roman" panose="02020603050405020304" pitchFamily="18" charset="0"/>
+                        </a:rPr>
+                        <m:t>,</m:t>
+                      </m:r>
+                      <m:acc>
+                        <m:accPr>
+                          <m:chr m:val="̃"/>
+                          <m:ctrlPr>
+                            <a:rPr lang="en-US" sz="1000" i="1" smtClean="0">
+                              <a:latin typeface="Cambria Math" panose="02040503050406030204" pitchFamily="18" charset="0"/>
+                              <a:ea typeface="Cambria Math" panose="02040503050406030204" pitchFamily="18" charset="0"/>
+                              <a:cs typeface="Times New Roman" panose="02020603050405020304" pitchFamily="18" charset="0"/>
+                            </a:rPr>
+                          </m:ctrlPr>
+                        </m:accPr>
+                        <m:e>
+                          <m:r>
+                            <a:rPr lang="en-US" sz="1000" b="0" i="1" smtClean="0">
+                              <a:latin typeface="Cambria Math" panose="02040503050406030204" pitchFamily="18" charset="0"/>
+                              <a:ea typeface="Cambria Math" panose="02040503050406030204" pitchFamily="18" charset="0"/>
+                              <a:cs typeface="Times New Roman" panose="02020603050405020304" pitchFamily="18" charset="0"/>
+                            </a:rPr>
+                            <m:t>𝑎</m:t>
+                          </m:r>
+                        </m:e>
+                      </m:acc>
+                      <m:r>
+                        <a:rPr lang="en-US" sz="1000" i="1">
+                          <a:latin typeface="Cambria Math" panose="02040503050406030204" pitchFamily="18" charset="0"/>
+                          <a:ea typeface="Cambria Math" panose="02040503050406030204" pitchFamily="18" charset="0"/>
+                          <a:cs typeface="Times New Roman" panose="02020603050405020304" pitchFamily="18" charset="0"/>
+                        </a:rPr>
+                        <m:t>)</m:t>
+                      </m:r>
+                    </m:oMath>
+                  </m:oMathPara>
+                </a14:m>
+                <a:endParaRPr lang="en-US" sz="1000" dirty="0">
+                  <a:latin typeface="Times New Roman" panose="02020603050405020304" pitchFamily="18" charset="0"/>
+                  <a:cs typeface="Times New Roman" panose="02020603050405020304" pitchFamily="18" charset="0"/>
+                </a:endParaRPr>
+              </a:p>
+            </p:txBody>
+          </p:sp>
+        </mc:Choice>
+        <mc:Fallback>
+          <p:sp>
+            <p:nvSpPr>
+              <p:cNvPr id="51" name="TextBox 50">
+                <a:extLst>
+                  <a:ext uri="{FF2B5EF4-FFF2-40B4-BE49-F238E27FC236}">
+                    <a16:creationId xmlns:a16="http://schemas.microsoft.com/office/drawing/2014/main" id="{A2CEBF64-6804-227E-7574-55265895516B}"/>
+                  </a:ext>
+                </a:extLst>
+              </p:cNvPr>
+              <p:cNvSpPr txBox="1">
+                <a:spLocks noRot="1" noChangeAspect="1" noMove="1" noResize="1" noEditPoints="1" noAdjustHandles="1" noChangeArrowheads="1" noChangeShapeType="1" noTextEdit="1"/>
+              </p:cNvSpPr>
+              <p:nvPr/>
+            </p:nvSpPr>
+            <p:spPr>
+              <a:xfrm>
+                <a:off x="3669036" y="3554489"/>
+                <a:ext cx="574237" cy="268535"/>
+              </a:xfrm>
+              <a:prstGeom prst="rect">
+                <a:avLst/>
+              </a:prstGeom>
+              <a:blipFill>
+                <a:blip r:embed="rId10"/>
+                <a:stretch>
+                  <a:fillRect r="-20213"/>
+                </a:stretch>
+              </a:blipFill>
+            </p:spPr>
+            <p:txBody>
+              <a:bodyPr/>
+              <a:lstStyle/>
+              <a:p>
+                <a:r>
+                  <a:rPr lang="en-US">
+                    <a:noFill/>
+                  </a:rPr>
+                  <a:t> </a:t>
+                </a:r>
+              </a:p>
+            </p:txBody>
+          </p:sp>
+        </mc:Fallback>
+      </mc:AlternateContent>
+      <mc:AlternateContent xmlns:mc="http://schemas.openxmlformats.org/markup-compatibility/2006">
+        <mc:Choice xmlns:a14="http://schemas.microsoft.com/office/drawing/2010/main" Requires="a14">
+          <p:sp>
+            <p:nvSpPr>
+              <p:cNvPr id="52" name="TextBox 51">
+                <a:extLst>
+                  <a:ext uri="{FF2B5EF4-FFF2-40B4-BE49-F238E27FC236}">
+                    <a16:creationId xmlns:a16="http://schemas.microsoft.com/office/drawing/2014/main" id="{534789CB-10D9-29AC-7CA3-3741FD174BEF}"/>
+                  </a:ext>
+                </a:extLst>
+              </p:cNvPr>
+              <p:cNvSpPr txBox="1"/>
+              <p:nvPr/>
+            </p:nvSpPr>
+            <p:spPr>
+              <a:xfrm>
+                <a:off x="3603404" y="4462694"/>
+                <a:ext cx="307825" cy="246221"/>
+              </a:xfrm>
+              <a:prstGeom prst="rect">
+                <a:avLst/>
+              </a:prstGeom>
+              <a:noFill/>
+            </p:spPr>
+            <p:txBody>
+              <a:bodyPr wrap="square" rtlCol="0">
+                <a:spAutoFit/>
+              </a:bodyPr>
+              <a:lstStyle/>
+              <a:p>
+                <a14:m>
+                  <m:oMathPara xmlns:m="http://schemas.openxmlformats.org/officeDocument/2006/math">
+                    <m:oMathParaPr>
+                      <m:jc m:val="centerGroup"/>
+                    </m:oMathParaPr>
+                    <m:oMath xmlns:m="http://schemas.openxmlformats.org/officeDocument/2006/math">
+                      <m:sSub>
+                        <m:sSubPr>
+                          <m:ctrlPr>
+                            <a:rPr lang="en-US" sz="1000" i="1" smtClean="0">
+                              <a:latin typeface="Cambria Math" panose="02040503050406030204" pitchFamily="18" charset="0"/>
+                              <a:ea typeface="Cambria Math" panose="02040503050406030204" pitchFamily="18" charset="0"/>
+                              <a:cs typeface="Times New Roman" panose="02020603050405020304" pitchFamily="18" charset="0"/>
+                            </a:rPr>
+                          </m:ctrlPr>
+                        </m:sSubPr>
+                        <m:e>
+                          <m:r>
+                            <a:rPr lang="en-US" sz="1000" i="1" smtClean="0">
+                              <a:latin typeface="Cambria Math" panose="02040503050406030204" pitchFamily="18" charset="0"/>
+                              <a:ea typeface="Cambria Math" panose="02040503050406030204" pitchFamily="18" charset="0"/>
+                              <a:cs typeface="Times New Roman" panose="02020603050405020304" pitchFamily="18" charset="0"/>
+                            </a:rPr>
+                            <m:t>𝜋</m:t>
+                          </m:r>
+                        </m:e>
+                        <m:sub>
+                          <m:r>
+                            <a:rPr lang="en-US" sz="1000" b="0" i="1" smtClean="0">
+                              <a:latin typeface="Cambria Math" panose="02040503050406030204" pitchFamily="18" charset="0"/>
+                              <a:ea typeface="Cambria Math" panose="02040503050406030204" pitchFamily="18" charset="0"/>
+                              <a:cs typeface="Times New Roman" panose="02020603050405020304" pitchFamily="18" charset="0"/>
+                            </a:rPr>
+                            <m:t>𝜃</m:t>
+                          </m:r>
+                        </m:sub>
+                      </m:sSub>
+                    </m:oMath>
+                  </m:oMathPara>
+                </a14:m>
+                <a:endParaRPr lang="en-US" sz="1000" dirty="0">
+                  <a:latin typeface="Times New Roman" panose="02020603050405020304" pitchFamily="18" charset="0"/>
+                  <a:cs typeface="Times New Roman" panose="02020603050405020304" pitchFamily="18" charset="0"/>
+                </a:endParaRPr>
+              </a:p>
+            </p:txBody>
+          </p:sp>
+        </mc:Choice>
+        <mc:Fallback>
+          <p:sp>
+            <p:nvSpPr>
+              <p:cNvPr id="52" name="TextBox 51">
+                <a:extLst>
+                  <a:ext uri="{FF2B5EF4-FFF2-40B4-BE49-F238E27FC236}">
+                    <a16:creationId xmlns:a16="http://schemas.microsoft.com/office/drawing/2014/main" id="{534789CB-10D9-29AC-7CA3-3741FD174BEF}"/>
+                  </a:ext>
+                </a:extLst>
+              </p:cNvPr>
+              <p:cNvSpPr txBox="1">
+                <a:spLocks noRot="1" noChangeAspect="1" noMove="1" noResize="1" noEditPoints="1" noAdjustHandles="1" noChangeArrowheads="1" noChangeShapeType="1" noTextEdit="1"/>
+              </p:cNvSpPr>
+              <p:nvPr/>
+            </p:nvSpPr>
+            <p:spPr>
+              <a:xfrm>
+                <a:off x="3603404" y="4462694"/>
+                <a:ext cx="307825" cy="246221"/>
+              </a:xfrm>
+              <a:prstGeom prst="rect">
+                <a:avLst/>
+              </a:prstGeom>
+              <a:blipFill>
+                <a:blip r:embed="rId11"/>
+                <a:stretch>
+                  <a:fillRect/>
+                </a:stretch>
+              </a:blipFill>
+            </p:spPr>
+            <p:txBody>
+              <a:bodyPr/>
+              <a:lstStyle/>
+              <a:p>
+                <a:r>
+                  <a:rPr lang="en-US">
+                    <a:noFill/>
+                  </a:rPr>
+                  <a:t> </a:t>
+                </a:r>
+              </a:p>
+            </p:txBody>
+          </p:sp>
+        </mc:Fallback>
+      </mc:AlternateContent>
+      <p:cxnSp>
+        <p:nvCxnSpPr>
+          <p:cNvPr id="53" name="Connector: Elbow 52">
+            <a:extLst>
+              <a:ext uri="{FF2B5EF4-FFF2-40B4-BE49-F238E27FC236}">
+                <a16:creationId xmlns:a16="http://schemas.microsoft.com/office/drawing/2014/main" id="{B5BD4C32-38F8-6038-F2F0-DB70632F9EB3}"/>
+              </a:ext>
+            </a:extLst>
+          </p:cNvPr>
+          <p:cNvCxnSpPr>
+            <a:cxnSpLocks/>
+            <a:stCxn id="8" idx="2"/>
+            <a:endCxn id="4" idx="0"/>
+          </p:cNvCxnSpPr>
+          <p:nvPr/>
+        </p:nvCxnSpPr>
+        <p:spPr>
+          <a:xfrm rot="5400000" flipH="1">
+            <a:off x="2148530" y="2901595"/>
+            <a:ext cx="2800355" cy="12700"/>
+          </a:xfrm>
+          <a:prstGeom prst="bentConnector5">
+            <a:avLst>
+              <a:gd name="adj1" fmla="val -8163"/>
+              <a:gd name="adj2" fmla="val 24010213"/>
+              <a:gd name="adj3" fmla="val 108163"/>
+            </a:avLst>
+          </a:prstGeom>
+          <a:ln>
+            <a:solidFill>
+              <a:schemeClr val="tx1"/>
+            </a:solidFill>
+            <a:tailEnd type="triangle"/>
+          </a:ln>
+        </p:spPr>
+        <p:style>
+          <a:lnRef idx="1">
+            <a:schemeClr val="accent1"/>
+          </a:lnRef>
+          <a:fillRef idx="0">
+            <a:schemeClr val="accent1"/>
+          </a:fillRef>
+          <a:effectRef idx="0">
+            <a:schemeClr val="accent1"/>
+          </a:effectRef>
+          <a:fontRef idx="minor">
+            <a:schemeClr val="tx1"/>
+          </a:fontRef>
+        </p:style>
+      </p:cxnSp>
+      <mc:AlternateContent xmlns:mc="http://schemas.openxmlformats.org/markup-compatibility/2006">
+        <mc:Choice xmlns:a14="http://schemas.microsoft.com/office/drawing/2010/main" Requires="a14">
+          <p:sp>
+            <p:nvSpPr>
+              <p:cNvPr id="56" name="TextBox 55">
+                <a:extLst>
+                  <a:ext uri="{FF2B5EF4-FFF2-40B4-BE49-F238E27FC236}">
+                    <a16:creationId xmlns:a16="http://schemas.microsoft.com/office/drawing/2014/main" id="{CB7626F5-FF2B-2652-C470-3FEA62FFD79B}"/>
+                  </a:ext>
+                </a:extLst>
+              </p:cNvPr>
+              <p:cNvSpPr txBox="1"/>
+              <p:nvPr/>
+            </p:nvSpPr>
+            <p:spPr>
+              <a:xfrm>
+                <a:off x="4791641" y="1436226"/>
+                <a:ext cx="574237" cy="280205"/>
+              </a:xfrm>
+              <a:prstGeom prst="rect">
+                <a:avLst/>
+              </a:prstGeom>
+              <a:noFill/>
+            </p:spPr>
+            <p:txBody>
+              <a:bodyPr wrap="square" rtlCol="0">
+                <a:spAutoFit/>
+              </a:bodyPr>
+              <a:lstStyle/>
+              <a:p>
+                <a14:m>
+                  <m:oMathPara xmlns:m="http://schemas.openxmlformats.org/officeDocument/2006/math">
+                    <m:oMathParaPr>
+                      <m:jc m:val="centerGroup"/>
+                    </m:oMathParaPr>
+                    <m:oMath xmlns:m="http://schemas.openxmlformats.org/officeDocument/2006/math">
+                      <m:acc>
+                        <m:accPr>
+                          <m:chr m:val="̂"/>
+                          <m:ctrlPr>
+                            <a:rPr lang="en-US" sz="1000" i="1" smtClean="0">
+                              <a:latin typeface="Cambria Math" panose="02040503050406030204" pitchFamily="18" charset="0"/>
+                              <a:ea typeface="Cambria Math" panose="02040503050406030204" pitchFamily="18" charset="0"/>
+                              <a:cs typeface="Times New Roman" panose="02020603050405020304" pitchFamily="18" charset="0"/>
+                            </a:rPr>
+                          </m:ctrlPr>
+                        </m:accPr>
+                        <m:e>
+                          <m:sSub>
+                            <m:sSubPr>
+                              <m:ctrlPr>
+                                <a:rPr lang="en-US" sz="1000" i="1">
+                                  <a:latin typeface="Cambria Math" panose="02040503050406030204" pitchFamily="18" charset="0"/>
+                                  <a:ea typeface="Cambria Math" panose="02040503050406030204" pitchFamily="18" charset="0"/>
+                                  <a:cs typeface="Times New Roman" panose="02020603050405020304" pitchFamily="18" charset="0"/>
+                                </a:rPr>
+                              </m:ctrlPr>
+                            </m:sSubPr>
+                            <m:e>
+                              <m:r>
+                                <a:rPr lang="en-US" sz="1000" i="1">
+                                  <a:latin typeface="Cambria Math" panose="02040503050406030204" pitchFamily="18" charset="0"/>
+                                  <a:ea typeface="Cambria Math" panose="02040503050406030204" pitchFamily="18" charset="0"/>
+                                  <a:cs typeface="Times New Roman" panose="02020603050405020304" pitchFamily="18" charset="0"/>
+                                </a:rPr>
+                                <m:t>𝑄</m:t>
+                              </m:r>
+                              <m:r>
+                                <a:rPr lang="en-US" sz="1000" b="0" i="1" smtClean="0">
+                                  <a:latin typeface="Cambria Math" panose="02040503050406030204" pitchFamily="18" charset="0"/>
+                                  <a:ea typeface="Cambria Math" panose="02040503050406030204" pitchFamily="18" charset="0"/>
+                                  <a:cs typeface="Times New Roman" panose="02020603050405020304" pitchFamily="18" charset="0"/>
+                                </a:rPr>
+                                <m:t>′</m:t>
+                              </m:r>
+                            </m:e>
+                            <m:sub>
+                              <m:r>
+                                <a:rPr lang="en-US" sz="1000" i="1">
+                                  <a:latin typeface="Cambria Math" panose="02040503050406030204" pitchFamily="18" charset="0"/>
+                                  <a:ea typeface="Cambria Math" panose="02040503050406030204" pitchFamily="18" charset="0"/>
+                                  <a:cs typeface="Times New Roman" panose="02020603050405020304" pitchFamily="18" charset="0"/>
+                                </a:rPr>
+                                <m:t>𝜙</m:t>
+                              </m:r>
+                              <m:r>
+                                <a:rPr lang="en-US" sz="1000" b="0" i="1" smtClean="0">
+                                  <a:latin typeface="Cambria Math" panose="02040503050406030204" pitchFamily="18" charset="0"/>
+                                  <a:ea typeface="Cambria Math" panose="02040503050406030204" pitchFamily="18" charset="0"/>
+                                  <a:cs typeface="Times New Roman" panose="02020603050405020304" pitchFamily="18" charset="0"/>
+                                </a:rPr>
+                                <m:t>′</m:t>
+                              </m:r>
+                            </m:sub>
+                          </m:sSub>
+                        </m:e>
+                      </m:acc>
+                    </m:oMath>
+                  </m:oMathPara>
+                </a14:m>
+                <a:endParaRPr lang="en-US" sz="1000" dirty="0">
+                  <a:latin typeface="Times New Roman" panose="02020603050405020304" pitchFamily="18" charset="0"/>
+                  <a:cs typeface="Times New Roman" panose="02020603050405020304" pitchFamily="18" charset="0"/>
+                </a:endParaRPr>
+              </a:p>
+            </p:txBody>
+          </p:sp>
+        </mc:Choice>
+        <mc:Fallback>
+          <p:sp>
+            <p:nvSpPr>
+              <p:cNvPr id="56" name="TextBox 55">
+                <a:extLst>
+                  <a:ext uri="{FF2B5EF4-FFF2-40B4-BE49-F238E27FC236}">
+                    <a16:creationId xmlns:a16="http://schemas.microsoft.com/office/drawing/2014/main" id="{CB7626F5-FF2B-2652-C470-3FEA62FFD79B}"/>
+                  </a:ext>
+                </a:extLst>
+              </p:cNvPr>
+              <p:cNvSpPr txBox="1">
+                <a:spLocks noRot="1" noChangeAspect="1" noMove="1" noResize="1" noEditPoints="1" noAdjustHandles="1" noChangeArrowheads="1" noChangeShapeType="1" noTextEdit="1"/>
+              </p:cNvSpPr>
+              <p:nvPr/>
+            </p:nvSpPr>
+            <p:spPr>
+              <a:xfrm>
+                <a:off x="4791641" y="1436226"/>
+                <a:ext cx="574237" cy="280205"/>
+              </a:xfrm>
+              <a:prstGeom prst="rect">
+                <a:avLst/>
+              </a:prstGeom>
+              <a:blipFill>
+                <a:blip r:embed="rId12"/>
+                <a:stretch>
+                  <a:fillRect r="-14894"/>
+                </a:stretch>
+              </a:blipFill>
+            </p:spPr>
+            <p:txBody>
+              <a:bodyPr/>
+              <a:lstStyle/>
+              <a:p>
+                <a:r>
+                  <a:rPr lang="en-US">
+                    <a:noFill/>
+                  </a:rPr>
+                  <a:t> </a:t>
+                </a:r>
+              </a:p>
+            </p:txBody>
+          </p:sp>
+        </mc:Fallback>
+      </mc:AlternateContent>
+      <p:sp>
+        <p:nvSpPr>
+          <p:cNvPr id="62" name="TextBox 61">
+            <a:extLst>
+              <a:ext uri="{FF2B5EF4-FFF2-40B4-BE49-F238E27FC236}">
+                <a16:creationId xmlns:a16="http://schemas.microsoft.com/office/drawing/2014/main" id="{402175B1-DF74-E62B-0667-898FF80CD4DB}"/>
+              </a:ext>
+            </a:extLst>
+          </p:cNvPr>
+          <p:cNvSpPr txBox="1"/>
+          <p:nvPr/>
+        </p:nvSpPr>
+        <p:spPr>
+          <a:xfrm>
+            <a:off x="4622326" y="2506539"/>
+            <a:ext cx="847537" cy="400110"/>
+          </a:xfrm>
+          <a:prstGeom prst="rect">
+            <a:avLst/>
+          </a:prstGeom>
+          <a:noFill/>
+        </p:spPr>
+        <p:txBody>
+          <a:bodyPr wrap="square" rtlCol="0">
+            <a:spAutoFit/>
+          </a:bodyPr>
+          <a:lstStyle/>
+          <a:p>
+            <a:pPr algn="ctr"/>
+            <a:r>
+              <a:rPr lang="en-US" sz="1000" dirty="0">
+                <a:latin typeface="Times New Roman" panose="02020603050405020304" pitchFamily="18" charset="0"/>
+                <a:cs typeface="Times New Roman" panose="02020603050405020304" pitchFamily="18" charset="0"/>
+              </a:rPr>
+              <a:t>Every</a:t>
+            </a:r>
+            <a:r>
+              <a:rPr lang="en-US" sz="1000" i="1" dirty="0">
+                <a:latin typeface="Times New Roman" panose="02020603050405020304" pitchFamily="18" charset="0"/>
+                <a:cs typeface="Times New Roman" panose="02020603050405020304" pitchFamily="18" charset="0"/>
+              </a:rPr>
+              <a:t> n </a:t>
+            </a:r>
+            <a:r>
+              <a:rPr lang="en-US" sz="1000" dirty="0">
+                <a:latin typeface="Times New Roman" panose="02020603050405020304" pitchFamily="18" charset="0"/>
+                <a:cs typeface="Times New Roman" panose="02020603050405020304" pitchFamily="18" charset="0"/>
+              </a:rPr>
+              <a:t>steps</a:t>
+            </a:r>
+          </a:p>
+        </p:txBody>
+      </p:sp>
+    </p:spTree>
+    <p:extLst>
+      <p:ext uri="{BB962C8B-B14F-4D97-AF65-F5344CB8AC3E}">
+        <p14:creationId xmlns:p14="http://schemas.microsoft.com/office/powerpoint/2010/main" val="3909666952"/>
+      </p:ext>
+    </p:extLst>
+  </p:cSld>
+  <p:clrMapOvr>
+    <a:masterClrMapping/>
+  </p:clrMapOvr>
+</p:sld>
+</file>
+
+<file path=ppt/slides/slide6.xml><?xml version="1.0" encoding="utf-8"?>
 <p:sld xmlns:a="http://schemas.openxmlformats.org/drawingml/2006/main" xmlns:r="http://schemas.openxmlformats.org/officeDocument/2006/relationships" xmlns:p="http://schemas.openxmlformats.org/presentationml/2006/main">
   <p:cSld>
     <p:spTree>
@@ -7250,7 +11478,7 @@
         </p:blipFill>
         <p:spPr>
           <a:xfrm>
-            <a:off x="3134023" y="1303581"/>
+            <a:off x="3106537" y="1303581"/>
             <a:ext cx="1933277" cy="1868244"/>
           </a:xfrm>
           <a:prstGeom prst="rect">

</xml_diff>